<commit_message>
finished arma hands-on presentation
</commit_message>
<xml_diff>
--- a/doc/workshop/ARMA/arma_workshop.pptx
+++ b/doc/workshop/ARMA/arma_workshop.pptx
@@ -5,10 +5,10 @@
     <p:sldMasterId id="2147483648" r:id="rId1"/>
   </p:sldMasterIdLst>
   <p:notesMasterIdLst>
-    <p:notesMasterId r:id="rId21"/>
+    <p:notesMasterId r:id="rId30"/>
   </p:notesMasterIdLst>
   <p:handoutMasterIdLst>
-    <p:handoutMasterId r:id="rId22"/>
+    <p:handoutMasterId r:id="rId31"/>
   </p:handoutMasterIdLst>
   <p:sldIdLst>
     <p:sldId id="272" r:id="rId2"/>
@@ -30,6 +30,15 @@
     <p:sldId id="454" r:id="rId18"/>
     <p:sldId id="456" r:id="rId19"/>
     <p:sldId id="455" r:id="rId20"/>
+    <p:sldId id="457" r:id="rId21"/>
+    <p:sldId id="459" r:id="rId22"/>
+    <p:sldId id="458" r:id="rId23"/>
+    <p:sldId id="460" r:id="rId24"/>
+    <p:sldId id="461" r:id="rId25"/>
+    <p:sldId id="462" r:id="rId26"/>
+    <p:sldId id="463" r:id="rId27"/>
+    <p:sldId id="464" r:id="rId28"/>
+    <p:sldId id="465" r:id="rId29"/>
   </p:sldIdLst>
   <p:sldSz cx="9144000" cy="6858000" type="screen4x3"/>
   <p:notesSz cx="7010400" cy="9296400"/>
@@ -1529,6 +1538,346 @@
     <p:extLst>
       <p:ext uri="{BB962C8B-B14F-4D97-AF65-F5344CB8AC3E}">
         <p14:creationId xmlns:p14="http://schemas.microsoft.com/office/powerpoint/2010/main" val="3606984600"/>
+      </p:ext>
+    </p:extLst>
+  </p:cSld>
+  <p:clrMapOvr>
+    <a:masterClrMapping/>
+  </p:clrMapOvr>
+</p:notes>
+</file>
+
+<file path=ppt/notesSlides/notesSlide2.xml><?xml version="1.0" encoding="utf-8"?>
+<p:notes xmlns:a="http://schemas.openxmlformats.org/drawingml/2006/main" xmlns:r="http://schemas.openxmlformats.org/officeDocument/2006/relationships" xmlns:p="http://schemas.openxmlformats.org/presentationml/2006/main">
+  <p:cSld>
+    <p:spTree>
+      <p:nvGrpSpPr>
+        <p:cNvPr id="1" name=""/>
+        <p:cNvGrpSpPr/>
+        <p:nvPr/>
+      </p:nvGrpSpPr>
+      <p:grpSpPr>
+        <a:xfrm>
+          <a:off x="0" y="0"/>
+          <a:ext cx="0" cy="0"/>
+          <a:chOff x="0" y="0"/>
+          <a:chExt cx="0" cy="0"/>
+        </a:xfrm>
+      </p:grpSpPr>
+      <p:sp>
+        <p:nvSpPr>
+          <p:cNvPr id="2" name="Slide Image Placeholder 1"/>
+          <p:cNvSpPr>
+            <a:spLocks noGrp="1" noRot="1" noChangeAspect="1"/>
+          </p:cNvSpPr>
+          <p:nvPr>
+            <p:ph type="sldImg"/>
+          </p:nvPr>
+        </p:nvSpPr>
+        <p:spPr/>
+      </p:sp>
+      <p:sp>
+        <p:nvSpPr>
+          <p:cNvPr id="3" name="Notes Placeholder 2"/>
+          <p:cNvSpPr>
+            <a:spLocks noGrp="1"/>
+          </p:cNvSpPr>
+          <p:nvPr>
+            <p:ph type="body" idx="1"/>
+          </p:nvPr>
+        </p:nvSpPr>
+        <p:spPr/>
+        <p:txBody>
+          <a:bodyPr/>
+          <a:lstStyle/>
+          <a:p>
+            <a:endParaRPr lang="en-US" dirty="0"/>
+          </a:p>
+        </p:txBody>
+      </p:sp>
+      <p:sp>
+        <p:nvSpPr>
+          <p:cNvPr id="4" name="Slide Number Placeholder 3"/>
+          <p:cNvSpPr>
+            <a:spLocks noGrp="1"/>
+          </p:cNvSpPr>
+          <p:nvPr>
+            <p:ph type="sldNum" sz="quarter" idx="10"/>
+          </p:nvPr>
+        </p:nvSpPr>
+        <p:spPr/>
+        <p:txBody>
+          <a:bodyPr/>
+          <a:lstStyle/>
+          <a:p>
+            <a:fld id="{55ECFD52-9CA0-4306-99FC-201DA20A9336}" type="slidenum">
+              <a:rPr lang="en-US" smtClean="0"/>
+              <a:pPr/>
+              <a:t>19</a:t>
+            </a:fld>
+            <a:endParaRPr lang="en-US"/>
+          </a:p>
+        </p:txBody>
+      </p:sp>
+    </p:spTree>
+    <p:extLst>
+      <p:ext uri="{BB962C8B-B14F-4D97-AF65-F5344CB8AC3E}">
+        <p14:creationId xmlns:p14="http://schemas.microsoft.com/office/powerpoint/2010/main" val="2552316264"/>
+      </p:ext>
+    </p:extLst>
+  </p:cSld>
+  <p:clrMapOvr>
+    <a:masterClrMapping/>
+  </p:clrMapOvr>
+</p:notes>
+</file>
+
+<file path=ppt/notesSlides/notesSlide3.xml><?xml version="1.0" encoding="utf-8"?>
+<p:notes xmlns:a="http://schemas.openxmlformats.org/drawingml/2006/main" xmlns:r="http://schemas.openxmlformats.org/officeDocument/2006/relationships" xmlns:p="http://schemas.openxmlformats.org/presentationml/2006/main">
+  <p:cSld>
+    <p:spTree>
+      <p:nvGrpSpPr>
+        <p:cNvPr id="1" name=""/>
+        <p:cNvGrpSpPr/>
+        <p:nvPr/>
+      </p:nvGrpSpPr>
+      <p:grpSpPr>
+        <a:xfrm>
+          <a:off x="0" y="0"/>
+          <a:ext cx="0" cy="0"/>
+          <a:chOff x="0" y="0"/>
+          <a:chExt cx="0" cy="0"/>
+        </a:xfrm>
+      </p:grpSpPr>
+      <p:sp>
+        <p:nvSpPr>
+          <p:cNvPr id="2" name="Slide Image Placeholder 1"/>
+          <p:cNvSpPr>
+            <a:spLocks noGrp="1" noRot="1" noChangeAspect="1"/>
+          </p:cNvSpPr>
+          <p:nvPr>
+            <p:ph type="sldImg"/>
+          </p:nvPr>
+        </p:nvSpPr>
+        <p:spPr/>
+      </p:sp>
+      <p:sp>
+        <p:nvSpPr>
+          <p:cNvPr id="3" name="Notes Placeholder 2"/>
+          <p:cNvSpPr>
+            <a:spLocks noGrp="1"/>
+          </p:cNvSpPr>
+          <p:nvPr>
+            <p:ph type="body" idx="1"/>
+          </p:nvPr>
+        </p:nvSpPr>
+        <p:spPr/>
+        <p:txBody>
+          <a:bodyPr/>
+          <a:lstStyle/>
+          <a:p>
+            <a:endParaRPr lang="en-US" dirty="0"/>
+          </a:p>
+        </p:txBody>
+      </p:sp>
+      <p:sp>
+        <p:nvSpPr>
+          <p:cNvPr id="4" name="Slide Number Placeholder 3"/>
+          <p:cNvSpPr>
+            <a:spLocks noGrp="1"/>
+          </p:cNvSpPr>
+          <p:nvPr>
+            <p:ph type="sldNum" sz="quarter" idx="10"/>
+          </p:nvPr>
+        </p:nvSpPr>
+        <p:spPr/>
+        <p:txBody>
+          <a:bodyPr/>
+          <a:lstStyle/>
+          <a:p>
+            <a:fld id="{55ECFD52-9CA0-4306-99FC-201DA20A9336}" type="slidenum">
+              <a:rPr lang="en-US" smtClean="0"/>
+              <a:pPr/>
+              <a:t>25</a:t>
+            </a:fld>
+            <a:endParaRPr lang="en-US"/>
+          </a:p>
+        </p:txBody>
+      </p:sp>
+    </p:spTree>
+    <p:extLst>
+      <p:ext uri="{BB962C8B-B14F-4D97-AF65-F5344CB8AC3E}">
+        <p14:creationId xmlns:p14="http://schemas.microsoft.com/office/powerpoint/2010/main" val="2815665696"/>
+      </p:ext>
+    </p:extLst>
+  </p:cSld>
+  <p:clrMapOvr>
+    <a:masterClrMapping/>
+  </p:clrMapOvr>
+</p:notes>
+</file>
+
+<file path=ppt/notesSlides/notesSlide4.xml><?xml version="1.0" encoding="utf-8"?>
+<p:notes xmlns:a="http://schemas.openxmlformats.org/drawingml/2006/main" xmlns:r="http://schemas.openxmlformats.org/officeDocument/2006/relationships" xmlns:p="http://schemas.openxmlformats.org/presentationml/2006/main">
+  <p:cSld>
+    <p:spTree>
+      <p:nvGrpSpPr>
+        <p:cNvPr id="1" name=""/>
+        <p:cNvGrpSpPr/>
+        <p:nvPr/>
+      </p:nvGrpSpPr>
+      <p:grpSpPr>
+        <a:xfrm>
+          <a:off x="0" y="0"/>
+          <a:ext cx="0" cy="0"/>
+          <a:chOff x="0" y="0"/>
+          <a:chExt cx="0" cy="0"/>
+        </a:xfrm>
+      </p:grpSpPr>
+      <p:sp>
+        <p:nvSpPr>
+          <p:cNvPr id="2" name="Slide Image Placeholder 1"/>
+          <p:cNvSpPr>
+            <a:spLocks noGrp="1" noRot="1" noChangeAspect="1"/>
+          </p:cNvSpPr>
+          <p:nvPr>
+            <p:ph type="sldImg"/>
+          </p:nvPr>
+        </p:nvSpPr>
+        <p:spPr/>
+      </p:sp>
+      <p:sp>
+        <p:nvSpPr>
+          <p:cNvPr id="3" name="Notes Placeholder 2"/>
+          <p:cNvSpPr>
+            <a:spLocks noGrp="1"/>
+          </p:cNvSpPr>
+          <p:nvPr>
+            <p:ph type="body" idx="1"/>
+          </p:nvPr>
+        </p:nvSpPr>
+        <p:spPr/>
+        <p:txBody>
+          <a:bodyPr/>
+          <a:lstStyle/>
+          <a:p>
+            <a:endParaRPr lang="en-US" dirty="0"/>
+          </a:p>
+        </p:txBody>
+      </p:sp>
+      <p:sp>
+        <p:nvSpPr>
+          <p:cNvPr id="4" name="Slide Number Placeholder 3"/>
+          <p:cNvSpPr>
+            <a:spLocks noGrp="1"/>
+          </p:cNvSpPr>
+          <p:nvPr>
+            <p:ph type="sldNum" sz="quarter" idx="10"/>
+          </p:nvPr>
+        </p:nvSpPr>
+        <p:spPr/>
+        <p:txBody>
+          <a:bodyPr/>
+          <a:lstStyle/>
+          <a:p>
+            <a:fld id="{55ECFD52-9CA0-4306-99FC-201DA20A9336}" type="slidenum">
+              <a:rPr lang="en-US" smtClean="0"/>
+              <a:pPr/>
+              <a:t>26</a:t>
+            </a:fld>
+            <a:endParaRPr lang="en-US"/>
+          </a:p>
+        </p:txBody>
+      </p:sp>
+    </p:spTree>
+    <p:extLst>
+      <p:ext uri="{BB962C8B-B14F-4D97-AF65-F5344CB8AC3E}">
+        <p14:creationId xmlns:p14="http://schemas.microsoft.com/office/powerpoint/2010/main" val="887489739"/>
+      </p:ext>
+    </p:extLst>
+  </p:cSld>
+  <p:clrMapOvr>
+    <a:masterClrMapping/>
+  </p:clrMapOvr>
+</p:notes>
+</file>
+
+<file path=ppt/notesSlides/notesSlide5.xml><?xml version="1.0" encoding="utf-8"?>
+<p:notes xmlns:a="http://schemas.openxmlformats.org/drawingml/2006/main" xmlns:r="http://schemas.openxmlformats.org/officeDocument/2006/relationships" xmlns:p="http://schemas.openxmlformats.org/presentationml/2006/main">
+  <p:cSld>
+    <p:spTree>
+      <p:nvGrpSpPr>
+        <p:cNvPr id="1" name=""/>
+        <p:cNvGrpSpPr/>
+        <p:nvPr/>
+      </p:nvGrpSpPr>
+      <p:grpSpPr>
+        <a:xfrm>
+          <a:off x="0" y="0"/>
+          <a:ext cx="0" cy="0"/>
+          <a:chOff x="0" y="0"/>
+          <a:chExt cx="0" cy="0"/>
+        </a:xfrm>
+      </p:grpSpPr>
+      <p:sp>
+        <p:nvSpPr>
+          <p:cNvPr id="2" name="Slide Image Placeholder 1"/>
+          <p:cNvSpPr>
+            <a:spLocks noGrp="1" noRot="1" noChangeAspect="1"/>
+          </p:cNvSpPr>
+          <p:nvPr>
+            <p:ph type="sldImg"/>
+          </p:nvPr>
+        </p:nvSpPr>
+        <p:spPr/>
+      </p:sp>
+      <p:sp>
+        <p:nvSpPr>
+          <p:cNvPr id="3" name="Notes Placeholder 2"/>
+          <p:cNvSpPr>
+            <a:spLocks noGrp="1"/>
+          </p:cNvSpPr>
+          <p:nvPr>
+            <p:ph type="body" idx="1"/>
+          </p:nvPr>
+        </p:nvSpPr>
+        <p:spPr/>
+        <p:txBody>
+          <a:bodyPr/>
+          <a:lstStyle/>
+          <a:p>
+            <a:endParaRPr lang="en-US" dirty="0"/>
+          </a:p>
+        </p:txBody>
+      </p:sp>
+      <p:sp>
+        <p:nvSpPr>
+          <p:cNvPr id="4" name="Slide Number Placeholder 3"/>
+          <p:cNvSpPr>
+            <a:spLocks noGrp="1"/>
+          </p:cNvSpPr>
+          <p:nvPr>
+            <p:ph type="sldNum" sz="quarter" idx="10"/>
+          </p:nvPr>
+        </p:nvSpPr>
+        <p:spPr/>
+        <p:txBody>
+          <a:bodyPr/>
+          <a:lstStyle/>
+          <a:p>
+            <a:fld id="{55ECFD52-9CA0-4306-99FC-201DA20A9336}" type="slidenum">
+              <a:rPr lang="en-US" smtClean="0"/>
+              <a:pPr/>
+              <a:t>27</a:t>
+            </a:fld>
+            <a:endParaRPr lang="en-US"/>
+          </a:p>
+        </p:txBody>
+      </p:sp>
+    </p:spTree>
+    <p:extLst>
+      <p:ext uri="{BB962C8B-B14F-4D97-AF65-F5344CB8AC3E}">
+        <p14:creationId xmlns:p14="http://schemas.microsoft.com/office/powerpoint/2010/main" val="3026034570"/>
       </p:ext>
     </p:extLst>
   </p:cSld>
@@ -35624,7 +35973,7 @@
           <a:graphicData uri="http://schemas.openxmlformats.org/presentationml/2006/ole">
             <mc:AlternateContent xmlns:mc="http://schemas.openxmlformats.org/markup-compatibility/2006">
               <mc:Choice xmlns:v="urn:schemas-microsoft-com:vml" Requires="v">
-                <p:oleObj spid="_x0000_s4118" name="Document" r:id="rId4" imgW="5943600" imgH="596900" progId="Word.Document.12">
+                <p:oleObj spid="_x0000_s4124" name="Document" r:id="rId4" imgW="5943600" imgH="596900" progId="Word.Document.12">
                   <p:embed/>
                 </p:oleObj>
               </mc:Choice>
@@ -35842,7 +36191,7 @@
           </a:ln>
           <a:extLst>
             <a:ext uri="{53640926-AAD7-44d8-BBD7-CCE9431645EC}">
-              <a14:shadowObscured xmlns="" xmlns:a14="http://schemas.microsoft.com/office/drawing/2010/main"/>
+              <a14:shadowObscured xmlns:a14="http://schemas.microsoft.com/office/drawing/2010/main" xmlns=""/>
             </a:ext>
           </a:extLst>
         </p:spPr>
@@ -37744,6 +38093,13 @@
               <a:t>Sampling</a:t>
             </a:r>
           </a:p>
+          <a:p>
+            <a:pPr lvl="2"/>
+            <a:r>
+              <a:rPr lang="en-US" dirty="0"/>
+              <a:t>Statistics</a:t>
+            </a:r>
+          </a:p>
         </p:txBody>
       </p:sp>
       <p:sp>
@@ -37864,7 +38220,7 @@
             <a:pPr lvl="1"/>
             <a:r>
               <a:rPr lang="en-US" dirty="0"/>
-              <a:t>Obtain real data</a:t>
+              <a:t>Obtain training data</a:t>
             </a:r>
           </a:p>
           <a:p>
@@ -37989,8 +38345,8 @@
         </p:nvSpPr>
         <p:spPr>
           <a:xfrm>
-            <a:off x="3288011" y="3170354"/>
-            <a:ext cx="2800555" cy="400110"/>
+            <a:off x="2643821" y="2502000"/>
+            <a:ext cx="2800555" cy="338554"/>
           </a:xfrm>
           <a:prstGeom prst="rect">
             <a:avLst/>
@@ -38004,12 +38360,12 @@
           <a:lstStyle/>
           <a:p>
             <a:r>
-              <a:rPr lang="en-US" sz="2000" dirty="0" err="1">
+              <a:rPr lang="en-US" sz="1600" dirty="0" err="1">
                 <a:latin typeface="Lucida Console" panose="020B0609040504020204" pitchFamily="49" charset="0"/>
               </a:rPr>
               <a:t>train_arma.xml</a:t>
             </a:r>
-            <a:endParaRPr lang="en-US" sz="2000" dirty="0">
+            <a:endParaRPr lang="en-US" sz="1600" dirty="0">
               <a:latin typeface="Lucida Console" panose="020B0609040504020204" pitchFamily="49" charset="0"/>
             </a:endParaRPr>
           </a:p>
@@ -38029,8 +38385,8 @@
         </p:nvSpPr>
         <p:spPr>
           <a:xfrm>
-            <a:off x="3354834" y="4850101"/>
-            <a:ext cx="2800555" cy="400110"/>
+            <a:off x="2911774" y="4459679"/>
+            <a:ext cx="2800555" cy="338554"/>
           </a:xfrm>
           <a:prstGeom prst="rect">
             <a:avLst/>
@@ -38044,12 +38400,12 @@
           <a:lstStyle/>
           <a:p>
             <a:r>
-              <a:rPr lang="en-US" sz="2000" dirty="0" err="1">
+              <a:rPr lang="en-US" sz="1600" dirty="0" err="1">
                 <a:latin typeface="Lucida Console" panose="020B0609040504020204" pitchFamily="49" charset="0"/>
               </a:rPr>
               <a:t>sample.xml</a:t>
             </a:r>
-            <a:endParaRPr lang="en-US" sz="2000" dirty="0">
+            <a:endParaRPr lang="en-US" sz="1600" dirty="0">
               <a:latin typeface="Lucida Console" panose="020B0609040504020204" pitchFamily="49" charset="0"/>
             </a:endParaRPr>
           </a:p>
@@ -38095,6 +38451,107 @@
           </a:ln>
         </p:spPr>
       </p:pic>
+      <p:sp>
+        <p:nvSpPr>
+          <p:cNvPr id="9" name="TextBox 8">
+            <a:extLst>
+              <a:ext uri="{FF2B5EF4-FFF2-40B4-BE49-F238E27FC236}">
+                <a16:creationId xmlns:a16="http://schemas.microsoft.com/office/drawing/2014/main" id="{3706F819-CB4F-804D-AB7D-B501F7181AC4}"/>
+              </a:ext>
+            </a:extLst>
+          </p:cNvPr>
+          <p:cNvSpPr txBox="1"/>
+          <p:nvPr/>
+        </p:nvSpPr>
+        <p:spPr>
+          <a:xfrm>
+            <a:off x="2151451" y="6242392"/>
+            <a:ext cx="6320961" cy="461665"/>
+          </a:xfrm>
+          <a:prstGeom prst="rect">
+            <a:avLst/>
+          </a:prstGeom>
+          <a:solidFill>
+            <a:schemeClr val="accent5"/>
+          </a:solidFill>
+        </p:spPr>
+        <p:txBody>
+          <a:bodyPr wrap="none" rtlCol="0">
+            <a:spAutoFit/>
+          </a:bodyPr>
+          <a:lstStyle/>
+          <a:p>
+            <a:pPr algn="ctr"/>
+            <a:r>
+              <a:rPr lang="en-US" dirty="0">
+                <a:latin typeface="Lucida Console" panose="020B0609040504020204" pitchFamily="49" charset="0"/>
+              </a:rPr>
+              <a:t>raven/docs/workshop/ARMA/exercise</a:t>
+            </a:r>
+          </a:p>
+        </p:txBody>
+      </p:sp>
+      <p:sp>
+        <p:nvSpPr>
+          <p:cNvPr id="10" name="TextBox 9">
+            <a:extLst>
+              <a:ext uri="{FF2B5EF4-FFF2-40B4-BE49-F238E27FC236}">
+                <a16:creationId xmlns:a16="http://schemas.microsoft.com/office/drawing/2014/main" id="{E1A990D0-A3D5-164F-9524-AC88DDA1D132}"/>
+              </a:ext>
+            </a:extLst>
+          </p:cNvPr>
+          <p:cNvSpPr txBox="1"/>
+          <p:nvPr/>
+        </p:nvSpPr>
+        <p:spPr>
+          <a:xfrm>
+            <a:off x="2523347" y="5352902"/>
+            <a:ext cx="5577168" cy="830997"/>
+          </a:xfrm>
+          <a:prstGeom prst="rect">
+            <a:avLst/>
+          </a:prstGeom>
+          <a:solidFill>
+            <a:schemeClr val="accent5"/>
+          </a:solidFill>
+        </p:spPr>
+        <p:txBody>
+          <a:bodyPr wrap="none" rtlCol="0">
+            <a:spAutoFit/>
+          </a:bodyPr>
+          <a:lstStyle/>
+          <a:p>
+            <a:pPr algn="ctr"/>
+            <a:r>
+              <a:rPr lang="en-US" dirty="0" err="1">
+                <a:latin typeface="Lucida Console" panose="020B0609040504020204" pitchFamily="49" charset="0"/>
+              </a:rPr>
+              <a:t>git</a:t>
+            </a:r>
+            <a:r>
+              <a:rPr lang="en-US" dirty="0">
+                <a:latin typeface="Lucida Console" panose="020B0609040504020204" pitchFamily="49" charset="0"/>
+              </a:rPr>
+              <a:t> pull</a:t>
+            </a:r>
+          </a:p>
+          <a:p>
+            <a:pPr algn="ctr"/>
+            <a:r>
+              <a:rPr lang="en-US" dirty="0" err="1">
+                <a:latin typeface="Lucida Console" panose="020B0609040504020204" pitchFamily="49" charset="0"/>
+              </a:rPr>
+              <a:t>git</a:t>
+            </a:r>
+            <a:r>
+              <a:rPr lang="en-US" dirty="0">
+                <a:latin typeface="Lucida Console" panose="020B0609040504020204" pitchFamily="49" charset="0"/>
+              </a:rPr>
+              <a:t> checkout workshop_201803 </a:t>
+            </a:r>
+          </a:p>
+        </p:txBody>
+      </p:sp>
     </p:spTree>
     <p:extLst>
       <p:ext uri="{BB962C8B-B14F-4D97-AF65-F5344CB8AC3E}">
@@ -38105,6 +38562,128 @@
   <p:clrMapOvr>
     <a:masterClrMapping/>
   </p:clrMapOvr>
+  <p:timing>
+    <p:tnLst>
+      <p:par>
+        <p:cTn id="1" dur="indefinite" restart="never" nodeType="tmRoot">
+          <p:childTnLst>
+            <p:seq concurrent="1" nextAc="seek">
+              <p:cTn id="2" dur="indefinite" nodeType="mainSeq">
+                <p:childTnLst>
+                  <p:par>
+                    <p:cTn id="3" fill="hold">
+                      <p:stCondLst>
+                        <p:cond delay="indefinite"/>
+                      </p:stCondLst>
+                      <p:childTnLst>
+                        <p:par>
+                          <p:cTn id="4" fill="hold">
+                            <p:stCondLst>
+                              <p:cond delay="0"/>
+                            </p:stCondLst>
+                            <p:childTnLst>
+                              <p:par>
+                                <p:cTn id="5" presetID="5" presetClass="entr" presetSubtype="10" fill="hold" grpId="0" nodeType="clickEffect">
+                                  <p:stCondLst>
+                                    <p:cond delay="0"/>
+                                  </p:stCondLst>
+                                  <p:childTnLst>
+                                    <p:set>
+                                      <p:cBhvr>
+                                        <p:cTn id="6" dur="1" fill="hold">
+                                          <p:stCondLst>
+                                            <p:cond delay="0"/>
+                                          </p:stCondLst>
+                                        </p:cTn>
+                                        <p:tgtEl>
+                                          <p:spTgt spid="10"/>
+                                        </p:tgtEl>
+                                        <p:attrNameLst>
+                                          <p:attrName>style.visibility</p:attrName>
+                                        </p:attrNameLst>
+                                      </p:cBhvr>
+                                      <p:to>
+                                        <p:strVal val="visible"/>
+                                      </p:to>
+                                    </p:set>
+                                    <p:animEffect transition="in" filter="checkerboard(across)">
+                                      <p:cBhvr>
+                                        <p:cTn id="7" dur="500"/>
+                                        <p:tgtEl>
+                                          <p:spTgt spid="10"/>
+                                        </p:tgtEl>
+                                      </p:cBhvr>
+                                    </p:animEffect>
+                                  </p:childTnLst>
+                                </p:cTn>
+                              </p:par>
+                              <p:par>
+                                <p:cTn id="8" presetID="5" presetClass="entr" presetSubtype="10" fill="hold" grpId="0" nodeType="withEffect">
+                                  <p:stCondLst>
+                                    <p:cond delay="0"/>
+                                  </p:stCondLst>
+                                  <p:childTnLst>
+                                    <p:set>
+                                      <p:cBhvr>
+                                        <p:cTn id="9" dur="1" fill="hold">
+                                          <p:stCondLst>
+                                            <p:cond delay="0"/>
+                                          </p:stCondLst>
+                                        </p:cTn>
+                                        <p:tgtEl>
+                                          <p:spTgt spid="9"/>
+                                        </p:tgtEl>
+                                        <p:attrNameLst>
+                                          <p:attrName>style.visibility</p:attrName>
+                                        </p:attrNameLst>
+                                      </p:cBhvr>
+                                      <p:to>
+                                        <p:strVal val="visible"/>
+                                      </p:to>
+                                    </p:set>
+                                    <p:animEffect transition="in" filter="checkerboard(across)">
+                                      <p:cBhvr>
+                                        <p:cTn id="10" dur="500"/>
+                                        <p:tgtEl>
+                                          <p:spTgt spid="9"/>
+                                        </p:tgtEl>
+                                      </p:cBhvr>
+                                    </p:animEffect>
+                                  </p:childTnLst>
+                                </p:cTn>
+                              </p:par>
+                            </p:childTnLst>
+                          </p:cTn>
+                        </p:par>
+                      </p:childTnLst>
+                    </p:cTn>
+                  </p:par>
+                </p:childTnLst>
+              </p:cTn>
+              <p:prevCondLst>
+                <p:cond evt="onPrev" delay="0">
+                  <p:tgtEl>
+                    <p:sldTgt/>
+                  </p:tgtEl>
+                </p:cond>
+              </p:prevCondLst>
+              <p:nextCondLst>
+                <p:cond evt="onNext" delay="0">
+                  <p:tgtEl>
+                    <p:sldTgt/>
+                  </p:tgtEl>
+                </p:cond>
+              </p:nextCondLst>
+            </p:seq>
+          </p:childTnLst>
+        </p:cTn>
+      </p:par>
+    </p:tnLst>
+    <p:bldLst>
+      <p:bldP spid="9" grpId="0" animBg="1"/>
+      <p:bldP spid="10" grpId="0" animBg="1"/>
+    </p:bldLst>
+  </p:timing>
 </p:sld>
 </file>
 
@@ -38285,6 +38864,4265 @@
     <p:extLst>
       <p:ext uri="{BB962C8B-B14F-4D97-AF65-F5344CB8AC3E}">
         <p14:creationId xmlns:p14="http://schemas.microsoft.com/office/powerpoint/2010/main" val="2792702676"/>
+      </p:ext>
+    </p:extLst>
+  </p:cSld>
+  <p:clrMapOvr>
+    <a:masterClrMapping/>
+  </p:clrMapOvr>
+</p:sld>
+</file>
+
+<file path=ppt/slides/slide20.xml><?xml version="1.0" encoding="utf-8"?>
+<p:sld xmlns:a="http://schemas.openxmlformats.org/drawingml/2006/main" xmlns:r="http://schemas.openxmlformats.org/officeDocument/2006/relationships" xmlns:p="http://schemas.openxmlformats.org/presentationml/2006/main">
+  <p:cSld>
+    <p:spTree>
+      <p:nvGrpSpPr>
+        <p:cNvPr id="1" name=""/>
+        <p:cNvGrpSpPr/>
+        <p:nvPr/>
+      </p:nvGrpSpPr>
+      <p:grpSpPr>
+        <a:xfrm>
+          <a:off x="0" y="0"/>
+          <a:ext cx="0" cy="0"/>
+          <a:chOff x="0" y="0"/>
+          <a:chExt cx="0" cy="0"/>
+        </a:xfrm>
+      </p:grpSpPr>
+      <p:sp>
+        <p:nvSpPr>
+          <p:cNvPr id="2" name="Title 1">
+            <a:extLst>
+              <a:ext uri="{FF2B5EF4-FFF2-40B4-BE49-F238E27FC236}">
+                <a16:creationId xmlns:a16="http://schemas.microsoft.com/office/drawing/2014/main" id="{948ACC61-B665-C340-A494-BC13CD4D7548}"/>
+              </a:ext>
+            </a:extLst>
+          </p:cNvPr>
+          <p:cNvSpPr>
+            <a:spLocks noGrp="1"/>
+          </p:cNvSpPr>
+          <p:nvPr>
+            <p:ph type="title"/>
+          </p:nvPr>
+        </p:nvSpPr>
+        <p:spPr/>
+        <p:txBody>
+          <a:bodyPr/>
+          <a:lstStyle/>
+          <a:p>
+            <a:r>
+              <a:rPr lang="en-US" dirty="0"/>
+              <a:t>Hands-On: Obtaining Real Data</a:t>
+            </a:r>
+          </a:p>
+        </p:txBody>
+      </p:sp>
+      <p:sp>
+        <p:nvSpPr>
+          <p:cNvPr id="3" name="Content Placeholder 2">
+            <a:extLst>
+              <a:ext uri="{FF2B5EF4-FFF2-40B4-BE49-F238E27FC236}">
+                <a16:creationId xmlns:a16="http://schemas.microsoft.com/office/drawing/2014/main" id="{DCA9CDD8-268E-FD42-B9AB-6B63C98F85B5}"/>
+              </a:ext>
+            </a:extLst>
+          </p:cNvPr>
+          <p:cNvSpPr>
+            <a:spLocks noGrp="1"/>
+          </p:cNvSpPr>
+          <p:nvPr>
+            <p:ph idx="1"/>
+          </p:nvPr>
+        </p:nvSpPr>
+        <p:spPr/>
+        <p:txBody>
+          <a:bodyPr/>
+          <a:lstStyle/>
+          <a:p>
+            <a:r>
+              <a:rPr lang="en-US" dirty="0"/>
+              <a:t>Find an online source of data (e.g. NREL)</a:t>
+            </a:r>
+          </a:p>
+          <a:p>
+            <a:r>
+              <a:rPr lang="en-US" dirty="0"/>
+              <a:t>Collect data into RAVEN-friendly form</a:t>
+            </a:r>
+          </a:p>
+          <a:p>
+            <a:pPr lvl="1"/>
+            <a:r>
+              <a:rPr lang="en-US" dirty="0"/>
+              <a:t>History set of linked CSVs</a:t>
+            </a:r>
+          </a:p>
+          <a:p>
+            <a:pPr lvl="1"/>
+            <a:r>
+              <a:rPr lang="en-US" dirty="0"/>
+              <a:t>Must have consistent time step throughout</a:t>
+            </a:r>
+          </a:p>
+          <a:p>
+            <a:pPr lvl="1"/>
+            <a:r>
+              <a:rPr lang="en-US" dirty="0"/>
+              <a:t>No time steps can be missing</a:t>
+            </a:r>
+          </a:p>
+          <a:p>
+            <a:pPr lvl="1"/>
+            <a:r>
+              <a:rPr lang="en-US" dirty="0"/>
+              <a:t>Each period must be identical in length</a:t>
+            </a:r>
+          </a:p>
+          <a:p>
+            <a:pPr lvl="1"/>
+            <a:r>
+              <a:rPr lang="en-US" dirty="0"/>
+              <a:t>Each period must have identical time stamps</a:t>
+            </a:r>
+          </a:p>
+          <a:p>
+            <a:pPr lvl="1"/>
+            <a:endParaRPr lang="en-US" dirty="0"/>
+          </a:p>
+          <a:p>
+            <a:pPr lvl="1"/>
+            <a:r>
+              <a:rPr lang="en-US" dirty="0"/>
+              <a:t>Example script:</a:t>
+            </a:r>
+          </a:p>
+          <a:p>
+            <a:pPr lvl="1"/>
+            <a:r>
+              <a:rPr lang="en-US" dirty="0"/>
+              <a:t>Example data (wind speeds near Idaho Falls from NREL):</a:t>
+            </a:r>
+          </a:p>
+          <a:p>
+            <a:pPr lvl="1"/>
+            <a:endParaRPr lang="en-US" dirty="0"/>
+          </a:p>
+          <a:p>
+            <a:pPr lvl="1"/>
+            <a:r>
+              <a:rPr lang="en-US" dirty="0"/>
+              <a:t>Example RAVEN-compatible data:</a:t>
+            </a:r>
+          </a:p>
+        </p:txBody>
+      </p:sp>
+      <p:sp>
+        <p:nvSpPr>
+          <p:cNvPr id="5" name="Slide Number Placeholder 4">
+            <a:extLst>
+              <a:ext uri="{FF2B5EF4-FFF2-40B4-BE49-F238E27FC236}">
+                <a16:creationId xmlns:a16="http://schemas.microsoft.com/office/drawing/2014/main" id="{26822A84-07B8-7141-B715-6D4B1841CE7B}"/>
+              </a:ext>
+            </a:extLst>
+          </p:cNvPr>
+          <p:cNvSpPr>
+            <a:spLocks noGrp="1"/>
+          </p:cNvSpPr>
+          <p:nvPr>
+            <p:ph type="sldNum" sz="quarter" idx="11"/>
+          </p:nvPr>
+        </p:nvSpPr>
+        <p:spPr/>
+        <p:txBody>
+          <a:bodyPr/>
+          <a:lstStyle/>
+          <a:p>
+            <a:fld id="{4B4332F1-BAE3-4172-AA6D-91F763B329EF}" type="slidenum">
+              <a:rPr lang="en-US" smtClean="0"/>
+              <a:pPr/>
+              <a:t>19</a:t>
+            </a:fld>
+            <a:endParaRPr lang="en-US"/>
+          </a:p>
+        </p:txBody>
+      </p:sp>
+      <p:sp>
+        <p:nvSpPr>
+          <p:cNvPr id="6" name="TextBox 5">
+            <a:extLst>
+              <a:ext uri="{FF2B5EF4-FFF2-40B4-BE49-F238E27FC236}">
+                <a16:creationId xmlns:a16="http://schemas.microsoft.com/office/drawing/2014/main" id="{3F398C7C-25F3-BC43-B924-F3DA847DF16F}"/>
+              </a:ext>
+            </a:extLst>
+          </p:cNvPr>
+          <p:cNvSpPr txBox="1"/>
+          <p:nvPr/>
+        </p:nvSpPr>
+        <p:spPr>
+          <a:xfrm>
+            <a:off x="2911187" y="4199607"/>
+            <a:ext cx="5232523" cy="307777"/>
+          </a:xfrm>
+          <a:prstGeom prst="rect">
+            <a:avLst/>
+          </a:prstGeom>
+          <a:solidFill>
+            <a:schemeClr val="accent5"/>
+          </a:solidFill>
+        </p:spPr>
+        <p:txBody>
+          <a:bodyPr wrap="none" rtlCol="0">
+            <a:spAutoFit/>
+          </a:bodyPr>
+          <a:lstStyle/>
+          <a:p>
+            <a:r>
+              <a:rPr lang="en-US" sz="1400" dirty="0">
+                <a:latin typeface="Lucida Console" panose="020B0609040504020204" pitchFamily="49" charset="0"/>
+              </a:rPr>
+              <a:t>raven/docs/workshop/ARMA/</a:t>
+            </a:r>
+            <a:r>
+              <a:rPr lang="en-US" sz="1400" dirty="0" err="1">
+                <a:latin typeface="Lucida Console" panose="020B0609040504020204" pitchFamily="49" charset="0"/>
+              </a:rPr>
+              <a:t>raw_data</a:t>
+            </a:r>
+            <a:r>
+              <a:rPr lang="en-US" sz="1400" dirty="0">
+                <a:latin typeface="Lucida Console" panose="020B0609040504020204" pitchFamily="49" charset="0"/>
+              </a:rPr>
+              <a:t>/</a:t>
+            </a:r>
+            <a:r>
+              <a:rPr lang="en-US" sz="1400" dirty="0" err="1">
+                <a:latin typeface="Lucida Console" panose="020B0609040504020204" pitchFamily="49" charset="0"/>
+              </a:rPr>
+              <a:t>parse_nrel.py</a:t>
+            </a:r>
+            <a:endParaRPr lang="en-US" sz="1400" dirty="0">
+              <a:latin typeface="Lucida Console" panose="020B0609040504020204" pitchFamily="49" charset="0"/>
+            </a:endParaRPr>
+          </a:p>
+        </p:txBody>
+      </p:sp>
+      <p:sp>
+        <p:nvSpPr>
+          <p:cNvPr id="7" name="TextBox 6">
+            <a:extLst>
+              <a:ext uri="{FF2B5EF4-FFF2-40B4-BE49-F238E27FC236}">
+                <a16:creationId xmlns:a16="http://schemas.microsoft.com/office/drawing/2014/main" id="{71EAF208-8826-EA48-8603-448EC539F2CF}"/>
+              </a:ext>
+            </a:extLst>
+          </p:cNvPr>
+          <p:cNvSpPr txBox="1"/>
+          <p:nvPr/>
+        </p:nvSpPr>
+        <p:spPr>
+          <a:xfrm>
+            <a:off x="2911186" y="4853520"/>
+            <a:ext cx="5232523" cy="307777"/>
+          </a:xfrm>
+          <a:prstGeom prst="rect">
+            <a:avLst/>
+          </a:prstGeom>
+          <a:solidFill>
+            <a:schemeClr val="accent5"/>
+          </a:solidFill>
+        </p:spPr>
+        <p:txBody>
+          <a:bodyPr wrap="none" rtlCol="0">
+            <a:spAutoFit/>
+          </a:bodyPr>
+          <a:lstStyle/>
+          <a:p>
+            <a:r>
+              <a:rPr lang="en-US" sz="1400" dirty="0">
+                <a:latin typeface="Lucida Console" panose="020B0609040504020204" pitchFamily="49" charset="0"/>
+              </a:rPr>
+              <a:t>raven/docs/workshop/ARMA/</a:t>
+            </a:r>
+            <a:r>
+              <a:rPr lang="en-US" sz="1400" dirty="0" err="1">
+                <a:latin typeface="Lucida Console" panose="020B0609040504020204" pitchFamily="49" charset="0"/>
+              </a:rPr>
+              <a:t>raw_data</a:t>
+            </a:r>
+            <a:r>
+              <a:rPr lang="en-US" sz="1400" dirty="0">
+                <a:latin typeface="Lucida Console" panose="020B0609040504020204" pitchFamily="49" charset="0"/>
+              </a:rPr>
+              <a:t>/101645-*.csv</a:t>
+            </a:r>
+          </a:p>
+        </p:txBody>
+      </p:sp>
+      <p:sp>
+        <p:nvSpPr>
+          <p:cNvPr id="11" name="TextBox 10">
+            <a:extLst>
+              <a:ext uri="{FF2B5EF4-FFF2-40B4-BE49-F238E27FC236}">
+                <a16:creationId xmlns:a16="http://schemas.microsoft.com/office/drawing/2014/main" id="{53FE1F0E-58D3-3E45-997B-C011A4DC6DE6}"/>
+              </a:ext>
+            </a:extLst>
+          </p:cNvPr>
+          <p:cNvSpPr txBox="1"/>
+          <p:nvPr/>
+        </p:nvSpPr>
+        <p:spPr>
+          <a:xfrm>
+            <a:off x="2911185" y="5507433"/>
+            <a:ext cx="5232523" cy="307777"/>
+          </a:xfrm>
+          <a:prstGeom prst="rect">
+            <a:avLst/>
+          </a:prstGeom>
+          <a:solidFill>
+            <a:schemeClr val="accent5"/>
+          </a:solidFill>
+        </p:spPr>
+        <p:txBody>
+          <a:bodyPr wrap="none" rtlCol="0">
+            <a:spAutoFit/>
+          </a:bodyPr>
+          <a:lstStyle/>
+          <a:p>
+            <a:r>
+              <a:rPr lang="en-US" sz="1400" dirty="0">
+                <a:latin typeface="Lucida Console" panose="020B0609040504020204" pitchFamily="49" charset="0"/>
+              </a:rPr>
+              <a:t>raven/docs/workshop/ARMA/</a:t>
+            </a:r>
+            <a:r>
+              <a:rPr lang="en-US" sz="1400" dirty="0" err="1">
+                <a:latin typeface="Lucida Console" panose="020B0609040504020204" pitchFamily="49" charset="0"/>
+              </a:rPr>
+              <a:t>raw_data</a:t>
+            </a:r>
+            <a:r>
+              <a:rPr lang="en-US" sz="1400" dirty="0">
+                <a:latin typeface="Lucida Console" panose="020B0609040504020204" pitchFamily="49" charset="0"/>
+              </a:rPr>
+              <a:t>/</a:t>
+            </a:r>
+            <a:r>
+              <a:rPr lang="en-US" sz="1400" dirty="0" err="1">
+                <a:latin typeface="Lucida Console" panose="020B0609040504020204" pitchFamily="49" charset="0"/>
+              </a:rPr>
+              <a:t>raw_data</a:t>
+            </a:r>
+            <a:r>
+              <a:rPr lang="en-US" sz="1400" dirty="0">
+                <a:latin typeface="Lucida Console" panose="020B0609040504020204" pitchFamily="49" charset="0"/>
+              </a:rPr>
+              <a:t>*.csv</a:t>
+            </a:r>
+          </a:p>
+        </p:txBody>
+      </p:sp>
+    </p:spTree>
+    <p:extLst>
+      <p:ext uri="{BB962C8B-B14F-4D97-AF65-F5344CB8AC3E}">
+        <p14:creationId xmlns:p14="http://schemas.microsoft.com/office/powerpoint/2010/main" val="1861676614"/>
+      </p:ext>
+    </p:extLst>
+  </p:cSld>
+  <p:clrMapOvr>
+    <a:masterClrMapping/>
+  </p:clrMapOvr>
+</p:sld>
+</file>
+
+<file path=ppt/slides/slide21.xml><?xml version="1.0" encoding="utf-8"?>
+<p:sld xmlns:a="http://schemas.openxmlformats.org/drawingml/2006/main" xmlns:r="http://schemas.openxmlformats.org/officeDocument/2006/relationships" xmlns:p="http://schemas.openxmlformats.org/presentationml/2006/main">
+  <p:cSld>
+    <p:spTree>
+      <p:nvGrpSpPr>
+        <p:cNvPr id="1" name=""/>
+        <p:cNvGrpSpPr/>
+        <p:nvPr/>
+      </p:nvGrpSpPr>
+      <p:grpSpPr>
+        <a:xfrm>
+          <a:off x="0" y="0"/>
+          <a:ext cx="0" cy="0"/>
+          <a:chOff x="0" y="0"/>
+          <a:chExt cx="0" cy="0"/>
+        </a:xfrm>
+      </p:grpSpPr>
+      <p:sp>
+        <p:nvSpPr>
+          <p:cNvPr id="2" name="Title 1">
+            <a:extLst>
+              <a:ext uri="{FF2B5EF4-FFF2-40B4-BE49-F238E27FC236}">
+                <a16:creationId xmlns:a16="http://schemas.microsoft.com/office/drawing/2014/main" id="{948ACC61-B665-C340-A494-BC13CD4D7548}"/>
+              </a:ext>
+            </a:extLst>
+          </p:cNvPr>
+          <p:cNvSpPr>
+            <a:spLocks noGrp="1"/>
+          </p:cNvSpPr>
+          <p:nvPr>
+            <p:ph type="title"/>
+          </p:nvPr>
+        </p:nvSpPr>
+        <p:spPr/>
+        <p:txBody>
+          <a:bodyPr/>
+          <a:lstStyle/>
+          <a:p>
+            <a:r>
+              <a:rPr lang="en-US" dirty="0"/>
+              <a:t>Hands-On: Training ARMA Walkthrough</a:t>
+            </a:r>
+            <a:endParaRPr lang="en-US" i="0" dirty="0">
+              <a:latin typeface="Lucida Console" panose="020B0609040504020204" pitchFamily="49" charset="0"/>
+            </a:endParaRPr>
+          </a:p>
+        </p:txBody>
+      </p:sp>
+      <p:sp>
+        <p:nvSpPr>
+          <p:cNvPr id="3" name="Content Placeholder 2">
+            <a:extLst>
+              <a:ext uri="{FF2B5EF4-FFF2-40B4-BE49-F238E27FC236}">
+                <a16:creationId xmlns:a16="http://schemas.microsoft.com/office/drawing/2014/main" id="{DCA9CDD8-268E-FD42-B9AB-6B63C98F85B5}"/>
+              </a:ext>
+            </a:extLst>
+          </p:cNvPr>
+          <p:cNvSpPr>
+            <a:spLocks noGrp="1"/>
+          </p:cNvSpPr>
+          <p:nvPr>
+            <p:ph idx="1"/>
+          </p:nvPr>
+        </p:nvSpPr>
+        <p:spPr/>
+        <p:txBody>
+          <a:bodyPr/>
+          <a:lstStyle/>
+          <a:p>
+            <a:endParaRPr lang="en-US" dirty="0"/>
+          </a:p>
+          <a:p>
+            <a:endParaRPr lang="en-US" dirty="0"/>
+          </a:p>
+          <a:p>
+            <a:r>
+              <a:rPr lang="en-US" dirty="0"/>
+              <a:t>Read in data</a:t>
+            </a:r>
+          </a:p>
+          <a:p>
+            <a:endParaRPr lang="en-US" dirty="0"/>
+          </a:p>
+          <a:p>
+            <a:r>
+              <a:rPr lang="en-US" dirty="0" err="1"/>
+              <a:t>TypicalHistory</a:t>
+            </a:r>
+            <a:r>
+              <a:rPr lang="en-US" dirty="0"/>
+              <a:t> Preprocess</a:t>
+            </a:r>
+          </a:p>
+          <a:p>
+            <a:endParaRPr lang="en-US" dirty="0"/>
+          </a:p>
+          <a:p>
+            <a:r>
+              <a:rPr lang="en-US" dirty="0"/>
+              <a:t>Train ARMA</a:t>
+            </a:r>
+          </a:p>
+          <a:p>
+            <a:endParaRPr lang="en-US" dirty="0"/>
+          </a:p>
+          <a:p>
+            <a:r>
+              <a:rPr lang="en-US" dirty="0"/>
+              <a:t>Serialize ARMA</a:t>
+            </a:r>
+          </a:p>
+        </p:txBody>
+      </p:sp>
+      <p:sp>
+        <p:nvSpPr>
+          <p:cNvPr id="5" name="Slide Number Placeholder 4">
+            <a:extLst>
+              <a:ext uri="{FF2B5EF4-FFF2-40B4-BE49-F238E27FC236}">
+                <a16:creationId xmlns:a16="http://schemas.microsoft.com/office/drawing/2014/main" id="{26822A84-07B8-7141-B715-6D4B1841CE7B}"/>
+              </a:ext>
+            </a:extLst>
+          </p:cNvPr>
+          <p:cNvSpPr>
+            <a:spLocks noGrp="1"/>
+          </p:cNvSpPr>
+          <p:nvPr>
+            <p:ph type="sldNum" sz="quarter" idx="11"/>
+          </p:nvPr>
+        </p:nvSpPr>
+        <p:spPr/>
+        <p:txBody>
+          <a:bodyPr/>
+          <a:lstStyle/>
+          <a:p>
+            <a:fld id="{4B4332F1-BAE3-4172-AA6D-91F763B329EF}" type="slidenum">
+              <a:rPr lang="en-US" smtClean="0"/>
+              <a:pPr/>
+              <a:t>20</a:t>
+            </a:fld>
+            <a:endParaRPr lang="en-US"/>
+          </a:p>
+        </p:txBody>
+      </p:sp>
+      <p:sp>
+        <p:nvSpPr>
+          <p:cNvPr id="6" name="TextBox 5">
+            <a:extLst>
+              <a:ext uri="{FF2B5EF4-FFF2-40B4-BE49-F238E27FC236}">
+                <a16:creationId xmlns:a16="http://schemas.microsoft.com/office/drawing/2014/main" id="{3F398C7C-25F3-BC43-B924-F3DA847DF16F}"/>
+              </a:ext>
+            </a:extLst>
+          </p:cNvPr>
+          <p:cNvSpPr txBox="1"/>
+          <p:nvPr/>
+        </p:nvSpPr>
+        <p:spPr>
+          <a:xfrm>
+            <a:off x="1131803" y="1538060"/>
+            <a:ext cx="6878806" cy="369332"/>
+          </a:xfrm>
+          <a:prstGeom prst="rect">
+            <a:avLst/>
+          </a:prstGeom>
+          <a:solidFill>
+            <a:schemeClr val="accent5"/>
+          </a:solidFill>
+        </p:spPr>
+        <p:txBody>
+          <a:bodyPr wrap="none" rtlCol="0">
+            <a:spAutoFit/>
+          </a:bodyPr>
+          <a:lstStyle/>
+          <a:p>
+            <a:r>
+              <a:rPr lang="en-US" sz="1800" dirty="0">
+                <a:latin typeface="Lucida Console" panose="020B0609040504020204" pitchFamily="49" charset="0"/>
+              </a:rPr>
+              <a:t>raven/docs/workshop/ARMA/exercise/</a:t>
+            </a:r>
+            <a:r>
+              <a:rPr lang="en-US" sz="1800" dirty="0" err="1">
+                <a:latin typeface="Lucida Console" panose="020B0609040504020204" pitchFamily="49" charset="0"/>
+              </a:rPr>
+              <a:t>train_arma.xml</a:t>
+            </a:r>
+            <a:endParaRPr lang="en-US" sz="1800" dirty="0">
+              <a:latin typeface="Lucida Console" panose="020B0609040504020204" pitchFamily="49" charset="0"/>
+            </a:endParaRPr>
+          </a:p>
+        </p:txBody>
+      </p:sp>
+      <p:sp>
+        <p:nvSpPr>
+          <p:cNvPr id="4" name="TextBox 3">
+            <a:extLst>
+              <a:ext uri="{FF2B5EF4-FFF2-40B4-BE49-F238E27FC236}">
+                <a16:creationId xmlns:a16="http://schemas.microsoft.com/office/drawing/2014/main" id="{C15B48E5-DC1E-014B-999C-5C9DFF2BD970}"/>
+              </a:ext>
+            </a:extLst>
+          </p:cNvPr>
+          <p:cNvSpPr txBox="1"/>
+          <p:nvPr/>
+        </p:nvSpPr>
+        <p:spPr>
+          <a:xfrm>
+            <a:off x="3909915" y="2342736"/>
+            <a:ext cx="3810659" cy="369332"/>
+          </a:xfrm>
+          <a:prstGeom prst="rect">
+            <a:avLst/>
+          </a:prstGeom>
+          <a:solidFill>
+            <a:schemeClr val="tx1"/>
+          </a:solidFill>
+        </p:spPr>
+        <p:txBody>
+          <a:bodyPr wrap="none" rtlCol="0">
+            <a:spAutoFit/>
+          </a:bodyPr>
+          <a:lstStyle/>
+          <a:p>
+            <a:r>
+              <a:rPr lang="en-US" sz="1800" b="1" dirty="0">
+                <a:solidFill>
+                  <a:schemeClr val="accent1"/>
+                </a:solidFill>
+                <a:latin typeface="Lucida Console" panose="020B0609040504020204" pitchFamily="49" charset="0"/>
+              </a:rPr>
+              <a:t>&lt;</a:t>
+            </a:r>
+            <a:r>
+              <a:rPr lang="en-US" sz="1800" b="1" dirty="0" err="1">
+                <a:solidFill>
+                  <a:schemeClr val="accent1"/>
+                </a:solidFill>
+                <a:latin typeface="Lucida Console" panose="020B0609040504020204" pitchFamily="49" charset="0"/>
+              </a:rPr>
+              <a:t>IOStep</a:t>
+            </a:r>
+            <a:r>
+              <a:rPr lang="en-US" sz="1800" b="1" dirty="0">
+                <a:solidFill>
+                  <a:schemeClr val="accent1"/>
+                </a:solidFill>
+                <a:latin typeface="Lucida Console" panose="020B0609040504020204" pitchFamily="49" charset="0"/>
+              </a:rPr>
+              <a:t> name</a:t>
+            </a:r>
+            <a:r>
+              <a:rPr lang="en-US" sz="1800" b="1" dirty="0">
+                <a:solidFill>
+                  <a:schemeClr val="accent1"/>
+                </a:solidFill>
+                <a:latin typeface="Monaco" pitchFamily="2" charset="0"/>
+              </a:rPr>
+              <a:t>=“</a:t>
+            </a:r>
+            <a:r>
+              <a:rPr lang="en-US" sz="1800" b="1" dirty="0" err="1">
+                <a:solidFill>
+                  <a:schemeClr val="accent1"/>
+                </a:solidFill>
+                <a:latin typeface="Lucida Console" panose="020B0609040504020204" pitchFamily="49" charset="0"/>
+              </a:rPr>
+              <a:t>readInData</a:t>
+            </a:r>
+            <a:r>
+              <a:rPr lang="en-US" sz="1800" b="1" dirty="0">
+                <a:solidFill>
+                  <a:schemeClr val="accent1"/>
+                </a:solidFill>
+                <a:latin typeface="Lucida Console" panose="020B0609040504020204" pitchFamily="49" charset="0"/>
+              </a:rPr>
+              <a:t>”&gt;</a:t>
+            </a:r>
+          </a:p>
+        </p:txBody>
+      </p:sp>
+      <p:sp>
+        <p:nvSpPr>
+          <p:cNvPr id="8" name="TextBox 7">
+            <a:extLst>
+              <a:ext uri="{FF2B5EF4-FFF2-40B4-BE49-F238E27FC236}">
+                <a16:creationId xmlns:a16="http://schemas.microsoft.com/office/drawing/2014/main" id="{0D24C396-6687-EF44-898D-F2095D8AB6E5}"/>
+              </a:ext>
+            </a:extLst>
+          </p:cNvPr>
+          <p:cNvSpPr txBox="1"/>
+          <p:nvPr/>
+        </p:nvSpPr>
+        <p:spPr>
+          <a:xfrm>
+            <a:off x="3909915" y="3066369"/>
+            <a:ext cx="5065810" cy="369332"/>
+          </a:xfrm>
+          <a:prstGeom prst="rect">
+            <a:avLst/>
+          </a:prstGeom>
+          <a:solidFill>
+            <a:schemeClr val="tx1"/>
+          </a:solidFill>
+        </p:spPr>
+        <p:txBody>
+          <a:bodyPr wrap="none" rtlCol="0">
+            <a:spAutoFit/>
+          </a:bodyPr>
+          <a:lstStyle/>
+          <a:p>
+            <a:r>
+              <a:rPr lang="en-US" sz="1800" b="1" dirty="0">
+                <a:solidFill>
+                  <a:schemeClr val="accent1"/>
+                </a:solidFill>
+                <a:latin typeface="Monaco" pitchFamily="2" charset="0"/>
+              </a:rPr>
+              <a:t>&lt;</a:t>
+            </a:r>
+            <a:r>
+              <a:rPr lang="en-US" sz="1800" b="1" dirty="0" err="1">
+                <a:solidFill>
+                  <a:schemeClr val="accent1"/>
+                </a:solidFill>
+                <a:latin typeface="Monaco" pitchFamily="2" charset="0"/>
+              </a:rPr>
+              <a:t>PostProcess</a:t>
+            </a:r>
+            <a:r>
+              <a:rPr lang="en-US" sz="1800" b="1" dirty="0">
+                <a:solidFill>
+                  <a:schemeClr val="accent1"/>
+                </a:solidFill>
+                <a:latin typeface="Monaco" pitchFamily="2" charset="0"/>
+              </a:rPr>
+              <a:t> name=“</a:t>
+            </a:r>
+            <a:r>
+              <a:rPr lang="en-US" sz="1800" b="1" dirty="0" err="1">
+                <a:solidFill>
+                  <a:schemeClr val="accent1"/>
+                </a:solidFill>
+                <a:latin typeface="Monaco" pitchFamily="2" charset="0"/>
+              </a:rPr>
+              <a:t>typicalHistory</a:t>
+            </a:r>
+            <a:r>
+              <a:rPr lang="en-US" sz="1800" b="1" dirty="0">
+                <a:solidFill>
+                  <a:schemeClr val="accent1"/>
+                </a:solidFill>
+                <a:latin typeface="Monaco" pitchFamily="2" charset="0"/>
+              </a:rPr>
+              <a:t>”&gt;</a:t>
+            </a:r>
+          </a:p>
+        </p:txBody>
+      </p:sp>
+      <p:sp>
+        <p:nvSpPr>
+          <p:cNvPr id="9" name="TextBox 8">
+            <a:extLst>
+              <a:ext uri="{FF2B5EF4-FFF2-40B4-BE49-F238E27FC236}">
+                <a16:creationId xmlns:a16="http://schemas.microsoft.com/office/drawing/2014/main" id="{4541F76F-EA14-2D45-91A5-8140ECC62BFB}"/>
+              </a:ext>
+            </a:extLst>
+          </p:cNvPr>
+          <p:cNvSpPr txBox="1"/>
+          <p:nvPr/>
+        </p:nvSpPr>
+        <p:spPr>
+          <a:xfrm>
+            <a:off x="3909915" y="3808830"/>
+            <a:ext cx="3671198" cy="369332"/>
+          </a:xfrm>
+          <a:prstGeom prst="rect">
+            <a:avLst/>
+          </a:prstGeom>
+          <a:solidFill>
+            <a:schemeClr val="tx1"/>
+          </a:solidFill>
+        </p:spPr>
+        <p:txBody>
+          <a:bodyPr wrap="none" rtlCol="0">
+            <a:spAutoFit/>
+          </a:bodyPr>
+          <a:lstStyle/>
+          <a:p>
+            <a:r>
+              <a:rPr lang="en-US" sz="1800" b="1" dirty="0">
+                <a:solidFill>
+                  <a:schemeClr val="accent1"/>
+                </a:solidFill>
+                <a:latin typeface="Monaco" pitchFamily="2" charset="0"/>
+              </a:rPr>
+              <a:t>&lt;</a:t>
+            </a:r>
+            <a:r>
+              <a:rPr lang="en-US" sz="1800" b="1" dirty="0" err="1">
+                <a:solidFill>
+                  <a:schemeClr val="accent1"/>
+                </a:solidFill>
+                <a:latin typeface="Monaco" pitchFamily="2" charset="0"/>
+              </a:rPr>
+              <a:t>RomTrainer</a:t>
+            </a:r>
+            <a:r>
+              <a:rPr lang="en-US" sz="1800" b="1" dirty="0">
+                <a:solidFill>
+                  <a:schemeClr val="accent1"/>
+                </a:solidFill>
+                <a:latin typeface="Monaco" pitchFamily="2" charset="0"/>
+              </a:rPr>
+              <a:t> name=“train”&gt;</a:t>
+            </a:r>
+          </a:p>
+        </p:txBody>
+      </p:sp>
+      <p:sp>
+        <p:nvSpPr>
+          <p:cNvPr id="10" name="TextBox 9">
+            <a:extLst>
+              <a:ext uri="{FF2B5EF4-FFF2-40B4-BE49-F238E27FC236}">
+                <a16:creationId xmlns:a16="http://schemas.microsoft.com/office/drawing/2014/main" id="{66643690-B98F-A545-8879-BBC215973AFB}"/>
+              </a:ext>
+            </a:extLst>
+          </p:cNvPr>
+          <p:cNvSpPr txBox="1"/>
+          <p:nvPr/>
+        </p:nvSpPr>
+        <p:spPr>
+          <a:xfrm>
+            <a:off x="3909915" y="4621388"/>
+            <a:ext cx="3671198" cy="369332"/>
+          </a:xfrm>
+          <a:prstGeom prst="rect">
+            <a:avLst/>
+          </a:prstGeom>
+          <a:solidFill>
+            <a:schemeClr val="tx1"/>
+          </a:solidFill>
+        </p:spPr>
+        <p:txBody>
+          <a:bodyPr wrap="none" rtlCol="0">
+            <a:spAutoFit/>
+          </a:bodyPr>
+          <a:lstStyle/>
+          <a:p>
+            <a:r>
+              <a:rPr lang="en-US" sz="1800" b="1" dirty="0">
+                <a:solidFill>
+                  <a:schemeClr val="accent1"/>
+                </a:solidFill>
+                <a:latin typeface="Lucida Console" panose="020B0609040504020204" pitchFamily="49" charset="0"/>
+              </a:rPr>
+              <a:t>&lt;</a:t>
+            </a:r>
+            <a:r>
+              <a:rPr lang="en-US" sz="1800" b="1" dirty="0" err="1">
+                <a:solidFill>
+                  <a:schemeClr val="accent1"/>
+                </a:solidFill>
+                <a:latin typeface="Monaco" pitchFamily="2" charset="0"/>
+              </a:rPr>
+              <a:t>RomTrainer</a:t>
+            </a:r>
+            <a:r>
+              <a:rPr lang="en-US" sz="1800" b="1" dirty="0">
+                <a:solidFill>
+                  <a:schemeClr val="accent1"/>
+                </a:solidFill>
+                <a:latin typeface="Lucida Console" panose="020B0609040504020204" pitchFamily="49" charset="0"/>
+              </a:rPr>
+              <a:t> name=“train”&gt;</a:t>
+            </a:r>
+          </a:p>
+        </p:txBody>
+      </p:sp>
+    </p:spTree>
+    <p:extLst>
+      <p:ext uri="{BB962C8B-B14F-4D97-AF65-F5344CB8AC3E}">
+        <p14:creationId xmlns:p14="http://schemas.microsoft.com/office/powerpoint/2010/main" val="3835597311"/>
+      </p:ext>
+    </p:extLst>
+  </p:cSld>
+  <p:clrMapOvr>
+    <a:masterClrMapping/>
+  </p:clrMapOvr>
+</p:sld>
+</file>
+
+<file path=ppt/slides/slide22.xml><?xml version="1.0" encoding="utf-8"?>
+<p:sld xmlns:a="http://schemas.openxmlformats.org/drawingml/2006/main" xmlns:r="http://schemas.openxmlformats.org/officeDocument/2006/relationships" xmlns:p="http://schemas.openxmlformats.org/presentationml/2006/main">
+  <p:cSld>
+    <p:spTree>
+      <p:nvGrpSpPr>
+        <p:cNvPr id="1" name=""/>
+        <p:cNvGrpSpPr/>
+        <p:nvPr/>
+      </p:nvGrpSpPr>
+      <p:grpSpPr>
+        <a:xfrm>
+          <a:off x="0" y="0"/>
+          <a:ext cx="0" cy="0"/>
+          <a:chOff x="0" y="0"/>
+          <a:chExt cx="0" cy="0"/>
+        </a:xfrm>
+      </p:grpSpPr>
+      <p:sp>
+        <p:nvSpPr>
+          <p:cNvPr id="2" name="Title 1">
+            <a:extLst>
+              <a:ext uri="{FF2B5EF4-FFF2-40B4-BE49-F238E27FC236}">
+                <a16:creationId xmlns:a16="http://schemas.microsoft.com/office/drawing/2014/main" id="{948ACC61-B665-C340-A494-BC13CD4D7548}"/>
+              </a:ext>
+            </a:extLst>
+          </p:cNvPr>
+          <p:cNvSpPr>
+            <a:spLocks noGrp="1"/>
+          </p:cNvSpPr>
+          <p:nvPr>
+            <p:ph type="title"/>
+          </p:nvPr>
+        </p:nvSpPr>
+        <p:spPr/>
+        <p:txBody>
+          <a:bodyPr/>
+          <a:lstStyle/>
+          <a:p>
+            <a:r>
+              <a:rPr lang="en-US" dirty="0"/>
+              <a:t>Hands-On: Training ARMA Exercises</a:t>
+            </a:r>
+            <a:endParaRPr lang="en-US" i="0" dirty="0">
+              <a:latin typeface="Lucida Console" panose="020B0609040504020204" pitchFamily="49" charset="0"/>
+            </a:endParaRPr>
+          </a:p>
+        </p:txBody>
+      </p:sp>
+      <p:sp>
+        <p:nvSpPr>
+          <p:cNvPr id="3" name="Content Placeholder 2">
+            <a:extLst>
+              <a:ext uri="{FF2B5EF4-FFF2-40B4-BE49-F238E27FC236}">
+                <a16:creationId xmlns:a16="http://schemas.microsoft.com/office/drawing/2014/main" id="{DCA9CDD8-268E-FD42-B9AB-6B63C98F85B5}"/>
+              </a:ext>
+            </a:extLst>
+          </p:cNvPr>
+          <p:cNvSpPr>
+            <a:spLocks noGrp="1"/>
+          </p:cNvSpPr>
+          <p:nvPr>
+            <p:ph idx="1"/>
+          </p:nvPr>
+        </p:nvSpPr>
+        <p:spPr>
+          <a:xfrm>
+            <a:off x="474467" y="1598614"/>
+            <a:ext cx="8231187" cy="3831226"/>
+          </a:xfrm>
+        </p:spPr>
+        <p:txBody>
+          <a:bodyPr numCol="2"/>
+          <a:lstStyle/>
+          <a:p>
+            <a:pPr marL="0" indent="0">
+              <a:buNone/>
+            </a:pPr>
+            <a:endParaRPr lang="en-US" dirty="0"/>
+          </a:p>
+          <a:p>
+            <a:pPr marL="0" indent="0">
+              <a:buNone/>
+            </a:pPr>
+            <a:r>
+              <a:rPr lang="en-US" dirty="0"/>
+              <a:t>Fill in the following:</a:t>
+            </a:r>
+          </a:p>
+          <a:p>
+            <a:r>
+              <a:rPr lang="en-US" dirty="0" err="1"/>
+              <a:t>RunInfo</a:t>
+            </a:r>
+            <a:endParaRPr lang="en-US" dirty="0"/>
+          </a:p>
+          <a:p>
+            <a:pPr lvl="1"/>
+            <a:r>
+              <a:rPr lang="en-US" dirty="0"/>
+              <a:t>Sequence</a:t>
+            </a:r>
+          </a:p>
+          <a:p>
+            <a:r>
+              <a:rPr lang="en-US" dirty="0" err="1"/>
+              <a:t>DataObjects</a:t>
+            </a:r>
+            <a:endParaRPr lang="en-US" dirty="0"/>
+          </a:p>
+          <a:p>
+            <a:pPr lvl="1"/>
+            <a:r>
+              <a:rPr lang="en-US" dirty="0"/>
+              <a:t>Input</a:t>
+            </a:r>
+          </a:p>
+          <a:p>
+            <a:pPr lvl="1"/>
+            <a:r>
+              <a:rPr lang="en-US" dirty="0"/>
+              <a:t>Output</a:t>
+            </a:r>
+          </a:p>
+          <a:p>
+            <a:pPr lvl="1"/>
+            <a:r>
+              <a:rPr lang="en-US" dirty="0" err="1"/>
+              <a:t>pivotParameter</a:t>
+            </a:r>
+            <a:endParaRPr lang="en-US" dirty="0"/>
+          </a:p>
+          <a:p>
+            <a:r>
+              <a:rPr lang="en-US" dirty="0"/>
+              <a:t>Files</a:t>
+            </a:r>
+          </a:p>
+          <a:p>
+            <a:pPr lvl="1"/>
+            <a:r>
+              <a:rPr lang="en-US" dirty="0"/>
+              <a:t>Raw data file</a:t>
+            </a:r>
+          </a:p>
+          <a:p>
+            <a:pPr lvl="1"/>
+            <a:r>
+              <a:rPr lang="en-US" dirty="0"/>
+              <a:t>Serialized ARMA file</a:t>
+            </a:r>
+          </a:p>
+          <a:p>
+            <a:endParaRPr lang="en-US" dirty="0"/>
+          </a:p>
+          <a:p>
+            <a:endParaRPr lang="en-US" dirty="0"/>
+          </a:p>
+          <a:p>
+            <a:r>
+              <a:rPr lang="en-US" dirty="0"/>
+              <a:t>Typical History </a:t>
+            </a:r>
+            <a:r>
+              <a:rPr lang="en-US" dirty="0" err="1"/>
+              <a:t>PostProcessor</a:t>
+            </a:r>
+            <a:endParaRPr lang="en-US" dirty="0"/>
+          </a:p>
+          <a:p>
+            <a:pPr lvl="1"/>
+            <a:r>
+              <a:rPr lang="en-US" dirty="0"/>
+              <a:t>Subsequence length (1 day)</a:t>
+            </a:r>
+          </a:p>
+          <a:p>
+            <a:pPr lvl="1"/>
+            <a:r>
+              <a:rPr lang="en-US" dirty="0"/>
+              <a:t>Output Length (1 week)</a:t>
+            </a:r>
+          </a:p>
+          <a:p>
+            <a:pPr lvl="1"/>
+            <a:r>
+              <a:rPr lang="en-US" dirty="0" err="1"/>
+              <a:t>PivotParameter</a:t>
+            </a:r>
+            <a:endParaRPr lang="en-US" dirty="0"/>
+          </a:p>
+          <a:p>
+            <a:r>
+              <a:rPr lang="en-US" dirty="0"/>
+              <a:t>ARMA ROM</a:t>
+            </a:r>
+          </a:p>
+          <a:p>
+            <a:pPr lvl="1"/>
+            <a:r>
+              <a:rPr lang="en-US" dirty="0"/>
+              <a:t>Target</a:t>
+            </a:r>
+          </a:p>
+          <a:p>
+            <a:pPr lvl="1"/>
+            <a:r>
+              <a:rPr lang="en-US" dirty="0"/>
+              <a:t>Features</a:t>
+            </a:r>
+          </a:p>
+          <a:p>
+            <a:pPr lvl="1"/>
+            <a:r>
+              <a:rPr lang="en-US" dirty="0" err="1"/>
+              <a:t>pivotParameter</a:t>
+            </a:r>
+            <a:endParaRPr lang="en-US" dirty="0"/>
+          </a:p>
+        </p:txBody>
+      </p:sp>
+      <p:sp>
+        <p:nvSpPr>
+          <p:cNvPr id="5" name="Slide Number Placeholder 4">
+            <a:extLst>
+              <a:ext uri="{FF2B5EF4-FFF2-40B4-BE49-F238E27FC236}">
+                <a16:creationId xmlns:a16="http://schemas.microsoft.com/office/drawing/2014/main" id="{26822A84-07B8-7141-B715-6D4B1841CE7B}"/>
+              </a:ext>
+            </a:extLst>
+          </p:cNvPr>
+          <p:cNvSpPr>
+            <a:spLocks noGrp="1"/>
+          </p:cNvSpPr>
+          <p:nvPr>
+            <p:ph type="sldNum" sz="quarter" idx="11"/>
+          </p:nvPr>
+        </p:nvSpPr>
+        <p:spPr/>
+        <p:txBody>
+          <a:bodyPr/>
+          <a:lstStyle/>
+          <a:p>
+            <a:fld id="{4B4332F1-BAE3-4172-AA6D-91F763B329EF}" type="slidenum">
+              <a:rPr lang="en-US" smtClean="0"/>
+              <a:pPr/>
+              <a:t>21</a:t>
+            </a:fld>
+            <a:endParaRPr lang="en-US"/>
+          </a:p>
+        </p:txBody>
+      </p:sp>
+      <p:sp>
+        <p:nvSpPr>
+          <p:cNvPr id="6" name="TextBox 5">
+            <a:extLst>
+              <a:ext uri="{FF2B5EF4-FFF2-40B4-BE49-F238E27FC236}">
+                <a16:creationId xmlns:a16="http://schemas.microsoft.com/office/drawing/2014/main" id="{3F398C7C-25F3-BC43-B924-F3DA847DF16F}"/>
+              </a:ext>
+            </a:extLst>
+          </p:cNvPr>
+          <p:cNvSpPr txBox="1"/>
+          <p:nvPr/>
+        </p:nvSpPr>
+        <p:spPr>
+          <a:xfrm>
+            <a:off x="1131803" y="1538060"/>
+            <a:ext cx="6878806" cy="369332"/>
+          </a:xfrm>
+          <a:prstGeom prst="rect">
+            <a:avLst/>
+          </a:prstGeom>
+          <a:solidFill>
+            <a:schemeClr val="accent5"/>
+          </a:solidFill>
+        </p:spPr>
+        <p:txBody>
+          <a:bodyPr wrap="none" rtlCol="0">
+            <a:spAutoFit/>
+          </a:bodyPr>
+          <a:lstStyle/>
+          <a:p>
+            <a:r>
+              <a:rPr lang="en-US" sz="1800" dirty="0">
+                <a:latin typeface="Lucida Console" panose="020B0609040504020204" pitchFamily="49" charset="0"/>
+              </a:rPr>
+              <a:t>raven/docs/workshop/ARMA/exercise/</a:t>
+            </a:r>
+            <a:r>
+              <a:rPr lang="en-US" sz="1800" dirty="0" err="1">
+                <a:latin typeface="Lucida Console" panose="020B0609040504020204" pitchFamily="49" charset="0"/>
+              </a:rPr>
+              <a:t>train_arma.xml</a:t>
+            </a:r>
+            <a:endParaRPr lang="en-US" sz="1800" dirty="0">
+              <a:latin typeface="Lucida Console" panose="020B0609040504020204" pitchFamily="49" charset="0"/>
+            </a:endParaRPr>
+          </a:p>
+        </p:txBody>
+      </p:sp>
+      <p:sp>
+        <p:nvSpPr>
+          <p:cNvPr id="10" name="TextBox 9">
+            <a:extLst>
+              <a:ext uri="{FF2B5EF4-FFF2-40B4-BE49-F238E27FC236}">
+                <a16:creationId xmlns:a16="http://schemas.microsoft.com/office/drawing/2014/main" id="{66643690-B98F-A545-8879-BBC215973AFB}"/>
+              </a:ext>
+            </a:extLst>
+          </p:cNvPr>
+          <p:cNvSpPr txBox="1"/>
+          <p:nvPr/>
+        </p:nvSpPr>
+        <p:spPr>
+          <a:xfrm>
+            <a:off x="4817506" y="5567859"/>
+            <a:ext cx="2529860" cy="369332"/>
+          </a:xfrm>
+          <a:prstGeom prst="rect">
+            <a:avLst/>
+          </a:prstGeom>
+          <a:solidFill>
+            <a:schemeClr val="tx1"/>
+          </a:solidFill>
+        </p:spPr>
+        <p:txBody>
+          <a:bodyPr wrap="none" rtlCol="0">
+            <a:spAutoFit/>
+          </a:bodyPr>
+          <a:lstStyle/>
+          <a:p>
+            <a:r>
+              <a:rPr lang="en-US" sz="1800" b="1" dirty="0">
+                <a:solidFill>
+                  <a:schemeClr val="accent1"/>
+                </a:solidFill>
+                <a:latin typeface="Lucida Console" panose="020B0609040504020204" pitchFamily="49" charset="0"/>
+              </a:rPr>
+              <a:t>&lt;</a:t>
+            </a:r>
+            <a:r>
+              <a:rPr lang="en-US" sz="1800" b="1" dirty="0">
+                <a:solidFill>
+                  <a:schemeClr val="accent1"/>
+                </a:solidFill>
+                <a:latin typeface="Monaco" pitchFamily="2" charset="0"/>
+              </a:rPr>
+              <a:t>!–- TODO ... --&gt;</a:t>
+            </a:r>
+            <a:endParaRPr lang="en-US" sz="1800" b="1" dirty="0">
+              <a:solidFill>
+                <a:schemeClr val="accent1"/>
+              </a:solidFill>
+              <a:latin typeface="Lucida Console" panose="020B0609040504020204" pitchFamily="49" charset="0"/>
+            </a:endParaRPr>
+          </a:p>
+        </p:txBody>
+      </p:sp>
+      <p:sp>
+        <p:nvSpPr>
+          <p:cNvPr id="12" name="Content Placeholder 2">
+            <a:extLst>
+              <a:ext uri="{FF2B5EF4-FFF2-40B4-BE49-F238E27FC236}">
+                <a16:creationId xmlns:a16="http://schemas.microsoft.com/office/drawing/2014/main" id="{7F4C0C72-6142-A241-B83C-3C28C017B5A3}"/>
+              </a:ext>
+            </a:extLst>
+          </p:cNvPr>
+          <p:cNvSpPr txBox="1">
+            <a:spLocks/>
+          </p:cNvSpPr>
+          <p:nvPr/>
+        </p:nvSpPr>
+        <p:spPr bwMode="auto">
+          <a:xfrm>
+            <a:off x="1690820" y="5268451"/>
+            <a:ext cx="3409082" cy="806759"/>
+          </a:xfrm>
+          <a:prstGeom prst="rect">
+            <a:avLst/>
+          </a:prstGeom>
+          <a:noFill/>
+          <a:ln w="9525">
+            <a:noFill/>
+            <a:miter lim="800000"/>
+            <a:headEnd/>
+            <a:tailEnd/>
+          </a:ln>
+          <a:effectLst/>
+        </p:spPr>
+        <p:txBody>
+          <a:bodyPr vert="horz" wrap="square" lIns="0" tIns="0" rIns="0" bIns="0" numCol="1" anchor="t" anchorCtr="0" compatLnSpc="1">
+            <a:prstTxWarp prst="textNoShape">
+              <a:avLst/>
+            </a:prstTxWarp>
+          </a:bodyPr>
+          <a:lstStyle>
+            <a:lvl1pPr marL="230188" indent="-230188" algn="l" rtl="0" eaLnBrk="0" fontAlgn="base" hangingPunct="0">
+              <a:lnSpc>
+                <a:spcPct val="85000"/>
+              </a:lnSpc>
+              <a:spcBef>
+                <a:spcPct val="40000"/>
+              </a:spcBef>
+              <a:spcAft>
+                <a:spcPct val="0"/>
+              </a:spcAft>
+              <a:buClr>
+                <a:srgbClr val="FF6600"/>
+              </a:buClr>
+              <a:buChar char="•"/>
+              <a:defRPr sz="2000">
+                <a:solidFill>
+                  <a:schemeClr val="tx1"/>
+                </a:solidFill>
+                <a:latin typeface="+mn-lt"/>
+                <a:ea typeface="+mn-ea"/>
+                <a:cs typeface="+mn-cs"/>
+              </a:defRPr>
+            </a:lvl1pPr>
+            <a:lvl2pPr marL="684213" indent="-227013" algn="l" rtl="0" eaLnBrk="0" fontAlgn="base" hangingPunct="0">
+              <a:lnSpc>
+                <a:spcPct val="85000"/>
+              </a:lnSpc>
+              <a:spcBef>
+                <a:spcPct val="20000"/>
+              </a:spcBef>
+              <a:spcAft>
+                <a:spcPct val="0"/>
+              </a:spcAft>
+              <a:buClr>
+                <a:srgbClr val="FF6600"/>
+              </a:buClr>
+              <a:buFont typeface="Times New Roman" pitchFamily="18" charset="0"/>
+              <a:buChar char="–"/>
+              <a:defRPr sz="2000">
+                <a:solidFill>
+                  <a:schemeClr val="tx1"/>
+                </a:solidFill>
+                <a:latin typeface="+mn-lt"/>
+              </a:defRPr>
+            </a:lvl2pPr>
+            <a:lvl3pPr marL="1143000" indent="-228600" algn="l" rtl="0" eaLnBrk="0" fontAlgn="base" hangingPunct="0">
+              <a:lnSpc>
+                <a:spcPct val="85000"/>
+              </a:lnSpc>
+              <a:spcBef>
+                <a:spcPct val="20000"/>
+              </a:spcBef>
+              <a:spcAft>
+                <a:spcPct val="0"/>
+              </a:spcAft>
+              <a:buClr>
+                <a:srgbClr val="FF6600"/>
+              </a:buClr>
+              <a:buChar char="•"/>
+              <a:defRPr sz="2000">
+                <a:solidFill>
+                  <a:schemeClr val="tx1"/>
+                </a:solidFill>
+                <a:latin typeface="+mn-lt"/>
+              </a:defRPr>
+            </a:lvl3pPr>
+            <a:lvl4pPr marL="1600200" indent="-228600" algn="l" rtl="0" eaLnBrk="0" fontAlgn="base" hangingPunct="0">
+              <a:lnSpc>
+                <a:spcPct val="85000"/>
+              </a:lnSpc>
+              <a:spcBef>
+                <a:spcPct val="20000"/>
+              </a:spcBef>
+              <a:spcAft>
+                <a:spcPct val="0"/>
+              </a:spcAft>
+              <a:buClr>
+                <a:srgbClr val="FF6600"/>
+              </a:buClr>
+              <a:buFont typeface="Times New Roman" pitchFamily="18" charset="0"/>
+              <a:buChar char="–"/>
+              <a:defRPr sz="2000">
+                <a:solidFill>
+                  <a:schemeClr val="tx1"/>
+                </a:solidFill>
+                <a:latin typeface="+mn-lt"/>
+              </a:defRPr>
+            </a:lvl4pPr>
+            <a:lvl5pPr marL="2057400" indent="-228600" algn="l" rtl="0" eaLnBrk="0" fontAlgn="base" hangingPunct="0">
+              <a:lnSpc>
+                <a:spcPct val="85000"/>
+              </a:lnSpc>
+              <a:spcBef>
+                <a:spcPct val="20000"/>
+              </a:spcBef>
+              <a:spcAft>
+                <a:spcPct val="0"/>
+              </a:spcAft>
+              <a:buClr>
+                <a:srgbClr val="FF6600"/>
+              </a:buClr>
+              <a:buChar char="•"/>
+              <a:defRPr sz="2000">
+                <a:solidFill>
+                  <a:schemeClr val="tx1"/>
+                </a:solidFill>
+                <a:latin typeface="+mn-lt"/>
+              </a:defRPr>
+            </a:lvl5pPr>
+            <a:lvl6pPr marL="2514600" indent="-228600" algn="l" rtl="0" eaLnBrk="0" fontAlgn="base" hangingPunct="0">
+              <a:lnSpc>
+                <a:spcPct val="85000"/>
+              </a:lnSpc>
+              <a:spcBef>
+                <a:spcPct val="20000"/>
+              </a:spcBef>
+              <a:spcAft>
+                <a:spcPct val="0"/>
+              </a:spcAft>
+              <a:buClr>
+                <a:srgbClr val="FF6600"/>
+              </a:buClr>
+              <a:buChar char="•"/>
+              <a:defRPr sz="2000">
+                <a:solidFill>
+                  <a:schemeClr val="tx1"/>
+                </a:solidFill>
+                <a:latin typeface="+mn-lt"/>
+              </a:defRPr>
+            </a:lvl6pPr>
+            <a:lvl7pPr marL="2971800" indent="-228600" algn="l" rtl="0" eaLnBrk="0" fontAlgn="base" hangingPunct="0">
+              <a:lnSpc>
+                <a:spcPct val="85000"/>
+              </a:lnSpc>
+              <a:spcBef>
+                <a:spcPct val="20000"/>
+              </a:spcBef>
+              <a:spcAft>
+                <a:spcPct val="0"/>
+              </a:spcAft>
+              <a:buClr>
+                <a:srgbClr val="FF6600"/>
+              </a:buClr>
+              <a:buChar char="•"/>
+              <a:defRPr sz="2000">
+                <a:solidFill>
+                  <a:schemeClr val="tx1"/>
+                </a:solidFill>
+                <a:latin typeface="+mn-lt"/>
+              </a:defRPr>
+            </a:lvl7pPr>
+            <a:lvl8pPr marL="3429000" indent="-228600" algn="l" rtl="0" eaLnBrk="0" fontAlgn="base" hangingPunct="0">
+              <a:lnSpc>
+                <a:spcPct val="85000"/>
+              </a:lnSpc>
+              <a:spcBef>
+                <a:spcPct val="20000"/>
+              </a:spcBef>
+              <a:spcAft>
+                <a:spcPct val="0"/>
+              </a:spcAft>
+              <a:buClr>
+                <a:srgbClr val="FF6600"/>
+              </a:buClr>
+              <a:buChar char="•"/>
+              <a:defRPr sz="2000">
+                <a:solidFill>
+                  <a:schemeClr val="tx1"/>
+                </a:solidFill>
+                <a:latin typeface="+mn-lt"/>
+              </a:defRPr>
+            </a:lvl8pPr>
+            <a:lvl9pPr marL="3886200" indent="-228600" algn="l" rtl="0" eaLnBrk="0" fontAlgn="base" hangingPunct="0">
+              <a:lnSpc>
+                <a:spcPct val="85000"/>
+              </a:lnSpc>
+              <a:spcBef>
+                <a:spcPct val="20000"/>
+              </a:spcBef>
+              <a:spcAft>
+                <a:spcPct val="0"/>
+              </a:spcAft>
+              <a:buClr>
+                <a:srgbClr val="FF6600"/>
+              </a:buClr>
+              <a:buChar char="•"/>
+              <a:defRPr sz="2000">
+                <a:solidFill>
+                  <a:schemeClr val="tx1"/>
+                </a:solidFill>
+                <a:latin typeface="+mn-lt"/>
+              </a:defRPr>
+            </a:lvl9pPr>
+          </a:lstStyle>
+          <a:p>
+            <a:pPr marL="0" indent="0">
+              <a:buFontTx/>
+              <a:buNone/>
+            </a:pPr>
+            <a:endParaRPr lang="en-US" kern="0" dirty="0"/>
+          </a:p>
+          <a:p>
+            <a:pPr marL="0" indent="0">
+              <a:buNone/>
+            </a:pPr>
+            <a:r>
+              <a:rPr lang="en-US" kern="0" dirty="0"/>
+              <a:t>Each task is marked with a </a:t>
+            </a:r>
+          </a:p>
+        </p:txBody>
+      </p:sp>
+      <p:sp>
+        <p:nvSpPr>
+          <p:cNvPr id="13" name="Content Placeholder 2">
+            <a:extLst>
+              <a:ext uri="{FF2B5EF4-FFF2-40B4-BE49-F238E27FC236}">
+                <a16:creationId xmlns:a16="http://schemas.microsoft.com/office/drawing/2014/main" id="{48DEFAD5-55F8-004C-B719-0B23DA5E298F}"/>
+              </a:ext>
+            </a:extLst>
+          </p:cNvPr>
+          <p:cNvSpPr txBox="1">
+            <a:spLocks/>
+          </p:cNvSpPr>
+          <p:nvPr/>
+        </p:nvSpPr>
+        <p:spPr bwMode="auto">
+          <a:xfrm>
+            <a:off x="2866665" y="5660029"/>
+            <a:ext cx="3409082" cy="806759"/>
+          </a:xfrm>
+          <a:prstGeom prst="rect">
+            <a:avLst/>
+          </a:prstGeom>
+          <a:noFill/>
+          <a:ln w="9525">
+            <a:noFill/>
+            <a:miter lim="800000"/>
+            <a:headEnd/>
+            <a:tailEnd/>
+          </a:ln>
+          <a:effectLst/>
+        </p:spPr>
+        <p:txBody>
+          <a:bodyPr vert="horz" wrap="square" lIns="0" tIns="0" rIns="0" bIns="0" numCol="1" anchor="t" anchorCtr="0" compatLnSpc="1">
+            <a:prstTxWarp prst="textNoShape">
+              <a:avLst/>
+            </a:prstTxWarp>
+          </a:bodyPr>
+          <a:lstStyle>
+            <a:lvl1pPr marL="230188" indent="-230188" algn="l" rtl="0" eaLnBrk="0" fontAlgn="base" hangingPunct="0">
+              <a:lnSpc>
+                <a:spcPct val="85000"/>
+              </a:lnSpc>
+              <a:spcBef>
+                <a:spcPct val="40000"/>
+              </a:spcBef>
+              <a:spcAft>
+                <a:spcPct val="0"/>
+              </a:spcAft>
+              <a:buClr>
+                <a:srgbClr val="FF6600"/>
+              </a:buClr>
+              <a:buChar char="•"/>
+              <a:defRPr sz="2000">
+                <a:solidFill>
+                  <a:schemeClr val="tx1"/>
+                </a:solidFill>
+                <a:latin typeface="+mn-lt"/>
+                <a:ea typeface="+mn-ea"/>
+                <a:cs typeface="+mn-cs"/>
+              </a:defRPr>
+            </a:lvl1pPr>
+            <a:lvl2pPr marL="684213" indent="-227013" algn="l" rtl="0" eaLnBrk="0" fontAlgn="base" hangingPunct="0">
+              <a:lnSpc>
+                <a:spcPct val="85000"/>
+              </a:lnSpc>
+              <a:spcBef>
+                <a:spcPct val="20000"/>
+              </a:spcBef>
+              <a:spcAft>
+                <a:spcPct val="0"/>
+              </a:spcAft>
+              <a:buClr>
+                <a:srgbClr val="FF6600"/>
+              </a:buClr>
+              <a:buFont typeface="Times New Roman" pitchFamily="18" charset="0"/>
+              <a:buChar char="–"/>
+              <a:defRPr sz="2000">
+                <a:solidFill>
+                  <a:schemeClr val="tx1"/>
+                </a:solidFill>
+                <a:latin typeface="+mn-lt"/>
+              </a:defRPr>
+            </a:lvl2pPr>
+            <a:lvl3pPr marL="1143000" indent="-228600" algn="l" rtl="0" eaLnBrk="0" fontAlgn="base" hangingPunct="0">
+              <a:lnSpc>
+                <a:spcPct val="85000"/>
+              </a:lnSpc>
+              <a:spcBef>
+                <a:spcPct val="20000"/>
+              </a:spcBef>
+              <a:spcAft>
+                <a:spcPct val="0"/>
+              </a:spcAft>
+              <a:buClr>
+                <a:srgbClr val="FF6600"/>
+              </a:buClr>
+              <a:buChar char="•"/>
+              <a:defRPr sz="2000">
+                <a:solidFill>
+                  <a:schemeClr val="tx1"/>
+                </a:solidFill>
+                <a:latin typeface="+mn-lt"/>
+              </a:defRPr>
+            </a:lvl3pPr>
+            <a:lvl4pPr marL="1600200" indent="-228600" algn="l" rtl="0" eaLnBrk="0" fontAlgn="base" hangingPunct="0">
+              <a:lnSpc>
+                <a:spcPct val="85000"/>
+              </a:lnSpc>
+              <a:spcBef>
+                <a:spcPct val="20000"/>
+              </a:spcBef>
+              <a:spcAft>
+                <a:spcPct val="0"/>
+              </a:spcAft>
+              <a:buClr>
+                <a:srgbClr val="FF6600"/>
+              </a:buClr>
+              <a:buFont typeface="Times New Roman" pitchFamily="18" charset="0"/>
+              <a:buChar char="–"/>
+              <a:defRPr sz="2000">
+                <a:solidFill>
+                  <a:schemeClr val="tx1"/>
+                </a:solidFill>
+                <a:latin typeface="+mn-lt"/>
+              </a:defRPr>
+            </a:lvl4pPr>
+            <a:lvl5pPr marL="2057400" indent="-228600" algn="l" rtl="0" eaLnBrk="0" fontAlgn="base" hangingPunct="0">
+              <a:lnSpc>
+                <a:spcPct val="85000"/>
+              </a:lnSpc>
+              <a:spcBef>
+                <a:spcPct val="20000"/>
+              </a:spcBef>
+              <a:spcAft>
+                <a:spcPct val="0"/>
+              </a:spcAft>
+              <a:buClr>
+                <a:srgbClr val="FF6600"/>
+              </a:buClr>
+              <a:buChar char="•"/>
+              <a:defRPr sz="2000">
+                <a:solidFill>
+                  <a:schemeClr val="tx1"/>
+                </a:solidFill>
+                <a:latin typeface="+mn-lt"/>
+              </a:defRPr>
+            </a:lvl5pPr>
+            <a:lvl6pPr marL="2514600" indent="-228600" algn="l" rtl="0" eaLnBrk="0" fontAlgn="base" hangingPunct="0">
+              <a:lnSpc>
+                <a:spcPct val="85000"/>
+              </a:lnSpc>
+              <a:spcBef>
+                <a:spcPct val="20000"/>
+              </a:spcBef>
+              <a:spcAft>
+                <a:spcPct val="0"/>
+              </a:spcAft>
+              <a:buClr>
+                <a:srgbClr val="FF6600"/>
+              </a:buClr>
+              <a:buChar char="•"/>
+              <a:defRPr sz="2000">
+                <a:solidFill>
+                  <a:schemeClr val="tx1"/>
+                </a:solidFill>
+                <a:latin typeface="+mn-lt"/>
+              </a:defRPr>
+            </a:lvl6pPr>
+            <a:lvl7pPr marL="2971800" indent="-228600" algn="l" rtl="0" eaLnBrk="0" fontAlgn="base" hangingPunct="0">
+              <a:lnSpc>
+                <a:spcPct val="85000"/>
+              </a:lnSpc>
+              <a:spcBef>
+                <a:spcPct val="20000"/>
+              </a:spcBef>
+              <a:spcAft>
+                <a:spcPct val="0"/>
+              </a:spcAft>
+              <a:buClr>
+                <a:srgbClr val="FF6600"/>
+              </a:buClr>
+              <a:buChar char="•"/>
+              <a:defRPr sz="2000">
+                <a:solidFill>
+                  <a:schemeClr val="tx1"/>
+                </a:solidFill>
+                <a:latin typeface="+mn-lt"/>
+              </a:defRPr>
+            </a:lvl7pPr>
+            <a:lvl8pPr marL="3429000" indent="-228600" algn="l" rtl="0" eaLnBrk="0" fontAlgn="base" hangingPunct="0">
+              <a:lnSpc>
+                <a:spcPct val="85000"/>
+              </a:lnSpc>
+              <a:spcBef>
+                <a:spcPct val="20000"/>
+              </a:spcBef>
+              <a:spcAft>
+                <a:spcPct val="0"/>
+              </a:spcAft>
+              <a:buClr>
+                <a:srgbClr val="FF6600"/>
+              </a:buClr>
+              <a:buChar char="•"/>
+              <a:defRPr sz="2000">
+                <a:solidFill>
+                  <a:schemeClr val="tx1"/>
+                </a:solidFill>
+                <a:latin typeface="+mn-lt"/>
+              </a:defRPr>
+            </a:lvl8pPr>
+            <a:lvl9pPr marL="3886200" indent="-228600" algn="l" rtl="0" eaLnBrk="0" fontAlgn="base" hangingPunct="0">
+              <a:lnSpc>
+                <a:spcPct val="85000"/>
+              </a:lnSpc>
+              <a:spcBef>
+                <a:spcPct val="20000"/>
+              </a:spcBef>
+              <a:spcAft>
+                <a:spcPct val="0"/>
+              </a:spcAft>
+              <a:buClr>
+                <a:srgbClr val="FF6600"/>
+              </a:buClr>
+              <a:buChar char="•"/>
+              <a:defRPr sz="2000">
+                <a:solidFill>
+                  <a:schemeClr val="tx1"/>
+                </a:solidFill>
+                <a:latin typeface="+mn-lt"/>
+              </a:defRPr>
+            </a:lvl9pPr>
+          </a:lstStyle>
+          <a:p>
+            <a:pPr marL="0" indent="0" algn="ctr">
+              <a:buFontTx/>
+              <a:buNone/>
+            </a:pPr>
+            <a:endParaRPr lang="en-US" kern="0" dirty="0"/>
+          </a:p>
+          <a:p>
+            <a:pPr marL="0" indent="0" algn="ctr">
+              <a:buNone/>
+            </a:pPr>
+            <a:r>
+              <a:rPr lang="en-US" kern="0" dirty="0"/>
+              <a:t>After you finish, try running!</a:t>
+            </a:r>
+          </a:p>
+        </p:txBody>
+      </p:sp>
+      <p:sp>
+        <p:nvSpPr>
+          <p:cNvPr id="14" name="TextBox 13">
+            <a:extLst>
+              <a:ext uri="{FF2B5EF4-FFF2-40B4-BE49-F238E27FC236}">
+                <a16:creationId xmlns:a16="http://schemas.microsoft.com/office/drawing/2014/main" id="{73F076D9-C125-2549-800A-83F2680D17E4}"/>
+              </a:ext>
+            </a:extLst>
+          </p:cNvPr>
+          <p:cNvSpPr txBox="1"/>
+          <p:nvPr/>
+        </p:nvSpPr>
+        <p:spPr>
+          <a:xfrm>
+            <a:off x="1550186" y="6317792"/>
+            <a:ext cx="6042039" cy="369332"/>
+          </a:xfrm>
+          <a:prstGeom prst="rect">
+            <a:avLst/>
+          </a:prstGeom>
+          <a:solidFill>
+            <a:schemeClr val="accent5"/>
+          </a:solidFill>
+        </p:spPr>
+        <p:txBody>
+          <a:bodyPr wrap="none" rtlCol="0">
+            <a:spAutoFit/>
+          </a:bodyPr>
+          <a:lstStyle/>
+          <a:p>
+            <a:r>
+              <a:rPr lang="en-US" sz="1800" dirty="0">
+                <a:latin typeface="Lucida Console" panose="020B0609040504020204" pitchFamily="49" charset="0"/>
+              </a:rPr>
+              <a:t>../../../../</a:t>
+            </a:r>
+            <a:r>
+              <a:rPr lang="en-US" sz="1800" dirty="0" err="1">
+                <a:latin typeface="Lucida Console" panose="020B0609040504020204" pitchFamily="49" charset="0"/>
+              </a:rPr>
+              <a:t>raven_framework</a:t>
+            </a:r>
+            <a:r>
+              <a:rPr lang="en-US" sz="1800" dirty="0">
+                <a:latin typeface="Lucida Console" panose="020B0609040504020204" pitchFamily="49" charset="0"/>
+              </a:rPr>
+              <a:t> </a:t>
+            </a:r>
+            <a:r>
+              <a:rPr lang="en-US" sz="1800" dirty="0" err="1">
+                <a:latin typeface="Lucida Console" panose="020B0609040504020204" pitchFamily="49" charset="0"/>
+              </a:rPr>
+              <a:t>train_arma.xml</a:t>
+            </a:r>
+            <a:endParaRPr lang="en-US" sz="1800" dirty="0">
+              <a:latin typeface="Lucida Console" panose="020B0609040504020204" pitchFamily="49" charset="0"/>
+            </a:endParaRPr>
+          </a:p>
+        </p:txBody>
+      </p:sp>
+      <p:sp>
+        <p:nvSpPr>
+          <p:cNvPr id="15" name="Frame 14">
+            <a:extLst>
+              <a:ext uri="{FF2B5EF4-FFF2-40B4-BE49-F238E27FC236}">
+                <a16:creationId xmlns:a16="http://schemas.microsoft.com/office/drawing/2014/main" id="{7B759CDA-1E22-4A4D-BB27-3CB1EF50C9E3}"/>
+              </a:ext>
+            </a:extLst>
+          </p:cNvPr>
+          <p:cNvSpPr/>
+          <p:nvPr/>
+        </p:nvSpPr>
+        <p:spPr bwMode="auto">
+          <a:xfrm>
+            <a:off x="388060" y="2256377"/>
+            <a:ext cx="8366289" cy="3129700"/>
+          </a:xfrm>
+          <a:prstGeom prst="frame">
+            <a:avLst>
+              <a:gd name="adj1" fmla="val 1355"/>
+            </a:avLst>
+          </a:prstGeom>
+          <a:solidFill>
+            <a:schemeClr val="accent2"/>
+          </a:solidFill>
+          <a:ln w="9525" cap="flat" cmpd="sng" algn="ctr">
+            <a:solidFill>
+              <a:schemeClr val="tx1"/>
+            </a:solidFill>
+            <a:prstDash val="solid"/>
+            <a:round/>
+            <a:headEnd type="none" w="med" len="med"/>
+            <a:tailEnd type="none" w="med" len="med"/>
+          </a:ln>
+          <a:effectLst/>
+        </p:spPr>
+        <p:txBody>
+          <a:bodyPr vert="horz" wrap="square" lIns="91440" tIns="45720" rIns="91440" bIns="45720" numCol="1" rtlCol="0" anchor="t" anchorCtr="0" compatLnSpc="1">
+            <a:prstTxWarp prst="textNoShape">
+              <a:avLst/>
+            </a:prstTxWarp>
+          </a:bodyPr>
+          <a:lstStyle/>
+          <a:p>
+            <a:pPr marL="0" marR="0" indent="0" algn="l" defTabSz="914400" rtl="0" eaLnBrk="0" fontAlgn="base" latinLnBrk="0" hangingPunct="0">
+              <a:lnSpc>
+                <a:spcPct val="100000"/>
+              </a:lnSpc>
+              <a:spcBef>
+                <a:spcPct val="0"/>
+              </a:spcBef>
+              <a:spcAft>
+                <a:spcPct val="0"/>
+              </a:spcAft>
+              <a:buClrTx/>
+              <a:buSzTx/>
+              <a:buFontTx/>
+              <a:buNone/>
+              <a:tabLst/>
+            </a:pPr>
+            <a:endParaRPr kumimoji="0" lang="en-US" sz="2400" b="0" i="0" u="none" strike="noStrike" cap="none" normalizeH="0" baseline="0">
+              <a:ln>
+                <a:noFill/>
+              </a:ln>
+              <a:solidFill>
+                <a:schemeClr val="tx1"/>
+              </a:solidFill>
+              <a:effectLst/>
+              <a:latin typeface="Times New Roman" pitchFamily="18" charset="0"/>
+            </a:endParaRPr>
+          </a:p>
+        </p:txBody>
+      </p:sp>
+    </p:spTree>
+    <p:extLst>
+      <p:ext uri="{BB962C8B-B14F-4D97-AF65-F5344CB8AC3E}">
+        <p14:creationId xmlns:p14="http://schemas.microsoft.com/office/powerpoint/2010/main" val="196641053"/>
+      </p:ext>
+    </p:extLst>
+  </p:cSld>
+  <p:clrMapOvr>
+    <a:masterClrMapping/>
+  </p:clrMapOvr>
+</p:sld>
+</file>
+
+<file path=ppt/slides/slide23.xml><?xml version="1.0" encoding="utf-8"?>
+<p:sld xmlns:a="http://schemas.openxmlformats.org/drawingml/2006/main" xmlns:r="http://schemas.openxmlformats.org/officeDocument/2006/relationships" xmlns:p="http://schemas.openxmlformats.org/presentationml/2006/main">
+  <p:cSld>
+    <p:spTree>
+      <p:nvGrpSpPr>
+        <p:cNvPr id="1" name=""/>
+        <p:cNvGrpSpPr/>
+        <p:nvPr/>
+      </p:nvGrpSpPr>
+      <p:grpSpPr>
+        <a:xfrm>
+          <a:off x="0" y="0"/>
+          <a:ext cx="0" cy="0"/>
+          <a:chOff x="0" y="0"/>
+          <a:chExt cx="0" cy="0"/>
+        </a:xfrm>
+      </p:grpSpPr>
+      <p:sp>
+        <p:nvSpPr>
+          <p:cNvPr id="2" name="Title 1">
+            <a:extLst>
+              <a:ext uri="{FF2B5EF4-FFF2-40B4-BE49-F238E27FC236}">
+                <a16:creationId xmlns:a16="http://schemas.microsoft.com/office/drawing/2014/main" id="{948ACC61-B665-C340-A494-BC13CD4D7548}"/>
+              </a:ext>
+            </a:extLst>
+          </p:cNvPr>
+          <p:cNvSpPr>
+            <a:spLocks noGrp="1"/>
+          </p:cNvSpPr>
+          <p:nvPr>
+            <p:ph type="title"/>
+          </p:nvPr>
+        </p:nvSpPr>
+        <p:spPr/>
+        <p:txBody>
+          <a:bodyPr/>
+          <a:lstStyle/>
+          <a:p>
+            <a:r>
+              <a:rPr lang="en-US" dirty="0"/>
+              <a:t>Hands-On: Sampling ARMA Walkthrough</a:t>
+            </a:r>
+            <a:endParaRPr lang="en-US" i="0" dirty="0">
+              <a:latin typeface="Lucida Console" panose="020B0609040504020204" pitchFamily="49" charset="0"/>
+            </a:endParaRPr>
+          </a:p>
+        </p:txBody>
+      </p:sp>
+      <p:sp>
+        <p:nvSpPr>
+          <p:cNvPr id="3" name="Content Placeholder 2">
+            <a:extLst>
+              <a:ext uri="{FF2B5EF4-FFF2-40B4-BE49-F238E27FC236}">
+                <a16:creationId xmlns:a16="http://schemas.microsoft.com/office/drawing/2014/main" id="{DCA9CDD8-268E-FD42-B9AB-6B63C98F85B5}"/>
+              </a:ext>
+            </a:extLst>
+          </p:cNvPr>
+          <p:cNvSpPr>
+            <a:spLocks noGrp="1"/>
+          </p:cNvSpPr>
+          <p:nvPr>
+            <p:ph idx="1"/>
+          </p:nvPr>
+        </p:nvSpPr>
+        <p:spPr/>
+        <p:txBody>
+          <a:bodyPr/>
+          <a:lstStyle/>
+          <a:p>
+            <a:endParaRPr lang="en-US" dirty="0"/>
+          </a:p>
+          <a:p>
+            <a:endParaRPr lang="en-US" dirty="0"/>
+          </a:p>
+          <a:p>
+            <a:r>
+              <a:rPr lang="en-US" dirty="0" err="1"/>
+              <a:t>Unserialize</a:t>
+            </a:r>
+            <a:endParaRPr lang="en-US" dirty="0"/>
+          </a:p>
+          <a:p>
+            <a:endParaRPr lang="en-US" dirty="0"/>
+          </a:p>
+          <a:p>
+            <a:r>
+              <a:rPr lang="en-US" dirty="0"/>
+              <a:t>Sample</a:t>
+            </a:r>
+          </a:p>
+          <a:p>
+            <a:endParaRPr lang="en-US" dirty="0"/>
+          </a:p>
+          <a:p>
+            <a:r>
+              <a:rPr lang="en-US" dirty="0"/>
+              <a:t>Print/Plot</a:t>
+            </a:r>
+          </a:p>
+          <a:p>
+            <a:pPr marL="0" indent="0">
+              <a:buNone/>
+            </a:pPr>
+            <a:endParaRPr lang="en-US" dirty="0"/>
+          </a:p>
+        </p:txBody>
+      </p:sp>
+      <p:sp>
+        <p:nvSpPr>
+          <p:cNvPr id="5" name="Slide Number Placeholder 4">
+            <a:extLst>
+              <a:ext uri="{FF2B5EF4-FFF2-40B4-BE49-F238E27FC236}">
+                <a16:creationId xmlns:a16="http://schemas.microsoft.com/office/drawing/2014/main" id="{26822A84-07B8-7141-B715-6D4B1841CE7B}"/>
+              </a:ext>
+            </a:extLst>
+          </p:cNvPr>
+          <p:cNvSpPr>
+            <a:spLocks noGrp="1"/>
+          </p:cNvSpPr>
+          <p:nvPr>
+            <p:ph type="sldNum" sz="quarter" idx="11"/>
+          </p:nvPr>
+        </p:nvSpPr>
+        <p:spPr/>
+        <p:txBody>
+          <a:bodyPr/>
+          <a:lstStyle/>
+          <a:p>
+            <a:fld id="{4B4332F1-BAE3-4172-AA6D-91F763B329EF}" type="slidenum">
+              <a:rPr lang="en-US" smtClean="0"/>
+              <a:pPr/>
+              <a:t>22</a:t>
+            </a:fld>
+            <a:endParaRPr lang="en-US"/>
+          </a:p>
+        </p:txBody>
+      </p:sp>
+      <p:sp>
+        <p:nvSpPr>
+          <p:cNvPr id="6" name="TextBox 5">
+            <a:extLst>
+              <a:ext uri="{FF2B5EF4-FFF2-40B4-BE49-F238E27FC236}">
+                <a16:creationId xmlns:a16="http://schemas.microsoft.com/office/drawing/2014/main" id="{3F398C7C-25F3-BC43-B924-F3DA847DF16F}"/>
+              </a:ext>
+            </a:extLst>
+          </p:cNvPr>
+          <p:cNvSpPr txBox="1"/>
+          <p:nvPr/>
+        </p:nvSpPr>
+        <p:spPr>
+          <a:xfrm>
+            <a:off x="1131803" y="1538060"/>
+            <a:ext cx="7018268" cy="369332"/>
+          </a:xfrm>
+          <a:prstGeom prst="rect">
+            <a:avLst/>
+          </a:prstGeom>
+          <a:solidFill>
+            <a:schemeClr val="accent5"/>
+          </a:solidFill>
+        </p:spPr>
+        <p:txBody>
+          <a:bodyPr wrap="none" rtlCol="0">
+            <a:spAutoFit/>
+          </a:bodyPr>
+          <a:lstStyle/>
+          <a:p>
+            <a:r>
+              <a:rPr lang="en-US" sz="1800" dirty="0">
+                <a:latin typeface="Lucida Console" panose="020B0609040504020204" pitchFamily="49" charset="0"/>
+              </a:rPr>
+              <a:t>raven/docs/workshop/ARMA/exercise/</a:t>
+            </a:r>
+            <a:r>
+              <a:rPr lang="en-US" sz="1800" dirty="0" err="1">
+                <a:latin typeface="Lucida Console" panose="020B0609040504020204" pitchFamily="49" charset="0"/>
+              </a:rPr>
+              <a:t>sample_arma.xml</a:t>
+            </a:r>
+            <a:endParaRPr lang="en-US" sz="1800" dirty="0">
+              <a:latin typeface="Lucida Console" panose="020B0609040504020204" pitchFamily="49" charset="0"/>
+            </a:endParaRPr>
+          </a:p>
+        </p:txBody>
+      </p:sp>
+      <p:sp>
+        <p:nvSpPr>
+          <p:cNvPr id="4" name="TextBox 3">
+            <a:extLst>
+              <a:ext uri="{FF2B5EF4-FFF2-40B4-BE49-F238E27FC236}">
+                <a16:creationId xmlns:a16="http://schemas.microsoft.com/office/drawing/2014/main" id="{C15B48E5-DC1E-014B-999C-5C9DFF2BD970}"/>
+              </a:ext>
+            </a:extLst>
+          </p:cNvPr>
+          <p:cNvSpPr txBox="1"/>
+          <p:nvPr/>
+        </p:nvSpPr>
+        <p:spPr>
+          <a:xfrm>
+            <a:off x="3909915" y="2342736"/>
+            <a:ext cx="2970685" cy="369332"/>
+          </a:xfrm>
+          <a:prstGeom prst="rect">
+            <a:avLst/>
+          </a:prstGeom>
+          <a:solidFill>
+            <a:schemeClr val="tx1"/>
+          </a:solidFill>
+        </p:spPr>
+        <p:txBody>
+          <a:bodyPr wrap="none" rtlCol="0">
+            <a:spAutoFit/>
+          </a:bodyPr>
+          <a:lstStyle/>
+          <a:p>
+            <a:r>
+              <a:rPr lang="en-US" sz="1800" b="1" dirty="0">
+                <a:solidFill>
+                  <a:schemeClr val="accent1"/>
+                </a:solidFill>
+                <a:latin typeface="Lucida Console" panose="020B0609040504020204" pitchFamily="49" charset="0"/>
+              </a:rPr>
+              <a:t>&lt;</a:t>
+            </a:r>
+            <a:r>
+              <a:rPr lang="en-US" sz="1800" b="1" dirty="0" err="1">
+                <a:solidFill>
+                  <a:schemeClr val="accent1"/>
+                </a:solidFill>
+                <a:latin typeface="Lucida Console" panose="020B0609040504020204" pitchFamily="49" charset="0"/>
+              </a:rPr>
+              <a:t>IOStep</a:t>
+            </a:r>
+            <a:r>
+              <a:rPr lang="en-US" sz="1800" b="1" dirty="0">
+                <a:solidFill>
+                  <a:schemeClr val="accent1"/>
+                </a:solidFill>
+                <a:latin typeface="Lucida Console" panose="020B0609040504020204" pitchFamily="49" charset="0"/>
+              </a:rPr>
+              <a:t> name</a:t>
+            </a:r>
+            <a:r>
+              <a:rPr lang="en-US" sz="1800" b="1" dirty="0">
+                <a:solidFill>
+                  <a:schemeClr val="accent1"/>
+                </a:solidFill>
+                <a:latin typeface="Monaco" pitchFamily="2" charset="0"/>
+              </a:rPr>
+              <a:t>=“</a:t>
+            </a:r>
+            <a:r>
+              <a:rPr lang="en-US" sz="1800" b="1" dirty="0">
+                <a:solidFill>
+                  <a:schemeClr val="accent1"/>
+                </a:solidFill>
+                <a:latin typeface="Lucida Console" panose="020B0609040504020204" pitchFamily="49" charset="0"/>
+              </a:rPr>
+              <a:t>load”&gt;</a:t>
+            </a:r>
+          </a:p>
+        </p:txBody>
+      </p:sp>
+      <p:sp>
+        <p:nvSpPr>
+          <p:cNvPr id="8" name="TextBox 7">
+            <a:extLst>
+              <a:ext uri="{FF2B5EF4-FFF2-40B4-BE49-F238E27FC236}">
+                <a16:creationId xmlns:a16="http://schemas.microsoft.com/office/drawing/2014/main" id="{0D24C396-6687-EF44-898D-F2095D8AB6E5}"/>
+              </a:ext>
+            </a:extLst>
+          </p:cNvPr>
+          <p:cNvSpPr txBox="1"/>
+          <p:nvPr/>
+        </p:nvSpPr>
+        <p:spPr>
+          <a:xfrm>
+            <a:off x="3909915" y="3066369"/>
+            <a:ext cx="3906839" cy="369332"/>
+          </a:xfrm>
+          <a:prstGeom prst="rect">
+            <a:avLst/>
+          </a:prstGeom>
+          <a:solidFill>
+            <a:schemeClr val="tx1"/>
+          </a:solidFill>
+        </p:spPr>
+        <p:txBody>
+          <a:bodyPr wrap="none" rtlCol="0">
+            <a:spAutoFit/>
+          </a:bodyPr>
+          <a:lstStyle/>
+          <a:p>
+            <a:r>
+              <a:rPr lang="en-US" sz="1800" b="1" dirty="0">
+                <a:solidFill>
+                  <a:schemeClr val="accent1"/>
+                </a:solidFill>
+                <a:latin typeface="Monaco" pitchFamily="2" charset="0"/>
+              </a:rPr>
+              <a:t>&lt;</a:t>
+            </a:r>
+            <a:r>
+              <a:rPr lang="en-US" sz="1800" b="1" dirty="0" err="1">
+                <a:solidFill>
+                  <a:schemeClr val="accent1"/>
+                </a:solidFill>
+                <a:latin typeface="Monaco" pitchFamily="2" charset="0"/>
+              </a:rPr>
+              <a:t>PostProcess</a:t>
+            </a:r>
+            <a:r>
+              <a:rPr lang="en-US" sz="1800" b="1" dirty="0">
+                <a:solidFill>
+                  <a:schemeClr val="accent1"/>
+                </a:solidFill>
+                <a:latin typeface="Monaco" pitchFamily="2" charset="0"/>
+              </a:rPr>
+              <a:t> name=“sample”&gt;</a:t>
+            </a:r>
+          </a:p>
+        </p:txBody>
+      </p:sp>
+      <p:sp>
+        <p:nvSpPr>
+          <p:cNvPr id="9" name="TextBox 8">
+            <a:extLst>
+              <a:ext uri="{FF2B5EF4-FFF2-40B4-BE49-F238E27FC236}">
+                <a16:creationId xmlns:a16="http://schemas.microsoft.com/office/drawing/2014/main" id="{4541F76F-EA14-2D45-91A5-8140ECC62BFB}"/>
+              </a:ext>
+            </a:extLst>
+          </p:cNvPr>
+          <p:cNvSpPr txBox="1"/>
+          <p:nvPr/>
+        </p:nvSpPr>
+        <p:spPr>
+          <a:xfrm>
+            <a:off x="3909915" y="3808830"/>
+            <a:ext cx="3768980" cy="369332"/>
+          </a:xfrm>
+          <a:prstGeom prst="rect">
+            <a:avLst/>
+          </a:prstGeom>
+          <a:solidFill>
+            <a:schemeClr val="tx1"/>
+          </a:solidFill>
+        </p:spPr>
+        <p:txBody>
+          <a:bodyPr wrap="none" rtlCol="0">
+            <a:spAutoFit/>
+          </a:bodyPr>
+          <a:lstStyle/>
+          <a:p>
+            <a:r>
+              <a:rPr lang="en-US" sz="1800" b="1" dirty="0">
+                <a:solidFill>
+                  <a:schemeClr val="accent1"/>
+                </a:solidFill>
+                <a:latin typeface="Monaco" pitchFamily="2" charset="0"/>
+              </a:rPr>
+              <a:t>&lt;</a:t>
+            </a:r>
+            <a:r>
+              <a:rPr lang="en-US" sz="1800" b="1" dirty="0" err="1">
+                <a:solidFill>
+                  <a:schemeClr val="accent1"/>
+                </a:solidFill>
+                <a:latin typeface="Monaco" pitchFamily="2" charset="0"/>
+              </a:rPr>
+              <a:t>RomTrainer</a:t>
+            </a:r>
+            <a:r>
+              <a:rPr lang="en-US" sz="1800" b="1" dirty="0">
+                <a:solidFill>
+                  <a:schemeClr val="accent1"/>
+                </a:solidFill>
+                <a:latin typeface="Monaco" pitchFamily="2" charset="0"/>
+              </a:rPr>
+              <a:t> name=“output”&gt;</a:t>
+            </a:r>
+          </a:p>
+        </p:txBody>
+      </p:sp>
+    </p:spTree>
+    <p:extLst>
+      <p:ext uri="{BB962C8B-B14F-4D97-AF65-F5344CB8AC3E}">
+        <p14:creationId xmlns:p14="http://schemas.microsoft.com/office/powerpoint/2010/main" val="3817532309"/>
+      </p:ext>
+    </p:extLst>
+  </p:cSld>
+  <p:clrMapOvr>
+    <a:masterClrMapping/>
+  </p:clrMapOvr>
+</p:sld>
+</file>
+
+<file path=ppt/slides/slide24.xml><?xml version="1.0" encoding="utf-8"?>
+<p:sld xmlns:a="http://schemas.openxmlformats.org/drawingml/2006/main" xmlns:r="http://schemas.openxmlformats.org/officeDocument/2006/relationships" xmlns:p="http://schemas.openxmlformats.org/presentationml/2006/main">
+  <p:cSld>
+    <p:spTree>
+      <p:nvGrpSpPr>
+        <p:cNvPr id="1" name=""/>
+        <p:cNvGrpSpPr/>
+        <p:nvPr/>
+      </p:nvGrpSpPr>
+      <p:grpSpPr>
+        <a:xfrm>
+          <a:off x="0" y="0"/>
+          <a:ext cx="0" cy="0"/>
+          <a:chOff x="0" y="0"/>
+          <a:chExt cx="0" cy="0"/>
+        </a:xfrm>
+      </p:grpSpPr>
+      <p:sp>
+        <p:nvSpPr>
+          <p:cNvPr id="13" name="Content Placeholder 2">
+            <a:extLst>
+              <a:ext uri="{FF2B5EF4-FFF2-40B4-BE49-F238E27FC236}">
+                <a16:creationId xmlns:a16="http://schemas.microsoft.com/office/drawing/2014/main" id="{48DEFAD5-55F8-004C-B719-0B23DA5E298F}"/>
+              </a:ext>
+            </a:extLst>
+          </p:cNvPr>
+          <p:cNvSpPr txBox="1">
+            <a:spLocks/>
+          </p:cNvSpPr>
+          <p:nvPr/>
+        </p:nvSpPr>
+        <p:spPr bwMode="auto">
+          <a:xfrm>
+            <a:off x="2866665" y="5660029"/>
+            <a:ext cx="3409082" cy="806759"/>
+          </a:xfrm>
+          <a:prstGeom prst="rect">
+            <a:avLst/>
+          </a:prstGeom>
+          <a:noFill/>
+          <a:ln w="9525">
+            <a:noFill/>
+            <a:miter lim="800000"/>
+            <a:headEnd/>
+            <a:tailEnd/>
+          </a:ln>
+          <a:effectLst/>
+        </p:spPr>
+        <p:txBody>
+          <a:bodyPr vert="horz" wrap="square" lIns="0" tIns="0" rIns="0" bIns="0" numCol="1" anchor="t" anchorCtr="0" compatLnSpc="1">
+            <a:prstTxWarp prst="textNoShape">
+              <a:avLst/>
+            </a:prstTxWarp>
+          </a:bodyPr>
+          <a:lstStyle>
+            <a:lvl1pPr marL="230188" indent="-230188" algn="l" rtl="0" eaLnBrk="0" fontAlgn="base" hangingPunct="0">
+              <a:lnSpc>
+                <a:spcPct val="85000"/>
+              </a:lnSpc>
+              <a:spcBef>
+                <a:spcPct val="40000"/>
+              </a:spcBef>
+              <a:spcAft>
+                <a:spcPct val="0"/>
+              </a:spcAft>
+              <a:buClr>
+                <a:srgbClr val="FF6600"/>
+              </a:buClr>
+              <a:buChar char="•"/>
+              <a:defRPr sz="2000">
+                <a:solidFill>
+                  <a:schemeClr val="tx1"/>
+                </a:solidFill>
+                <a:latin typeface="+mn-lt"/>
+                <a:ea typeface="+mn-ea"/>
+                <a:cs typeface="+mn-cs"/>
+              </a:defRPr>
+            </a:lvl1pPr>
+            <a:lvl2pPr marL="684213" indent="-227013" algn="l" rtl="0" eaLnBrk="0" fontAlgn="base" hangingPunct="0">
+              <a:lnSpc>
+                <a:spcPct val="85000"/>
+              </a:lnSpc>
+              <a:spcBef>
+                <a:spcPct val="20000"/>
+              </a:spcBef>
+              <a:spcAft>
+                <a:spcPct val="0"/>
+              </a:spcAft>
+              <a:buClr>
+                <a:srgbClr val="FF6600"/>
+              </a:buClr>
+              <a:buFont typeface="Times New Roman" pitchFamily="18" charset="0"/>
+              <a:buChar char="–"/>
+              <a:defRPr sz="2000">
+                <a:solidFill>
+                  <a:schemeClr val="tx1"/>
+                </a:solidFill>
+                <a:latin typeface="+mn-lt"/>
+              </a:defRPr>
+            </a:lvl2pPr>
+            <a:lvl3pPr marL="1143000" indent="-228600" algn="l" rtl="0" eaLnBrk="0" fontAlgn="base" hangingPunct="0">
+              <a:lnSpc>
+                <a:spcPct val="85000"/>
+              </a:lnSpc>
+              <a:spcBef>
+                <a:spcPct val="20000"/>
+              </a:spcBef>
+              <a:spcAft>
+                <a:spcPct val="0"/>
+              </a:spcAft>
+              <a:buClr>
+                <a:srgbClr val="FF6600"/>
+              </a:buClr>
+              <a:buChar char="•"/>
+              <a:defRPr sz="2000">
+                <a:solidFill>
+                  <a:schemeClr val="tx1"/>
+                </a:solidFill>
+                <a:latin typeface="+mn-lt"/>
+              </a:defRPr>
+            </a:lvl3pPr>
+            <a:lvl4pPr marL="1600200" indent="-228600" algn="l" rtl="0" eaLnBrk="0" fontAlgn="base" hangingPunct="0">
+              <a:lnSpc>
+                <a:spcPct val="85000"/>
+              </a:lnSpc>
+              <a:spcBef>
+                <a:spcPct val="20000"/>
+              </a:spcBef>
+              <a:spcAft>
+                <a:spcPct val="0"/>
+              </a:spcAft>
+              <a:buClr>
+                <a:srgbClr val="FF6600"/>
+              </a:buClr>
+              <a:buFont typeface="Times New Roman" pitchFamily="18" charset="0"/>
+              <a:buChar char="–"/>
+              <a:defRPr sz="2000">
+                <a:solidFill>
+                  <a:schemeClr val="tx1"/>
+                </a:solidFill>
+                <a:latin typeface="+mn-lt"/>
+              </a:defRPr>
+            </a:lvl4pPr>
+            <a:lvl5pPr marL="2057400" indent="-228600" algn="l" rtl="0" eaLnBrk="0" fontAlgn="base" hangingPunct="0">
+              <a:lnSpc>
+                <a:spcPct val="85000"/>
+              </a:lnSpc>
+              <a:spcBef>
+                <a:spcPct val="20000"/>
+              </a:spcBef>
+              <a:spcAft>
+                <a:spcPct val="0"/>
+              </a:spcAft>
+              <a:buClr>
+                <a:srgbClr val="FF6600"/>
+              </a:buClr>
+              <a:buChar char="•"/>
+              <a:defRPr sz="2000">
+                <a:solidFill>
+                  <a:schemeClr val="tx1"/>
+                </a:solidFill>
+                <a:latin typeface="+mn-lt"/>
+              </a:defRPr>
+            </a:lvl5pPr>
+            <a:lvl6pPr marL="2514600" indent="-228600" algn="l" rtl="0" eaLnBrk="0" fontAlgn="base" hangingPunct="0">
+              <a:lnSpc>
+                <a:spcPct val="85000"/>
+              </a:lnSpc>
+              <a:spcBef>
+                <a:spcPct val="20000"/>
+              </a:spcBef>
+              <a:spcAft>
+                <a:spcPct val="0"/>
+              </a:spcAft>
+              <a:buClr>
+                <a:srgbClr val="FF6600"/>
+              </a:buClr>
+              <a:buChar char="•"/>
+              <a:defRPr sz="2000">
+                <a:solidFill>
+                  <a:schemeClr val="tx1"/>
+                </a:solidFill>
+                <a:latin typeface="+mn-lt"/>
+              </a:defRPr>
+            </a:lvl6pPr>
+            <a:lvl7pPr marL="2971800" indent="-228600" algn="l" rtl="0" eaLnBrk="0" fontAlgn="base" hangingPunct="0">
+              <a:lnSpc>
+                <a:spcPct val="85000"/>
+              </a:lnSpc>
+              <a:spcBef>
+                <a:spcPct val="20000"/>
+              </a:spcBef>
+              <a:spcAft>
+                <a:spcPct val="0"/>
+              </a:spcAft>
+              <a:buClr>
+                <a:srgbClr val="FF6600"/>
+              </a:buClr>
+              <a:buChar char="•"/>
+              <a:defRPr sz="2000">
+                <a:solidFill>
+                  <a:schemeClr val="tx1"/>
+                </a:solidFill>
+                <a:latin typeface="+mn-lt"/>
+              </a:defRPr>
+            </a:lvl7pPr>
+            <a:lvl8pPr marL="3429000" indent="-228600" algn="l" rtl="0" eaLnBrk="0" fontAlgn="base" hangingPunct="0">
+              <a:lnSpc>
+                <a:spcPct val="85000"/>
+              </a:lnSpc>
+              <a:spcBef>
+                <a:spcPct val="20000"/>
+              </a:spcBef>
+              <a:spcAft>
+                <a:spcPct val="0"/>
+              </a:spcAft>
+              <a:buClr>
+                <a:srgbClr val="FF6600"/>
+              </a:buClr>
+              <a:buChar char="•"/>
+              <a:defRPr sz="2000">
+                <a:solidFill>
+                  <a:schemeClr val="tx1"/>
+                </a:solidFill>
+                <a:latin typeface="+mn-lt"/>
+              </a:defRPr>
+            </a:lvl8pPr>
+            <a:lvl9pPr marL="3886200" indent="-228600" algn="l" rtl="0" eaLnBrk="0" fontAlgn="base" hangingPunct="0">
+              <a:lnSpc>
+                <a:spcPct val="85000"/>
+              </a:lnSpc>
+              <a:spcBef>
+                <a:spcPct val="20000"/>
+              </a:spcBef>
+              <a:spcAft>
+                <a:spcPct val="0"/>
+              </a:spcAft>
+              <a:buClr>
+                <a:srgbClr val="FF6600"/>
+              </a:buClr>
+              <a:buChar char="•"/>
+              <a:defRPr sz="2000">
+                <a:solidFill>
+                  <a:schemeClr val="tx1"/>
+                </a:solidFill>
+                <a:latin typeface="+mn-lt"/>
+              </a:defRPr>
+            </a:lvl9pPr>
+          </a:lstStyle>
+          <a:p>
+            <a:pPr marL="0" indent="0" algn="ctr">
+              <a:buFontTx/>
+              <a:buNone/>
+            </a:pPr>
+            <a:r>
+              <a:rPr lang="en-US" kern="0" dirty="0"/>
+              <a:t>          </a:t>
+            </a:r>
+          </a:p>
+          <a:p>
+            <a:pPr marL="0" indent="0" algn="ctr">
+              <a:buNone/>
+            </a:pPr>
+            <a:r>
+              <a:rPr lang="en-US" kern="0" dirty="0"/>
+              <a:t>After you finish, try running!</a:t>
+            </a:r>
+          </a:p>
+        </p:txBody>
+      </p:sp>
+      <p:sp>
+        <p:nvSpPr>
+          <p:cNvPr id="12" name="Content Placeholder 2">
+            <a:extLst>
+              <a:ext uri="{FF2B5EF4-FFF2-40B4-BE49-F238E27FC236}">
+                <a16:creationId xmlns:a16="http://schemas.microsoft.com/office/drawing/2014/main" id="{7F4C0C72-6142-A241-B83C-3C28C017B5A3}"/>
+              </a:ext>
+            </a:extLst>
+          </p:cNvPr>
+          <p:cNvSpPr txBox="1">
+            <a:spLocks/>
+          </p:cNvSpPr>
+          <p:nvPr/>
+        </p:nvSpPr>
+        <p:spPr bwMode="auto">
+          <a:xfrm>
+            <a:off x="503884" y="5260179"/>
+            <a:ext cx="8201769" cy="806759"/>
+          </a:xfrm>
+          <a:prstGeom prst="rect">
+            <a:avLst/>
+          </a:prstGeom>
+          <a:noFill/>
+          <a:ln w="9525">
+            <a:noFill/>
+            <a:miter lim="800000"/>
+            <a:headEnd/>
+            <a:tailEnd/>
+          </a:ln>
+          <a:effectLst/>
+        </p:spPr>
+        <p:txBody>
+          <a:bodyPr vert="horz" wrap="square" lIns="0" tIns="0" rIns="0" bIns="0" numCol="1" anchor="t" anchorCtr="0" compatLnSpc="1">
+            <a:prstTxWarp prst="textNoShape">
+              <a:avLst/>
+            </a:prstTxWarp>
+          </a:bodyPr>
+          <a:lstStyle>
+            <a:lvl1pPr marL="230188" indent="-230188" algn="l" rtl="0" eaLnBrk="0" fontAlgn="base" hangingPunct="0">
+              <a:lnSpc>
+                <a:spcPct val="85000"/>
+              </a:lnSpc>
+              <a:spcBef>
+                <a:spcPct val="40000"/>
+              </a:spcBef>
+              <a:spcAft>
+                <a:spcPct val="0"/>
+              </a:spcAft>
+              <a:buClr>
+                <a:srgbClr val="FF6600"/>
+              </a:buClr>
+              <a:buChar char="•"/>
+              <a:defRPr sz="2000">
+                <a:solidFill>
+                  <a:schemeClr val="tx1"/>
+                </a:solidFill>
+                <a:latin typeface="+mn-lt"/>
+                <a:ea typeface="+mn-ea"/>
+                <a:cs typeface="+mn-cs"/>
+              </a:defRPr>
+            </a:lvl1pPr>
+            <a:lvl2pPr marL="684213" indent="-227013" algn="l" rtl="0" eaLnBrk="0" fontAlgn="base" hangingPunct="0">
+              <a:lnSpc>
+                <a:spcPct val="85000"/>
+              </a:lnSpc>
+              <a:spcBef>
+                <a:spcPct val="20000"/>
+              </a:spcBef>
+              <a:spcAft>
+                <a:spcPct val="0"/>
+              </a:spcAft>
+              <a:buClr>
+                <a:srgbClr val="FF6600"/>
+              </a:buClr>
+              <a:buFont typeface="Times New Roman" pitchFamily="18" charset="0"/>
+              <a:buChar char="–"/>
+              <a:defRPr sz="2000">
+                <a:solidFill>
+                  <a:schemeClr val="tx1"/>
+                </a:solidFill>
+                <a:latin typeface="+mn-lt"/>
+              </a:defRPr>
+            </a:lvl2pPr>
+            <a:lvl3pPr marL="1143000" indent="-228600" algn="l" rtl="0" eaLnBrk="0" fontAlgn="base" hangingPunct="0">
+              <a:lnSpc>
+                <a:spcPct val="85000"/>
+              </a:lnSpc>
+              <a:spcBef>
+                <a:spcPct val="20000"/>
+              </a:spcBef>
+              <a:spcAft>
+                <a:spcPct val="0"/>
+              </a:spcAft>
+              <a:buClr>
+                <a:srgbClr val="FF6600"/>
+              </a:buClr>
+              <a:buChar char="•"/>
+              <a:defRPr sz="2000">
+                <a:solidFill>
+                  <a:schemeClr val="tx1"/>
+                </a:solidFill>
+                <a:latin typeface="+mn-lt"/>
+              </a:defRPr>
+            </a:lvl3pPr>
+            <a:lvl4pPr marL="1600200" indent="-228600" algn="l" rtl="0" eaLnBrk="0" fontAlgn="base" hangingPunct="0">
+              <a:lnSpc>
+                <a:spcPct val="85000"/>
+              </a:lnSpc>
+              <a:spcBef>
+                <a:spcPct val="20000"/>
+              </a:spcBef>
+              <a:spcAft>
+                <a:spcPct val="0"/>
+              </a:spcAft>
+              <a:buClr>
+                <a:srgbClr val="FF6600"/>
+              </a:buClr>
+              <a:buFont typeface="Times New Roman" pitchFamily="18" charset="0"/>
+              <a:buChar char="–"/>
+              <a:defRPr sz="2000">
+                <a:solidFill>
+                  <a:schemeClr val="tx1"/>
+                </a:solidFill>
+                <a:latin typeface="+mn-lt"/>
+              </a:defRPr>
+            </a:lvl4pPr>
+            <a:lvl5pPr marL="2057400" indent="-228600" algn="l" rtl="0" eaLnBrk="0" fontAlgn="base" hangingPunct="0">
+              <a:lnSpc>
+                <a:spcPct val="85000"/>
+              </a:lnSpc>
+              <a:spcBef>
+                <a:spcPct val="20000"/>
+              </a:spcBef>
+              <a:spcAft>
+                <a:spcPct val="0"/>
+              </a:spcAft>
+              <a:buClr>
+                <a:srgbClr val="FF6600"/>
+              </a:buClr>
+              <a:buChar char="•"/>
+              <a:defRPr sz="2000">
+                <a:solidFill>
+                  <a:schemeClr val="tx1"/>
+                </a:solidFill>
+                <a:latin typeface="+mn-lt"/>
+              </a:defRPr>
+            </a:lvl5pPr>
+            <a:lvl6pPr marL="2514600" indent="-228600" algn="l" rtl="0" eaLnBrk="0" fontAlgn="base" hangingPunct="0">
+              <a:lnSpc>
+                <a:spcPct val="85000"/>
+              </a:lnSpc>
+              <a:spcBef>
+                <a:spcPct val="20000"/>
+              </a:spcBef>
+              <a:spcAft>
+                <a:spcPct val="0"/>
+              </a:spcAft>
+              <a:buClr>
+                <a:srgbClr val="FF6600"/>
+              </a:buClr>
+              <a:buChar char="•"/>
+              <a:defRPr sz="2000">
+                <a:solidFill>
+                  <a:schemeClr val="tx1"/>
+                </a:solidFill>
+                <a:latin typeface="+mn-lt"/>
+              </a:defRPr>
+            </a:lvl6pPr>
+            <a:lvl7pPr marL="2971800" indent="-228600" algn="l" rtl="0" eaLnBrk="0" fontAlgn="base" hangingPunct="0">
+              <a:lnSpc>
+                <a:spcPct val="85000"/>
+              </a:lnSpc>
+              <a:spcBef>
+                <a:spcPct val="20000"/>
+              </a:spcBef>
+              <a:spcAft>
+                <a:spcPct val="0"/>
+              </a:spcAft>
+              <a:buClr>
+                <a:srgbClr val="FF6600"/>
+              </a:buClr>
+              <a:buChar char="•"/>
+              <a:defRPr sz="2000">
+                <a:solidFill>
+                  <a:schemeClr val="tx1"/>
+                </a:solidFill>
+                <a:latin typeface="+mn-lt"/>
+              </a:defRPr>
+            </a:lvl7pPr>
+            <a:lvl8pPr marL="3429000" indent="-228600" algn="l" rtl="0" eaLnBrk="0" fontAlgn="base" hangingPunct="0">
+              <a:lnSpc>
+                <a:spcPct val="85000"/>
+              </a:lnSpc>
+              <a:spcBef>
+                <a:spcPct val="20000"/>
+              </a:spcBef>
+              <a:spcAft>
+                <a:spcPct val="0"/>
+              </a:spcAft>
+              <a:buClr>
+                <a:srgbClr val="FF6600"/>
+              </a:buClr>
+              <a:buChar char="•"/>
+              <a:defRPr sz="2000">
+                <a:solidFill>
+                  <a:schemeClr val="tx1"/>
+                </a:solidFill>
+                <a:latin typeface="+mn-lt"/>
+              </a:defRPr>
+            </a:lvl8pPr>
+            <a:lvl9pPr marL="3886200" indent="-228600" algn="l" rtl="0" eaLnBrk="0" fontAlgn="base" hangingPunct="0">
+              <a:lnSpc>
+                <a:spcPct val="85000"/>
+              </a:lnSpc>
+              <a:spcBef>
+                <a:spcPct val="20000"/>
+              </a:spcBef>
+              <a:spcAft>
+                <a:spcPct val="0"/>
+              </a:spcAft>
+              <a:buClr>
+                <a:srgbClr val="FF6600"/>
+              </a:buClr>
+              <a:buChar char="•"/>
+              <a:defRPr sz="2000">
+                <a:solidFill>
+                  <a:schemeClr val="tx1"/>
+                </a:solidFill>
+                <a:latin typeface="+mn-lt"/>
+              </a:defRPr>
+            </a:lvl9pPr>
+          </a:lstStyle>
+          <a:p>
+            <a:pPr marL="0" indent="0">
+              <a:buFontTx/>
+              <a:buNone/>
+            </a:pPr>
+            <a:endParaRPr lang="en-US" kern="0" dirty="0"/>
+          </a:p>
+          <a:p>
+            <a:pPr marL="0" indent="0">
+              <a:buNone/>
+            </a:pPr>
+            <a:r>
+              <a:rPr lang="en-US" kern="0" dirty="0"/>
+              <a:t>Each task is marked with a                             , ignore</a:t>
+            </a:r>
+          </a:p>
+        </p:txBody>
+      </p:sp>
+      <p:sp>
+        <p:nvSpPr>
+          <p:cNvPr id="2" name="Title 1">
+            <a:extLst>
+              <a:ext uri="{FF2B5EF4-FFF2-40B4-BE49-F238E27FC236}">
+                <a16:creationId xmlns:a16="http://schemas.microsoft.com/office/drawing/2014/main" id="{948ACC61-B665-C340-A494-BC13CD4D7548}"/>
+              </a:ext>
+            </a:extLst>
+          </p:cNvPr>
+          <p:cNvSpPr>
+            <a:spLocks noGrp="1"/>
+          </p:cNvSpPr>
+          <p:nvPr>
+            <p:ph type="title"/>
+          </p:nvPr>
+        </p:nvSpPr>
+        <p:spPr/>
+        <p:txBody>
+          <a:bodyPr/>
+          <a:lstStyle/>
+          <a:p>
+            <a:r>
+              <a:rPr lang="en-US" dirty="0"/>
+              <a:t>Hands-On: Sampling ARMA Exercises</a:t>
+            </a:r>
+            <a:endParaRPr lang="en-US" i="0" dirty="0">
+              <a:latin typeface="Lucida Console" panose="020B0609040504020204" pitchFamily="49" charset="0"/>
+            </a:endParaRPr>
+          </a:p>
+        </p:txBody>
+      </p:sp>
+      <p:sp>
+        <p:nvSpPr>
+          <p:cNvPr id="3" name="Content Placeholder 2">
+            <a:extLst>
+              <a:ext uri="{FF2B5EF4-FFF2-40B4-BE49-F238E27FC236}">
+                <a16:creationId xmlns:a16="http://schemas.microsoft.com/office/drawing/2014/main" id="{DCA9CDD8-268E-FD42-B9AB-6B63C98F85B5}"/>
+              </a:ext>
+            </a:extLst>
+          </p:cNvPr>
+          <p:cNvSpPr>
+            <a:spLocks noGrp="1"/>
+          </p:cNvSpPr>
+          <p:nvPr>
+            <p:ph idx="1"/>
+          </p:nvPr>
+        </p:nvSpPr>
+        <p:spPr>
+          <a:xfrm>
+            <a:off x="474467" y="1598614"/>
+            <a:ext cx="8231187" cy="3831226"/>
+          </a:xfrm>
+        </p:spPr>
+        <p:txBody>
+          <a:bodyPr numCol="2"/>
+          <a:lstStyle/>
+          <a:p>
+            <a:pPr marL="0" indent="0">
+              <a:buNone/>
+            </a:pPr>
+            <a:endParaRPr lang="en-US" dirty="0"/>
+          </a:p>
+          <a:p>
+            <a:pPr marL="0" indent="0">
+              <a:buNone/>
+            </a:pPr>
+            <a:r>
+              <a:rPr lang="en-US" dirty="0"/>
+              <a:t>Fill in the following:</a:t>
+            </a:r>
+          </a:p>
+          <a:p>
+            <a:r>
+              <a:rPr lang="en-US" dirty="0" err="1"/>
+              <a:t>RunInfo</a:t>
+            </a:r>
+            <a:endParaRPr lang="en-US" dirty="0"/>
+          </a:p>
+          <a:p>
+            <a:pPr lvl="1"/>
+            <a:r>
+              <a:rPr lang="en-US" dirty="0"/>
+              <a:t>Sequence</a:t>
+            </a:r>
+          </a:p>
+          <a:p>
+            <a:r>
+              <a:rPr lang="en-US" dirty="0" err="1"/>
+              <a:t>DataObjects</a:t>
+            </a:r>
+            <a:endParaRPr lang="en-US" dirty="0"/>
+          </a:p>
+          <a:p>
+            <a:pPr lvl="1"/>
+            <a:r>
+              <a:rPr lang="en-US" dirty="0"/>
+              <a:t>Input</a:t>
+            </a:r>
+          </a:p>
+          <a:p>
+            <a:pPr lvl="1"/>
+            <a:r>
+              <a:rPr lang="en-US" dirty="0"/>
+              <a:t>Output</a:t>
+            </a:r>
+          </a:p>
+          <a:p>
+            <a:pPr lvl="1"/>
+            <a:r>
+              <a:rPr lang="en-US" dirty="0" err="1"/>
+              <a:t>pivotParameter</a:t>
+            </a:r>
+            <a:endParaRPr lang="en-US" dirty="0"/>
+          </a:p>
+          <a:p>
+            <a:r>
+              <a:rPr lang="en-US" dirty="0"/>
+              <a:t>Files</a:t>
+            </a:r>
+          </a:p>
+          <a:p>
+            <a:pPr lvl="1"/>
+            <a:r>
+              <a:rPr lang="en-US" dirty="0"/>
+              <a:t>Serialized ARMA file</a:t>
+            </a:r>
+          </a:p>
+          <a:p>
+            <a:endParaRPr lang="en-US" dirty="0"/>
+          </a:p>
+          <a:p>
+            <a:endParaRPr lang="en-US" dirty="0"/>
+          </a:p>
+          <a:p>
+            <a:endParaRPr lang="en-US" dirty="0"/>
+          </a:p>
+          <a:p>
+            <a:r>
+              <a:rPr lang="en-US" dirty="0"/>
+              <a:t>Samplers</a:t>
+            </a:r>
+          </a:p>
+          <a:p>
+            <a:pPr lvl="1"/>
+            <a:r>
+              <a:rPr lang="en-US" dirty="0"/>
+              <a:t>Number of Samples</a:t>
+            </a:r>
+          </a:p>
+          <a:p>
+            <a:pPr lvl="1"/>
+            <a:r>
+              <a:rPr lang="en-US" dirty="0"/>
+              <a:t>Seed</a:t>
+            </a:r>
+          </a:p>
+          <a:p>
+            <a:r>
+              <a:rPr lang="en-US" dirty="0"/>
+              <a:t>ARMA ROM</a:t>
+            </a:r>
+          </a:p>
+          <a:p>
+            <a:pPr lvl="1"/>
+            <a:r>
+              <a:rPr lang="en-US" dirty="0"/>
+              <a:t>Target</a:t>
+            </a:r>
+          </a:p>
+          <a:p>
+            <a:pPr lvl="1"/>
+            <a:r>
+              <a:rPr lang="en-US" dirty="0"/>
+              <a:t>Features</a:t>
+            </a:r>
+          </a:p>
+          <a:p>
+            <a:pPr lvl="1"/>
+            <a:r>
+              <a:rPr lang="en-US" dirty="0" err="1"/>
+              <a:t>pivotParameter</a:t>
+            </a:r>
+            <a:endParaRPr lang="en-US" dirty="0"/>
+          </a:p>
+        </p:txBody>
+      </p:sp>
+      <p:sp>
+        <p:nvSpPr>
+          <p:cNvPr id="5" name="Slide Number Placeholder 4">
+            <a:extLst>
+              <a:ext uri="{FF2B5EF4-FFF2-40B4-BE49-F238E27FC236}">
+                <a16:creationId xmlns:a16="http://schemas.microsoft.com/office/drawing/2014/main" id="{26822A84-07B8-7141-B715-6D4B1841CE7B}"/>
+              </a:ext>
+            </a:extLst>
+          </p:cNvPr>
+          <p:cNvSpPr>
+            <a:spLocks noGrp="1"/>
+          </p:cNvSpPr>
+          <p:nvPr>
+            <p:ph type="sldNum" sz="quarter" idx="11"/>
+          </p:nvPr>
+        </p:nvSpPr>
+        <p:spPr/>
+        <p:txBody>
+          <a:bodyPr/>
+          <a:lstStyle/>
+          <a:p>
+            <a:fld id="{4B4332F1-BAE3-4172-AA6D-91F763B329EF}" type="slidenum">
+              <a:rPr lang="en-US" smtClean="0"/>
+              <a:pPr/>
+              <a:t>23</a:t>
+            </a:fld>
+            <a:endParaRPr lang="en-US"/>
+          </a:p>
+        </p:txBody>
+      </p:sp>
+      <p:sp>
+        <p:nvSpPr>
+          <p:cNvPr id="6" name="TextBox 5">
+            <a:extLst>
+              <a:ext uri="{FF2B5EF4-FFF2-40B4-BE49-F238E27FC236}">
+                <a16:creationId xmlns:a16="http://schemas.microsoft.com/office/drawing/2014/main" id="{3F398C7C-25F3-BC43-B924-F3DA847DF16F}"/>
+              </a:ext>
+            </a:extLst>
+          </p:cNvPr>
+          <p:cNvSpPr txBox="1"/>
+          <p:nvPr/>
+        </p:nvSpPr>
+        <p:spPr>
+          <a:xfrm>
+            <a:off x="1131803" y="1538060"/>
+            <a:ext cx="7018268" cy="369332"/>
+          </a:xfrm>
+          <a:prstGeom prst="rect">
+            <a:avLst/>
+          </a:prstGeom>
+          <a:solidFill>
+            <a:schemeClr val="accent5"/>
+          </a:solidFill>
+        </p:spPr>
+        <p:txBody>
+          <a:bodyPr wrap="none" rtlCol="0">
+            <a:spAutoFit/>
+          </a:bodyPr>
+          <a:lstStyle/>
+          <a:p>
+            <a:r>
+              <a:rPr lang="en-US" sz="1800" dirty="0">
+                <a:latin typeface="Lucida Console" panose="020B0609040504020204" pitchFamily="49" charset="0"/>
+              </a:rPr>
+              <a:t>raven/docs/workshop/ARMA/exercise/</a:t>
+            </a:r>
+            <a:r>
+              <a:rPr lang="en-US" sz="1800" dirty="0" err="1">
+                <a:latin typeface="Lucida Console" panose="020B0609040504020204" pitchFamily="49" charset="0"/>
+              </a:rPr>
+              <a:t>sample_arma.xml</a:t>
+            </a:r>
+            <a:endParaRPr lang="en-US" sz="1800" dirty="0">
+              <a:latin typeface="Lucida Console" panose="020B0609040504020204" pitchFamily="49" charset="0"/>
+            </a:endParaRPr>
+          </a:p>
+        </p:txBody>
+      </p:sp>
+      <p:sp>
+        <p:nvSpPr>
+          <p:cNvPr id="10" name="TextBox 9">
+            <a:extLst>
+              <a:ext uri="{FF2B5EF4-FFF2-40B4-BE49-F238E27FC236}">
+                <a16:creationId xmlns:a16="http://schemas.microsoft.com/office/drawing/2014/main" id="{66643690-B98F-A545-8879-BBC215973AFB}"/>
+              </a:ext>
+            </a:extLst>
+          </p:cNvPr>
+          <p:cNvSpPr txBox="1"/>
+          <p:nvPr/>
+        </p:nvSpPr>
+        <p:spPr>
+          <a:xfrm>
+            <a:off x="3563741" y="5565632"/>
+            <a:ext cx="1978427" cy="369332"/>
+          </a:xfrm>
+          <a:prstGeom prst="rect">
+            <a:avLst/>
+          </a:prstGeom>
+          <a:solidFill>
+            <a:schemeClr val="tx1"/>
+          </a:solidFill>
+        </p:spPr>
+        <p:txBody>
+          <a:bodyPr wrap="none" rtlCol="0">
+            <a:spAutoFit/>
+          </a:bodyPr>
+          <a:lstStyle/>
+          <a:p>
+            <a:r>
+              <a:rPr lang="en-US" sz="1800" b="1" dirty="0">
+                <a:solidFill>
+                  <a:schemeClr val="accent1"/>
+                </a:solidFill>
+                <a:latin typeface="Lucida Console" panose="020B0609040504020204" pitchFamily="49" charset="0"/>
+              </a:rPr>
+              <a:t>&lt;</a:t>
+            </a:r>
+            <a:r>
+              <a:rPr lang="en-US" sz="1800" b="1" dirty="0">
+                <a:solidFill>
+                  <a:schemeClr val="accent1"/>
+                </a:solidFill>
+                <a:latin typeface="Monaco" pitchFamily="2" charset="0"/>
+              </a:rPr>
+              <a:t>!–- TODO --&gt;</a:t>
+            </a:r>
+            <a:endParaRPr lang="en-US" sz="1800" b="1" dirty="0">
+              <a:solidFill>
+                <a:schemeClr val="accent1"/>
+              </a:solidFill>
+              <a:latin typeface="Lucida Console" panose="020B0609040504020204" pitchFamily="49" charset="0"/>
+            </a:endParaRPr>
+          </a:p>
+        </p:txBody>
+      </p:sp>
+      <p:sp>
+        <p:nvSpPr>
+          <p:cNvPr id="14" name="TextBox 13">
+            <a:extLst>
+              <a:ext uri="{FF2B5EF4-FFF2-40B4-BE49-F238E27FC236}">
+                <a16:creationId xmlns:a16="http://schemas.microsoft.com/office/drawing/2014/main" id="{73F076D9-C125-2549-800A-83F2680D17E4}"/>
+              </a:ext>
+            </a:extLst>
+          </p:cNvPr>
+          <p:cNvSpPr txBox="1"/>
+          <p:nvPr/>
+        </p:nvSpPr>
+        <p:spPr>
+          <a:xfrm>
+            <a:off x="1550186" y="6317792"/>
+            <a:ext cx="6181500" cy="369332"/>
+          </a:xfrm>
+          <a:prstGeom prst="rect">
+            <a:avLst/>
+          </a:prstGeom>
+          <a:solidFill>
+            <a:schemeClr val="accent5"/>
+          </a:solidFill>
+        </p:spPr>
+        <p:txBody>
+          <a:bodyPr wrap="none" rtlCol="0">
+            <a:spAutoFit/>
+          </a:bodyPr>
+          <a:lstStyle/>
+          <a:p>
+            <a:r>
+              <a:rPr lang="en-US" sz="1800" dirty="0">
+                <a:latin typeface="Lucida Console" panose="020B0609040504020204" pitchFamily="49" charset="0"/>
+              </a:rPr>
+              <a:t>../../../../</a:t>
+            </a:r>
+            <a:r>
+              <a:rPr lang="en-US" sz="1800" dirty="0" err="1">
+                <a:latin typeface="Lucida Console" panose="020B0609040504020204" pitchFamily="49" charset="0"/>
+              </a:rPr>
+              <a:t>raven_framework</a:t>
+            </a:r>
+            <a:r>
+              <a:rPr lang="en-US" sz="1800" dirty="0">
+                <a:latin typeface="Lucida Console" panose="020B0609040504020204" pitchFamily="49" charset="0"/>
+              </a:rPr>
+              <a:t> </a:t>
+            </a:r>
+            <a:r>
+              <a:rPr lang="en-US" sz="1800" dirty="0" err="1">
+                <a:latin typeface="Lucida Console" panose="020B0609040504020204" pitchFamily="49" charset="0"/>
+              </a:rPr>
+              <a:t>sample_arma.xml</a:t>
+            </a:r>
+            <a:endParaRPr lang="en-US" sz="1800" dirty="0">
+              <a:latin typeface="Lucida Console" panose="020B0609040504020204" pitchFamily="49" charset="0"/>
+            </a:endParaRPr>
+          </a:p>
+        </p:txBody>
+      </p:sp>
+      <p:sp>
+        <p:nvSpPr>
+          <p:cNvPr id="15" name="Frame 14">
+            <a:extLst>
+              <a:ext uri="{FF2B5EF4-FFF2-40B4-BE49-F238E27FC236}">
+                <a16:creationId xmlns:a16="http://schemas.microsoft.com/office/drawing/2014/main" id="{7B759CDA-1E22-4A4D-BB27-3CB1EF50C9E3}"/>
+              </a:ext>
+            </a:extLst>
+          </p:cNvPr>
+          <p:cNvSpPr/>
+          <p:nvPr/>
+        </p:nvSpPr>
+        <p:spPr bwMode="auto">
+          <a:xfrm>
+            <a:off x="388060" y="2256377"/>
+            <a:ext cx="8366289" cy="3129700"/>
+          </a:xfrm>
+          <a:prstGeom prst="frame">
+            <a:avLst>
+              <a:gd name="adj1" fmla="val 1355"/>
+            </a:avLst>
+          </a:prstGeom>
+          <a:solidFill>
+            <a:schemeClr val="accent2"/>
+          </a:solidFill>
+          <a:ln w="9525" cap="flat" cmpd="sng" algn="ctr">
+            <a:solidFill>
+              <a:schemeClr val="tx1"/>
+            </a:solidFill>
+            <a:prstDash val="solid"/>
+            <a:round/>
+            <a:headEnd type="none" w="med" len="med"/>
+            <a:tailEnd type="none" w="med" len="med"/>
+          </a:ln>
+          <a:effectLst/>
+        </p:spPr>
+        <p:txBody>
+          <a:bodyPr vert="horz" wrap="square" lIns="91440" tIns="45720" rIns="91440" bIns="45720" numCol="1" rtlCol="0" anchor="t" anchorCtr="0" compatLnSpc="1">
+            <a:prstTxWarp prst="textNoShape">
+              <a:avLst/>
+            </a:prstTxWarp>
+          </a:bodyPr>
+          <a:lstStyle/>
+          <a:p>
+            <a:pPr marL="0" marR="0" indent="0" algn="l" defTabSz="914400" rtl="0" eaLnBrk="0" fontAlgn="base" latinLnBrk="0" hangingPunct="0">
+              <a:lnSpc>
+                <a:spcPct val="100000"/>
+              </a:lnSpc>
+              <a:spcBef>
+                <a:spcPct val="0"/>
+              </a:spcBef>
+              <a:spcAft>
+                <a:spcPct val="0"/>
+              </a:spcAft>
+              <a:buClrTx/>
+              <a:buSzTx/>
+              <a:buFontTx/>
+              <a:buNone/>
+              <a:tabLst/>
+            </a:pPr>
+            <a:endParaRPr kumimoji="0" lang="en-US" sz="2400" b="0" i="0" u="none" strike="noStrike" cap="none" normalizeH="0" baseline="0">
+              <a:ln>
+                <a:noFill/>
+              </a:ln>
+              <a:solidFill>
+                <a:schemeClr val="tx1"/>
+              </a:solidFill>
+              <a:effectLst/>
+              <a:latin typeface="Times New Roman" pitchFamily="18" charset="0"/>
+            </a:endParaRPr>
+          </a:p>
+        </p:txBody>
+      </p:sp>
+      <p:sp>
+        <p:nvSpPr>
+          <p:cNvPr id="11" name="TextBox 10">
+            <a:extLst>
+              <a:ext uri="{FF2B5EF4-FFF2-40B4-BE49-F238E27FC236}">
+                <a16:creationId xmlns:a16="http://schemas.microsoft.com/office/drawing/2014/main" id="{BCECD3F4-669F-9546-B572-BBD15D71172F}"/>
+              </a:ext>
+            </a:extLst>
+          </p:cNvPr>
+          <p:cNvSpPr txBox="1"/>
+          <p:nvPr/>
+        </p:nvSpPr>
+        <p:spPr>
+          <a:xfrm>
+            <a:off x="6432557" y="5565632"/>
+            <a:ext cx="2116285" cy="369332"/>
+          </a:xfrm>
+          <a:prstGeom prst="rect">
+            <a:avLst/>
+          </a:prstGeom>
+          <a:solidFill>
+            <a:schemeClr val="tx1"/>
+          </a:solidFill>
+        </p:spPr>
+        <p:txBody>
+          <a:bodyPr wrap="none" rtlCol="0">
+            <a:spAutoFit/>
+          </a:bodyPr>
+          <a:lstStyle/>
+          <a:p>
+            <a:r>
+              <a:rPr lang="en-US" sz="1800" b="1" dirty="0">
+                <a:solidFill>
+                  <a:schemeClr val="accent1"/>
+                </a:solidFill>
+                <a:latin typeface="Lucida Console" panose="020B0609040504020204" pitchFamily="49" charset="0"/>
+              </a:rPr>
+              <a:t>&lt;</a:t>
+            </a:r>
+            <a:r>
+              <a:rPr lang="en-US" sz="1800" b="1" dirty="0">
+                <a:solidFill>
+                  <a:schemeClr val="accent1"/>
+                </a:solidFill>
+                <a:latin typeface="Monaco" pitchFamily="2" charset="0"/>
+              </a:rPr>
+              <a:t>!–- EXTRA --&gt;</a:t>
+            </a:r>
+            <a:endParaRPr lang="en-US" sz="1800" b="1" dirty="0">
+              <a:solidFill>
+                <a:schemeClr val="accent1"/>
+              </a:solidFill>
+              <a:latin typeface="Lucida Console" panose="020B0609040504020204" pitchFamily="49" charset="0"/>
+            </a:endParaRPr>
+          </a:p>
+        </p:txBody>
+      </p:sp>
+    </p:spTree>
+    <p:extLst>
+      <p:ext uri="{BB962C8B-B14F-4D97-AF65-F5344CB8AC3E}">
+        <p14:creationId xmlns:p14="http://schemas.microsoft.com/office/powerpoint/2010/main" val="816711779"/>
+      </p:ext>
+    </p:extLst>
+  </p:cSld>
+  <p:clrMapOvr>
+    <a:masterClrMapping/>
+  </p:clrMapOvr>
+</p:sld>
+</file>
+
+<file path=ppt/slides/slide25.xml><?xml version="1.0" encoding="utf-8"?>
+<p:sld xmlns:a="http://schemas.openxmlformats.org/drawingml/2006/main" xmlns:r="http://schemas.openxmlformats.org/officeDocument/2006/relationships" xmlns:p="http://schemas.openxmlformats.org/presentationml/2006/main">
+  <p:cSld>
+    <p:spTree>
+      <p:nvGrpSpPr>
+        <p:cNvPr id="1" name=""/>
+        <p:cNvGrpSpPr/>
+        <p:nvPr/>
+      </p:nvGrpSpPr>
+      <p:grpSpPr>
+        <a:xfrm>
+          <a:off x="0" y="0"/>
+          <a:ext cx="0" cy="0"/>
+          <a:chOff x="0" y="0"/>
+          <a:chExt cx="0" cy="0"/>
+        </a:xfrm>
+      </p:grpSpPr>
+      <p:sp>
+        <p:nvSpPr>
+          <p:cNvPr id="2" name="Title 1">
+            <a:extLst>
+              <a:ext uri="{FF2B5EF4-FFF2-40B4-BE49-F238E27FC236}">
+                <a16:creationId xmlns:a16="http://schemas.microsoft.com/office/drawing/2014/main" id="{948ACC61-B665-C340-A494-BC13CD4D7548}"/>
+              </a:ext>
+            </a:extLst>
+          </p:cNvPr>
+          <p:cNvSpPr>
+            <a:spLocks noGrp="1"/>
+          </p:cNvSpPr>
+          <p:nvPr>
+            <p:ph type="title"/>
+          </p:nvPr>
+        </p:nvSpPr>
+        <p:spPr/>
+        <p:txBody>
+          <a:bodyPr/>
+          <a:lstStyle/>
+          <a:p>
+            <a:r>
+              <a:rPr lang="en-US" dirty="0"/>
+              <a:t>Hands-On: Sampling ARMA Results</a:t>
+            </a:r>
+            <a:endParaRPr lang="en-US" i="0" dirty="0">
+              <a:latin typeface="Lucida Console" panose="020B0609040504020204" pitchFamily="49" charset="0"/>
+            </a:endParaRPr>
+          </a:p>
+        </p:txBody>
+      </p:sp>
+      <p:sp>
+        <p:nvSpPr>
+          <p:cNvPr id="3" name="Content Placeholder 2">
+            <a:extLst>
+              <a:ext uri="{FF2B5EF4-FFF2-40B4-BE49-F238E27FC236}">
+                <a16:creationId xmlns:a16="http://schemas.microsoft.com/office/drawing/2014/main" id="{DCA9CDD8-268E-FD42-B9AB-6B63C98F85B5}"/>
+              </a:ext>
+            </a:extLst>
+          </p:cNvPr>
+          <p:cNvSpPr>
+            <a:spLocks noGrp="1"/>
+          </p:cNvSpPr>
+          <p:nvPr>
+            <p:ph idx="1"/>
+          </p:nvPr>
+        </p:nvSpPr>
+        <p:spPr/>
+        <p:txBody>
+          <a:bodyPr/>
+          <a:lstStyle/>
+          <a:p>
+            <a:endParaRPr lang="en-US" dirty="0"/>
+          </a:p>
+          <a:p>
+            <a:endParaRPr lang="en-US" dirty="0"/>
+          </a:p>
+          <a:p>
+            <a:endParaRPr lang="en-US" dirty="0"/>
+          </a:p>
+          <a:p>
+            <a:endParaRPr lang="en-US" dirty="0"/>
+          </a:p>
+          <a:p>
+            <a:endParaRPr lang="en-US" dirty="0"/>
+          </a:p>
+          <a:p>
+            <a:endParaRPr lang="en-US" dirty="0"/>
+          </a:p>
+          <a:p>
+            <a:endParaRPr lang="en-US" dirty="0"/>
+          </a:p>
+          <a:p>
+            <a:endParaRPr lang="en-US" dirty="0"/>
+          </a:p>
+          <a:p>
+            <a:endParaRPr lang="en-US" dirty="0"/>
+          </a:p>
+          <a:p>
+            <a:endParaRPr lang="en-US" dirty="0"/>
+          </a:p>
+          <a:p>
+            <a:endParaRPr lang="en-US" dirty="0"/>
+          </a:p>
+          <a:p>
+            <a:r>
+              <a:rPr lang="en-US" dirty="0"/>
+              <a:t>Note: depends on your seed, number of samples</a:t>
+            </a:r>
+          </a:p>
+          <a:p>
+            <a:pPr lvl="1"/>
+            <a:r>
+              <a:rPr lang="en-US" dirty="0"/>
+              <a:t>I used seed = 31415 with 3 samples</a:t>
+            </a:r>
+          </a:p>
+          <a:p>
+            <a:pPr marL="0" indent="0">
+              <a:buNone/>
+            </a:pPr>
+            <a:endParaRPr lang="en-US" dirty="0"/>
+          </a:p>
+        </p:txBody>
+      </p:sp>
+      <p:sp>
+        <p:nvSpPr>
+          <p:cNvPr id="5" name="Slide Number Placeholder 4">
+            <a:extLst>
+              <a:ext uri="{FF2B5EF4-FFF2-40B4-BE49-F238E27FC236}">
+                <a16:creationId xmlns:a16="http://schemas.microsoft.com/office/drawing/2014/main" id="{26822A84-07B8-7141-B715-6D4B1841CE7B}"/>
+              </a:ext>
+            </a:extLst>
+          </p:cNvPr>
+          <p:cNvSpPr>
+            <a:spLocks noGrp="1"/>
+          </p:cNvSpPr>
+          <p:nvPr>
+            <p:ph type="sldNum" sz="quarter" idx="11"/>
+          </p:nvPr>
+        </p:nvSpPr>
+        <p:spPr/>
+        <p:txBody>
+          <a:bodyPr/>
+          <a:lstStyle/>
+          <a:p>
+            <a:fld id="{4B4332F1-BAE3-4172-AA6D-91F763B329EF}" type="slidenum">
+              <a:rPr lang="en-US" smtClean="0"/>
+              <a:pPr/>
+              <a:t>24</a:t>
+            </a:fld>
+            <a:endParaRPr lang="en-US"/>
+          </a:p>
+        </p:txBody>
+      </p:sp>
+      <p:sp>
+        <p:nvSpPr>
+          <p:cNvPr id="6" name="TextBox 5">
+            <a:extLst>
+              <a:ext uri="{FF2B5EF4-FFF2-40B4-BE49-F238E27FC236}">
+                <a16:creationId xmlns:a16="http://schemas.microsoft.com/office/drawing/2014/main" id="{3F398C7C-25F3-BC43-B924-F3DA847DF16F}"/>
+              </a:ext>
+            </a:extLst>
+          </p:cNvPr>
+          <p:cNvSpPr txBox="1"/>
+          <p:nvPr/>
+        </p:nvSpPr>
+        <p:spPr>
+          <a:xfrm>
+            <a:off x="144461" y="1413947"/>
+            <a:ext cx="8831264" cy="369332"/>
+          </a:xfrm>
+          <a:prstGeom prst="rect">
+            <a:avLst/>
+          </a:prstGeom>
+          <a:solidFill>
+            <a:schemeClr val="accent5"/>
+          </a:solidFill>
+        </p:spPr>
+        <p:txBody>
+          <a:bodyPr wrap="none" rtlCol="0">
+            <a:spAutoFit/>
+          </a:bodyPr>
+          <a:lstStyle/>
+          <a:p>
+            <a:r>
+              <a:rPr lang="en-US" sz="1800" dirty="0">
+                <a:latin typeface="Lucida Console" panose="020B0609040504020204" pitchFamily="49" charset="0"/>
+              </a:rPr>
+              <a:t>raven/docs/workshop/ARMA/exercise/</a:t>
+            </a:r>
+            <a:r>
+              <a:rPr lang="en-US" sz="1800" dirty="0" err="1">
+                <a:latin typeface="Lucida Console" panose="020B0609040504020204" pitchFamily="49" charset="0"/>
+              </a:rPr>
+              <a:t>rundir</a:t>
+            </a:r>
+            <a:r>
+              <a:rPr lang="en-US" sz="1800" dirty="0">
+                <a:latin typeface="Lucida Console" panose="020B0609040504020204" pitchFamily="49" charset="0"/>
+              </a:rPr>
+              <a:t>/</a:t>
+            </a:r>
+            <a:r>
+              <a:rPr lang="en-US" sz="1800" dirty="0" err="1">
+                <a:latin typeface="Lucida Console" panose="020B0609040504020204" pitchFamily="49" charset="0"/>
+              </a:rPr>
+              <a:t>samples_plot_line.png</a:t>
+            </a:r>
+            <a:endParaRPr lang="en-US" sz="1800" dirty="0">
+              <a:latin typeface="Lucida Console" panose="020B0609040504020204" pitchFamily="49" charset="0"/>
+            </a:endParaRPr>
+          </a:p>
+        </p:txBody>
+      </p:sp>
+      <p:pic>
+        <p:nvPicPr>
+          <p:cNvPr id="10" name="Picture 9">
+            <a:extLst>
+              <a:ext uri="{FF2B5EF4-FFF2-40B4-BE49-F238E27FC236}">
+                <a16:creationId xmlns:a16="http://schemas.microsoft.com/office/drawing/2014/main" id="{F1DE3279-F2B7-1C44-96A6-81E560D947D0}"/>
+              </a:ext>
+            </a:extLst>
+          </p:cNvPr>
+          <p:cNvPicPr>
+            <a:picLocks noChangeAspect="1"/>
+          </p:cNvPicPr>
+          <p:nvPr/>
+        </p:nvPicPr>
+        <p:blipFill>
+          <a:blip r:embed="rId2">
+            <a:extLst>
+              <a:ext uri="{28A0092B-C50C-407E-A947-70E740481C1C}">
+                <a14:useLocalDpi xmlns:a14="http://schemas.microsoft.com/office/drawing/2010/main" val="0"/>
+              </a:ext>
+            </a:extLst>
+          </a:blip>
+          <a:stretch>
+            <a:fillRect/>
+          </a:stretch>
+        </p:blipFill>
+        <p:spPr>
+          <a:xfrm>
+            <a:off x="1951347" y="1783279"/>
+            <a:ext cx="5060885" cy="3795664"/>
+          </a:xfrm>
+          <a:prstGeom prst="rect">
+            <a:avLst/>
+          </a:prstGeom>
+        </p:spPr>
+      </p:pic>
+    </p:spTree>
+    <p:extLst>
+      <p:ext uri="{BB962C8B-B14F-4D97-AF65-F5344CB8AC3E}">
+        <p14:creationId xmlns:p14="http://schemas.microsoft.com/office/powerpoint/2010/main" val="4152783255"/>
+      </p:ext>
+    </p:extLst>
+  </p:cSld>
+  <p:clrMapOvr>
+    <a:masterClrMapping/>
+  </p:clrMapOvr>
+</p:sld>
+</file>
+
+<file path=ppt/slides/slide26.xml><?xml version="1.0" encoding="utf-8"?>
+<p:sld xmlns:a="http://schemas.openxmlformats.org/drawingml/2006/main" xmlns:r="http://schemas.openxmlformats.org/officeDocument/2006/relationships" xmlns:p="http://schemas.openxmlformats.org/presentationml/2006/main">
+  <p:cSld>
+    <p:spTree>
+      <p:nvGrpSpPr>
+        <p:cNvPr id="1" name=""/>
+        <p:cNvGrpSpPr/>
+        <p:nvPr/>
+      </p:nvGrpSpPr>
+      <p:grpSpPr>
+        <a:xfrm>
+          <a:off x="0" y="0"/>
+          <a:ext cx="0" cy="0"/>
+          <a:chOff x="0" y="0"/>
+          <a:chExt cx="0" cy="0"/>
+        </a:xfrm>
+      </p:grpSpPr>
+      <p:sp>
+        <p:nvSpPr>
+          <p:cNvPr id="2" name="Title 1">
+            <a:extLst>
+              <a:ext uri="{FF2B5EF4-FFF2-40B4-BE49-F238E27FC236}">
+                <a16:creationId xmlns:a16="http://schemas.microsoft.com/office/drawing/2014/main" id="{948ACC61-B665-C340-A494-BC13CD4D7548}"/>
+              </a:ext>
+            </a:extLst>
+          </p:cNvPr>
+          <p:cNvSpPr>
+            <a:spLocks noGrp="1"/>
+          </p:cNvSpPr>
+          <p:nvPr>
+            <p:ph type="title"/>
+          </p:nvPr>
+        </p:nvSpPr>
+        <p:spPr>
+          <a:xfrm>
+            <a:off x="484188" y="745808"/>
+            <a:ext cx="8231187" cy="363537"/>
+          </a:xfrm>
+        </p:spPr>
+        <p:txBody>
+          <a:bodyPr/>
+          <a:lstStyle/>
+          <a:p>
+            <a:r>
+              <a:rPr lang="en-US" dirty="0"/>
+              <a:t>Hands-On: Running Some Statistics</a:t>
+            </a:r>
+          </a:p>
+        </p:txBody>
+      </p:sp>
+      <p:sp>
+        <p:nvSpPr>
+          <p:cNvPr id="3" name="Content Placeholder 2">
+            <a:extLst>
+              <a:ext uri="{FF2B5EF4-FFF2-40B4-BE49-F238E27FC236}">
+                <a16:creationId xmlns:a16="http://schemas.microsoft.com/office/drawing/2014/main" id="{DCA9CDD8-268E-FD42-B9AB-6B63C98F85B5}"/>
+              </a:ext>
+            </a:extLst>
+          </p:cNvPr>
+          <p:cNvSpPr>
+            <a:spLocks noGrp="1"/>
+          </p:cNvSpPr>
+          <p:nvPr>
+            <p:ph idx="1"/>
+          </p:nvPr>
+        </p:nvSpPr>
+        <p:spPr>
+          <a:xfrm>
+            <a:off x="484187" y="1221237"/>
+            <a:ext cx="8231187" cy="4524375"/>
+          </a:xfrm>
+        </p:spPr>
+        <p:txBody>
+          <a:bodyPr/>
+          <a:lstStyle/>
+          <a:p>
+            <a:r>
+              <a:rPr lang="en-US" dirty="0"/>
+              <a:t>Calculate and plot the mean and 5,95 percentiles for samples</a:t>
+            </a:r>
+          </a:p>
+          <a:p>
+            <a:pPr lvl="1"/>
+            <a:r>
+              <a:rPr lang="en-US" dirty="0"/>
+              <a:t>Same input file</a:t>
+            </a:r>
+          </a:p>
+          <a:p>
+            <a:pPr lvl="1"/>
+            <a:r>
+              <a:rPr lang="en-US" dirty="0"/>
+              <a:t>Create a new </a:t>
+            </a:r>
+            <a:r>
+              <a:rPr lang="en-US" dirty="0" err="1"/>
+              <a:t>PostProcess</a:t>
+            </a:r>
+            <a:r>
+              <a:rPr lang="en-US" dirty="0"/>
+              <a:t> step</a:t>
+            </a:r>
+          </a:p>
+          <a:p>
+            <a:pPr lvl="2"/>
+            <a:r>
+              <a:rPr lang="en-US" dirty="0"/>
+              <a:t>Input is the history set</a:t>
+            </a:r>
+          </a:p>
+          <a:p>
+            <a:pPr lvl="2"/>
+            <a:r>
+              <a:rPr lang="en-US" dirty="0"/>
+              <a:t>Model is the ”</a:t>
+            </a:r>
+            <a:r>
+              <a:rPr lang="en-US" dirty="0" err="1"/>
+              <a:t>stats_calc</a:t>
+            </a:r>
+            <a:r>
+              <a:rPr lang="en-US" dirty="0"/>
+              <a:t>” postprocessor</a:t>
+            </a:r>
+          </a:p>
+          <a:p>
+            <a:pPr lvl="2"/>
+            <a:r>
+              <a:rPr lang="en-US" dirty="0"/>
+              <a:t>Output is data object “stats”</a:t>
+            </a:r>
+          </a:p>
+          <a:p>
+            <a:pPr lvl="2"/>
+            <a:endParaRPr lang="en-US" dirty="0"/>
+          </a:p>
+          <a:p>
+            <a:pPr lvl="1"/>
+            <a:r>
+              <a:rPr lang="en-US" dirty="0"/>
+              <a:t>Create a new Output step</a:t>
+            </a:r>
+          </a:p>
+          <a:p>
+            <a:pPr lvl="2"/>
+            <a:r>
+              <a:rPr lang="en-US" dirty="0"/>
+              <a:t>Input is “stats” data object</a:t>
+            </a:r>
+          </a:p>
+          <a:p>
+            <a:pPr lvl="2"/>
+            <a:r>
+              <a:rPr lang="en-US" dirty="0"/>
+              <a:t>Output is </a:t>
+            </a:r>
+            <a:r>
+              <a:rPr lang="en-US" dirty="0" err="1"/>
+              <a:t>outstream</a:t>
+            </a:r>
+            <a:r>
+              <a:rPr lang="en-US" dirty="0"/>
+              <a:t> print “</a:t>
+            </a:r>
+            <a:r>
+              <a:rPr lang="en-US" dirty="0" err="1"/>
+              <a:t>stats_out</a:t>
+            </a:r>
+            <a:r>
+              <a:rPr lang="en-US" dirty="0"/>
+              <a:t>”</a:t>
+            </a:r>
+          </a:p>
+          <a:p>
+            <a:pPr lvl="2"/>
+            <a:endParaRPr lang="en-US" dirty="0"/>
+          </a:p>
+          <a:p>
+            <a:pPr lvl="1"/>
+            <a:r>
+              <a:rPr lang="en-US" dirty="0"/>
+              <a:t>Add both steps to the </a:t>
+            </a:r>
+            <a:r>
+              <a:rPr lang="en-US" dirty="0" err="1"/>
+              <a:t>RunInfo</a:t>
+            </a:r>
+            <a:r>
+              <a:rPr lang="en-US" dirty="0"/>
+              <a:t> sequence</a:t>
+            </a:r>
+          </a:p>
+          <a:p>
+            <a:pPr lvl="1"/>
+            <a:endParaRPr lang="en-US" dirty="0"/>
+          </a:p>
+          <a:p>
+            <a:pPr lvl="1"/>
+            <a:r>
+              <a:rPr lang="en-US" dirty="0"/>
+              <a:t>Each task is marked with a</a:t>
+            </a:r>
+          </a:p>
+          <a:p>
+            <a:pPr lvl="1"/>
+            <a:endParaRPr lang="en-US" dirty="0"/>
+          </a:p>
+          <a:p>
+            <a:pPr lvl="1"/>
+            <a:r>
+              <a:rPr lang="en-US" dirty="0"/>
+              <a:t>Better stats: increase the number of </a:t>
+            </a:r>
+            <a:r>
+              <a:rPr lang="en-US" dirty="0" err="1"/>
+              <a:t>MonteCarlo</a:t>
+            </a:r>
+            <a:r>
+              <a:rPr lang="en-US" dirty="0"/>
+              <a:t> samples (&gt;50)</a:t>
+            </a:r>
+          </a:p>
+        </p:txBody>
+      </p:sp>
+      <p:sp>
+        <p:nvSpPr>
+          <p:cNvPr id="5" name="Slide Number Placeholder 4">
+            <a:extLst>
+              <a:ext uri="{FF2B5EF4-FFF2-40B4-BE49-F238E27FC236}">
+                <a16:creationId xmlns:a16="http://schemas.microsoft.com/office/drawing/2014/main" id="{26822A84-07B8-7141-B715-6D4B1841CE7B}"/>
+              </a:ext>
+            </a:extLst>
+          </p:cNvPr>
+          <p:cNvSpPr>
+            <a:spLocks noGrp="1"/>
+          </p:cNvSpPr>
+          <p:nvPr>
+            <p:ph type="sldNum" sz="quarter" idx="11"/>
+          </p:nvPr>
+        </p:nvSpPr>
+        <p:spPr/>
+        <p:txBody>
+          <a:bodyPr/>
+          <a:lstStyle/>
+          <a:p>
+            <a:fld id="{4B4332F1-BAE3-4172-AA6D-91F763B329EF}" type="slidenum">
+              <a:rPr lang="en-US" smtClean="0"/>
+              <a:pPr/>
+              <a:t>25</a:t>
+            </a:fld>
+            <a:endParaRPr lang="en-US"/>
+          </a:p>
+        </p:txBody>
+      </p:sp>
+      <p:sp>
+        <p:nvSpPr>
+          <p:cNvPr id="9" name="TextBox 8">
+            <a:extLst>
+              <a:ext uri="{FF2B5EF4-FFF2-40B4-BE49-F238E27FC236}">
+                <a16:creationId xmlns:a16="http://schemas.microsoft.com/office/drawing/2014/main" id="{B98D8B26-EB2B-3542-B709-02A66686127C}"/>
+              </a:ext>
+            </a:extLst>
+          </p:cNvPr>
+          <p:cNvSpPr txBox="1"/>
+          <p:nvPr/>
+        </p:nvSpPr>
+        <p:spPr>
+          <a:xfrm>
+            <a:off x="4239529" y="5315955"/>
+            <a:ext cx="2116285" cy="369332"/>
+          </a:xfrm>
+          <a:prstGeom prst="rect">
+            <a:avLst/>
+          </a:prstGeom>
+          <a:solidFill>
+            <a:schemeClr val="tx1"/>
+          </a:solidFill>
+        </p:spPr>
+        <p:txBody>
+          <a:bodyPr wrap="none" rtlCol="0">
+            <a:spAutoFit/>
+          </a:bodyPr>
+          <a:lstStyle/>
+          <a:p>
+            <a:r>
+              <a:rPr lang="en-US" sz="1800" b="1" dirty="0">
+                <a:solidFill>
+                  <a:schemeClr val="accent1"/>
+                </a:solidFill>
+                <a:latin typeface="Lucida Console" panose="020B0609040504020204" pitchFamily="49" charset="0"/>
+              </a:rPr>
+              <a:t>&lt;</a:t>
+            </a:r>
+            <a:r>
+              <a:rPr lang="en-US" sz="1800" b="1" dirty="0">
+                <a:solidFill>
+                  <a:schemeClr val="accent1"/>
+                </a:solidFill>
+                <a:latin typeface="Monaco" pitchFamily="2" charset="0"/>
+              </a:rPr>
+              <a:t>!–- EXTRA --&gt;</a:t>
+            </a:r>
+            <a:endParaRPr lang="en-US" sz="1800" b="1" dirty="0">
+              <a:solidFill>
+                <a:schemeClr val="accent1"/>
+              </a:solidFill>
+              <a:latin typeface="Lucida Console" panose="020B0609040504020204" pitchFamily="49" charset="0"/>
+            </a:endParaRPr>
+          </a:p>
+        </p:txBody>
+      </p:sp>
+      <p:sp>
+        <p:nvSpPr>
+          <p:cNvPr id="10" name="TextBox 9">
+            <a:extLst>
+              <a:ext uri="{FF2B5EF4-FFF2-40B4-BE49-F238E27FC236}">
+                <a16:creationId xmlns:a16="http://schemas.microsoft.com/office/drawing/2014/main" id="{E57135ED-D285-9840-AA7A-47A250AFF062}"/>
+              </a:ext>
+            </a:extLst>
+          </p:cNvPr>
+          <p:cNvSpPr txBox="1"/>
+          <p:nvPr/>
+        </p:nvSpPr>
+        <p:spPr>
+          <a:xfrm>
+            <a:off x="2907263" y="1477100"/>
+            <a:ext cx="2276585" cy="369332"/>
+          </a:xfrm>
+          <a:prstGeom prst="rect">
+            <a:avLst/>
+          </a:prstGeom>
+          <a:solidFill>
+            <a:schemeClr val="accent5"/>
+          </a:solidFill>
+        </p:spPr>
+        <p:txBody>
+          <a:bodyPr wrap="none" rtlCol="0">
+            <a:spAutoFit/>
+          </a:bodyPr>
+          <a:lstStyle/>
+          <a:p>
+            <a:r>
+              <a:rPr lang="en-US" sz="1800" dirty="0" err="1">
+                <a:latin typeface="Lucida Console" panose="020B0609040504020204" pitchFamily="49" charset="0"/>
+              </a:rPr>
+              <a:t>sample_arma.xml</a:t>
+            </a:r>
+            <a:endParaRPr lang="en-US" sz="1800" dirty="0">
+              <a:latin typeface="Lucida Console" panose="020B0609040504020204" pitchFamily="49" charset="0"/>
+            </a:endParaRPr>
+          </a:p>
+        </p:txBody>
+      </p:sp>
+    </p:spTree>
+    <p:extLst>
+      <p:ext uri="{BB962C8B-B14F-4D97-AF65-F5344CB8AC3E}">
+        <p14:creationId xmlns:p14="http://schemas.microsoft.com/office/powerpoint/2010/main" val="1735084513"/>
+      </p:ext>
+    </p:extLst>
+  </p:cSld>
+  <p:clrMapOvr>
+    <a:masterClrMapping/>
+  </p:clrMapOvr>
+</p:sld>
+</file>
+
+<file path=ppt/slides/slide27.xml><?xml version="1.0" encoding="utf-8"?>
+<p:sld xmlns:a="http://schemas.openxmlformats.org/drawingml/2006/main" xmlns:r="http://schemas.openxmlformats.org/officeDocument/2006/relationships" xmlns:p="http://schemas.openxmlformats.org/presentationml/2006/main">
+  <p:cSld>
+    <p:spTree>
+      <p:nvGrpSpPr>
+        <p:cNvPr id="1" name=""/>
+        <p:cNvGrpSpPr/>
+        <p:nvPr/>
+      </p:nvGrpSpPr>
+      <p:grpSpPr>
+        <a:xfrm>
+          <a:off x="0" y="0"/>
+          <a:ext cx="0" cy="0"/>
+          <a:chOff x="0" y="0"/>
+          <a:chExt cx="0" cy="0"/>
+        </a:xfrm>
+      </p:grpSpPr>
+      <p:sp>
+        <p:nvSpPr>
+          <p:cNvPr id="2" name="Title 1">
+            <a:extLst>
+              <a:ext uri="{FF2B5EF4-FFF2-40B4-BE49-F238E27FC236}">
+                <a16:creationId xmlns:a16="http://schemas.microsoft.com/office/drawing/2014/main" id="{948ACC61-B665-C340-A494-BC13CD4D7548}"/>
+              </a:ext>
+            </a:extLst>
+          </p:cNvPr>
+          <p:cNvSpPr>
+            <a:spLocks noGrp="1"/>
+          </p:cNvSpPr>
+          <p:nvPr>
+            <p:ph type="title"/>
+          </p:nvPr>
+        </p:nvSpPr>
+        <p:spPr/>
+        <p:txBody>
+          <a:bodyPr/>
+          <a:lstStyle/>
+          <a:p>
+            <a:r>
+              <a:rPr lang="en-US" dirty="0"/>
+              <a:t>Hands-On: Statistics Results</a:t>
+            </a:r>
+          </a:p>
+        </p:txBody>
+      </p:sp>
+      <p:sp>
+        <p:nvSpPr>
+          <p:cNvPr id="3" name="Content Placeholder 2">
+            <a:extLst>
+              <a:ext uri="{FF2B5EF4-FFF2-40B4-BE49-F238E27FC236}">
+                <a16:creationId xmlns:a16="http://schemas.microsoft.com/office/drawing/2014/main" id="{DCA9CDD8-268E-FD42-B9AB-6B63C98F85B5}"/>
+              </a:ext>
+            </a:extLst>
+          </p:cNvPr>
+          <p:cNvSpPr>
+            <a:spLocks noGrp="1"/>
+          </p:cNvSpPr>
+          <p:nvPr>
+            <p:ph idx="1"/>
+          </p:nvPr>
+        </p:nvSpPr>
+        <p:spPr/>
+        <p:txBody>
+          <a:bodyPr/>
+          <a:lstStyle/>
+          <a:p>
+            <a:r>
+              <a:rPr lang="en-US" dirty="0"/>
+              <a:t>50 MC samples, seed 31415, percentile 5|95 and mean</a:t>
+            </a:r>
+          </a:p>
+        </p:txBody>
+      </p:sp>
+      <p:sp>
+        <p:nvSpPr>
+          <p:cNvPr id="5" name="Slide Number Placeholder 4">
+            <a:extLst>
+              <a:ext uri="{FF2B5EF4-FFF2-40B4-BE49-F238E27FC236}">
+                <a16:creationId xmlns:a16="http://schemas.microsoft.com/office/drawing/2014/main" id="{26822A84-07B8-7141-B715-6D4B1841CE7B}"/>
+              </a:ext>
+            </a:extLst>
+          </p:cNvPr>
+          <p:cNvSpPr>
+            <a:spLocks noGrp="1"/>
+          </p:cNvSpPr>
+          <p:nvPr>
+            <p:ph type="sldNum" sz="quarter" idx="11"/>
+          </p:nvPr>
+        </p:nvSpPr>
+        <p:spPr/>
+        <p:txBody>
+          <a:bodyPr/>
+          <a:lstStyle/>
+          <a:p>
+            <a:fld id="{4B4332F1-BAE3-4172-AA6D-91F763B329EF}" type="slidenum">
+              <a:rPr lang="en-US" smtClean="0"/>
+              <a:pPr/>
+              <a:t>26</a:t>
+            </a:fld>
+            <a:endParaRPr lang="en-US"/>
+          </a:p>
+        </p:txBody>
+      </p:sp>
+      <p:pic>
+        <p:nvPicPr>
+          <p:cNvPr id="6" name="Picture 5">
+            <a:extLst>
+              <a:ext uri="{FF2B5EF4-FFF2-40B4-BE49-F238E27FC236}">
+                <a16:creationId xmlns:a16="http://schemas.microsoft.com/office/drawing/2014/main" id="{40011CFD-DFA9-1645-A557-8574920735BB}"/>
+              </a:ext>
+            </a:extLst>
+          </p:cNvPr>
+          <p:cNvPicPr>
+            <a:picLocks noChangeAspect="1"/>
+          </p:cNvPicPr>
+          <p:nvPr/>
+        </p:nvPicPr>
+        <p:blipFill>
+          <a:blip r:embed="rId3">
+            <a:extLst>
+              <a:ext uri="{28A0092B-C50C-407E-A947-70E740481C1C}">
+                <a14:useLocalDpi xmlns:a14="http://schemas.microsoft.com/office/drawing/2010/main" val="0"/>
+              </a:ext>
+            </a:extLst>
+          </a:blip>
+          <a:stretch>
+            <a:fillRect/>
+          </a:stretch>
+        </p:blipFill>
+        <p:spPr>
+          <a:xfrm>
+            <a:off x="1650206" y="1879272"/>
+            <a:ext cx="5842000" cy="4381500"/>
+          </a:xfrm>
+          <a:prstGeom prst="rect">
+            <a:avLst/>
+          </a:prstGeom>
+        </p:spPr>
+      </p:pic>
+    </p:spTree>
+    <p:extLst>
+      <p:ext uri="{BB962C8B-B14F-4D97-AF65-F5344CB8AC3E}">
+        <p14:creationId xmlns:p14="http://schemas.microsoft.com/office/powerpoint/2010/main" val="79568151"/>
+      </p:ext>
+    </p:extLst>
+  </p:cSld>
+  <p:clrMapOvr>
+    <a:masterClrMapping/>
+  </p:clrMapOvr>
+</p:sld>
+</file>
+
+<file path=ppt/slides/slide28.xml><?xml version="1.0" encoding="utf-8"?>
+<p:sld xmlns:a="http://schemas.openxmlformats.org/drawingml/2006/main" xmlns:r="http://schemas.openxmlformats.org/officeDocument/2006/relationships" xmlns:p="http://schemas.openxmlformats.org/presentationml/2006/main">
+  <p:cSld>
+    <p:spTree>
+      <p:nvGrpSpPr>
+        <p:cNvPr id="1" name=""/>
+        <p:cNvGrpSpPr/>
+        <p:nvPr/>
+      </p:nvGrpSpPr>
+      <p:grpSpPr>
+        <a:xfrm>
+          <a:off x="0" y="0"/>
+          <a:ext cx="0" cy="0"/>
+          <a:chOff x="0" y="0"/>
+          <a:chExt cx="0" cy="0"/>
+        </a:xfrm>
+      </p:grpSpPr>
+      <p:sp>
+        <p:nvSpPr>
+          <p:cNvPr id="2" name="Title 1">
+            <a:extLst>
+              <a:ext uri="{FF2B5EF4-FFF2-40B4-BE49-F238E27FC236}">
+                <a16:creationId xmlns:a16="http://schemas.microsoft.com/office/drawing/2014/main" id="{948ACC61-B665-C340-A494-BC13CD4D7548}"/>
+              </a:ext>
+            </a:extLst>
+          </p:cNvPr>
+          <p:cNvSpPr>
+            <a:spLocks noGrp="1"/>
+          </p:cNvSpPr>
+          <p:nvPr>
+            <p:ph type="title"/>
+          </p:nvPr>
+        </p:nvSpPr>
+        <p:spPr/>
+        <p:txBody>
+          <a:bodyPr/>
+          <a:lstStyle/>
+          <a:p>
+            <a:r>
+              <a:rPr lang="en-US" dirty="0"/>
+              <a:t>Hands-On: Beyond the Scope</a:t>
+            </a:r>
+          </a:p>
+        </p:txBody>
+      </p:sp>
+      <p:sp>
+        <p:nvSpPr>
+          <p:cNvPr id="3" name="Content Placeholder 2">
+            <a:extLst>
+              <a:ext uri="{FF2B5EF4-FFF2-40B4-BE49-F238E27FC236}">
+                <a16:creationId xmlns:a16="http://schemas.microsoft.com/office/drawing/2014/main" id="{DCA9CDD8-268E-FD42-B9AB-6B63C98F85B5}"/>
+              </a:ext>
+            </a:extLst>
+          </p:cNvPr>
+          <p:cNvSpPr>
+            <a:spLocks noGrp="1"/>
+          </p:cNvSpPr>
+          <p:nvPr>
+            <p:ph idx="1"/>
+          </p:nvPr>
+        </p:nvSpPr>
+        <p:spPr/>
+        <p:txBody>
+          <a:bodyPr/>
+          <a:lstStyle/>
+          <a:p>
+            <a:r>
+              <a:rPr lang="en-US" dirty="0"/>
+              <a:t>Other things to try</a:t>
+            </a:r>
+          </a:p>
+          <a:p>
+            <a:pPr lvl="1"/>
+            <a:r>
+              <a:rPr lang="en-US" dirty="0"/>
+              <a:t>Run it in local parallel</a:t>
+            </a:r>
+          </a:p>
+          <a:p>
+            <a:pPr lvl="2"/>
+            <a:r>
+              <a:rPr lang="en-US" dirty="0" err="1"/>
+              <a:t>RunInfo</a:t>
+            </a:r>
+            <a:r>
+              <a:rPr lang="en-US" dirty="0"/>
+              <a:t>: </a:t>
+            </a:r>
+            <a:r>
+              <a:rPr lang="en-US" dirty="0" err="1"/>
+              <a:t>batchSize</a:t>
+            </a:r>
+            <a:r>
+              <a:rPr lang="en-US" dirty="0"/>
+              <a:t>, </a:t>
+            </a:r>
+            <a:r>
+              <a:rPr lang="en-US" dirty="0" err="1"/>
+              <a:t>maxQueueSize</a:t>
+            </a:r>
+            <a:endParaRPr lang="en-US" dirty="0"/>
+          </a:p>
+          <a:p>
+            <a:pPr lvl="2"/>
+            <a:endParaRPr lang="en-US" dirty="0"/>
+          </a:p>
+          <a:p>
+            <a:pPr lvl="1"/>
+            <a:r>
+              <a:rPr lang="en-US" dirty="0"/>
+              <a:t>Compare stats at 10 samples and 1000 samples</a:t>
+            </a:r>
+          </a:p>
+          <a:p>
+            <a:pPr lvl="1"/>
+            <a:endParaRPr lang="en-US" dirty="0"/>
+          </a:p>
+          <a:p>
+            <a:pPr lvl="1"/>
+            <a:r>
+              <a:rPr lang="en-US" dirty="0"/>
+              <a:t>Start over with new ARMA</a:t>
+            </a:r>
+          </a:p>
+          <a:p>
+            <a:pPr lvl="2"/>
+            <a:r>
+              <a:rPr lang="en-US" dirty="0"/>
+              <a:t>Change subsequence length (maybe 1 week)</a:t>
+            </a:r>
+          </a:p>
+          <a:p>
+            <a:pPr lvl="2"/>
+            <a:r>
+              <a:rPr lang="en-US" dirty="0"/>
+              <a:t>Change output length (1 month or 1 year)</a:t>
+            </a:r>
+          </a:p>
+          <a:p>
+            <a:pPr lvl="2"/>
+            <a:r>
+              <a:rPr lang="en-US" dirty="0"/>
+              <a:t>Change number of interpolation points on plots if needed</a:t>
+            </a:r>
+          </a:p>
+        </p:txBody>
+      </p:sp>
+      <p:sp>
+        <p:nvSpPr>
+          <p:cNvPr id="5" name="Slide Number Placeholder 4">
+            <a:extLst>
+              <a:ext uri="{FF2B5EF4-FFF2-40B4-BE49-F238E27FC236}">
+                <a16:creationId xmlns:a16="http://schemas.microsoft.com/office/drawing/2014/main" id="{26822A84-07B8-7141-B715-6D4B1841CE7B}"/>
+              </a:ext>
+            </a:extLst>
+          </p:cNvPr>
+          <p:cNvSpPr>
+            <a:spLocks noGrp="1"/>
+          </p:cNvSpPr>
+          <p:nvPr>
+            <p:ph type="sldNum" sz="quarter" idx="11"/>
+          </p:nvPr>
+        </p:nvSpPr>
+        <p:spPr/>
+        <p:txBody>
+          <a:bodyPr/>
+          <a:lstStyle/>
+          <a:p>
+            <a:fld id="{4B4332F1-BAE3-4172-AA6D-91F763B329EF}" type="slidenum">
+              <a:rPr lang="en-US" smtClean="0"/>
+              <a:pPr/>
+              <a:t>27</a:t>
+            </a:fld>
+            <a:endParaRPr lang="en-US"/>
+          </a:p>
+        </p:txBody>
+      </p:sp>
+    </p:spTree>
+    <p:extLst>
+      <p:ext uri="{BB962C8B-B14F-4D97-AF65-F5344CB8AC3E}">
+        <p14:creationId xmlns:p14="http://schemas.microsoft.com/office/powerpoint/2010/main" val="1417281200"/>
       </p:ext>
     </p:extLst>
   </p:cSld>

</xml_diff>

<commit_message>
ARMA changes and xml howto
</commit_message>
<xml_diff>
--- a/doc/workshop/ARMA/arma_workshop.pptx
+++ b/doc/workshop/ARMA/arma_workshop.pptx
@@ -34837,38 +34837,6 @@
       </p:sp>
       <p:sp>
         <p:nvSpPr>
-          <p:cNvPr id="3" name="Subtitle 2"/>
-          <p:cNvSpPr>
-            <a:spLocks noGrp="1"/>
-          </p:cNvSpPr>
-          <p:nvPr>
-            <p:ph type="subTitle" sz="quarter" idx="1"/>
-          </p:nvPr>
-        </p:nvSpPr>
-        <p:spPr>
-          <a:xfrm>
-            <a:off x="2099176" y="3891548"/>
-            <a:ext cx="5775325" cy="493294"/>
-          </a:xfrm>
-        </p:spPr>
-        <p:txBody>
-          <a:bodyPr/>
-          <a:lstStyle/>
-          <a:p>
-            <a:r>
-              <a:rPr lang="en-US" dirty="0"/>
-              <a:t>Paul Talbot, </a:t>
-            </a:r>
-            <a:r>
-              <a:rPr lang="en-US" dirty="0" err="1"/>
-              <a:t>Presentor</a:t>
-            </a:r>
-            <a:endParaRPr lang="en-US" dirty="0"/>
-          </a:p>
-        </p:txBody>
-      </p:sp>
-      <p:sp>
-        <p:nvSpPr>
           <p:cNvPr id="4" name="Rectangle 4">
             <a:extLst>
               <a:ext uri="{FF2B5EF4-FFF2-40B4-BE49-F238E27FC236}">
@@ -35090,213 +35058,42 @@
           </a:p>
         </p:txBody>
       </p:sp>
-      <p:sp>
-        <p:nvSpPr>
-          <p:cNvPr id="5" name="Rectangle 4">
+      <p:pic>
+        <p:nvPicPr>
+          <p:cNvPr id="8" name="Picture 7" descr="Screen Shot 2017-05-26 at 9.38.45 AM.png">
             <a:extLst>
               <a:ext uri="{FF2B5EF4-FFF2-40B4-BE49-F238E27FC236}">
-                <a16:creationId xmlns:a16="http://schemas.microsoft.com/office/drawing/2014/main" id="{2D5EBC03-88EB-6949-B684-A2CB42743361}"/>
+                <a16:creationId xmlns:a16="http://schemas.microsoft.com/office/drawing/2014/main" id="{0608E567-1AF1-9B4C-A251-1C70E9228A93}"/>
               </a:ext>
             </a:extLst>
           </p:cNvPr>
-          <p:cNvSpPr txBox="1">
-            <a:spLocks noChangeArrowheads="1"/>
-          </p:cNvSpPr>
+          <p:cNvPicPr>
+            <a:picLocks noChangeAspect="1"/>
+          </p:cNvPicPr>
           <p:nvPr/>
-        </p:nvSpPr>
-        <p:spPr bwMode="auto">
+        </p:nvPicPr>
+        <p:blipFill>
+          <a:blip r:embed="rId2" cstate="email">
+            <a:extLst>
+              <a:ext uri="{28A0092B-C50C-407E-A947-70E740481C1C}">
+                <a14:useLocalDpi xmlns:a14="http://schemas.microsoft.com/office/drawing/2010/main"/>
+              </a:ext>
+            </a:extLst>
+          </a:blip>
+          <a:stretch>
+            <a:fillRect/>
+          </a:stretch>
+        </p:blipFill>
+        <p:spPr>
           <a:xfrm>
-            <a:off x="5649725" y="6524682"/>
-            <a:ext cx="3399026" cy="209288"/>
+            <a:off x="3839409" y="2982748"/>
+            <a:ext cx="4855665" cy="3668875"/>
           </a:xfrm>
           <a:prstGeom prst="rect">
             <a:avLst/>
           </a:prstGeom>
-          <a:noFill/>
-          <a:ln w="9525">
-            <a:noFill/>
-            <a:miter lim="800000"/>
-            <a:headEnd/>
-            <a:tailEnd/>
-          </a:ln>
-          <a:effectLst/>
         </p:spPr>
-        <p:txBody>
-          <a:bodyPr vert="horz" wrap="square" lIns="0" tIns="0" rIns="0" bIns="0" numCol="1" anchor="b" anchorCtr="0" compatLnSpc="1">
-            <a:prstTxWarp prst="textNoShape">
-              <a:avLst/>
-            </a:prstTxWarp>
-            <a:spAutoFit/>
-          </a:bodyPr>
-          <a:lstStyle>
-            <a:lvl1pPr algn="l" rtl="0" eaLnBrk="0" fontAlgn="base" hangingPunct="0">
-              <a:lnSpc>
-                <a:spcPct val="85000"/>
-              </a:lnSpc>
-              <a:spcBef>
-                <a:spcPct val="40000"/>
-              </a:spcBef>
-              <a:spcAft>
-                <a:spcPct val="0"/>
-              </a:spcAft>
-              <a:defRPr sz="3200" b="1" i="1">
-                <a:solidFill>
-                  <a:srgbClr val="003663"/>
-                </a:solidFill>
-                <a:latin typeface="+mj-lt"/>
-                <a:ea typeface="+mj-ea"/>
-                <a:cs typeface="+mj-cs"/>
-              </a:defRPr>
-            </a:lvl1pPr>
-            <a:lvl2pPr algn="l" rtl="0" eaLnBrk="0" fontAlgn="base" hangingPunct="0">
-              <a:lnSpc>
-                <a:spcPct val="85000"/>
-              </a:lnSpc>
-              <a:spcBef>
-                <a:spcPct val="0"/>
-              </a:spcBef>
-              <a:spcAft>
-                <a:spcPct val="0"/>
-              </a:spcAft>
-              <a:defRPr sz="2800" b="1" i="1">
-                <a:solidFill>
-                  <a:srgbClr val="003663"/>
-                </a:solidFill>
-                <a:latin typeface="Arial" charset="0"/>
-              </a:defRPr>
-            </a:lvl2pPr>
-            <a:lvl3pPr algn="l" rtl="0" eaLnBrk="0" fontAlgn="base" hangingPunct="0">
-              <a:lnSpc>
-                <a:spcPct val="85000"/>
-              </a:lnSpc>
-              <a:spcBef>
-                <a:spcPct val="0"/>
-              </a:spcBef>
-              <a:spcAft>
-                <a:spcPct val="0"/>
-              </a:spcAft>
-              <a:defRPr sz="2800" b="1" i="1">
-                <a:solidFill>
-                  <a:srgbClr val="003663"/>
-                </a:solidFill>
-                <a:latin typeface="Arial" charset="0"/>
-              </a:defRPr>
-            </a:lvl3pPr>
-            <a:lvl4pPr algn="l" rtl="0" eaLnBrk="0" fontAlgn="base" hangingPunct="0">
-              <a:lnSpc>
-                <a:spcPct val="85000"/>
-              </a:lnSpc>
-              <a:spcBef>
-                <a:spcPct val="0"/>
-              </a:spcBef>
-              <a:spcAft>
-                <a:spcPct val="0"/>
-              </a:spcAft>
-              <a:defRPr sz="2800" b="1" i="1">
-                <a:solidFill>
-                  <a:srgbClr val="003663"/>
-                </a:solidFill>
-                <a:latin typeface="Arial" charset="0"/>
-              </a:defRPr>
-            </a:lvl4pPr>
-            <a:lvl5pPr algn="l" rtl="0" eaLnBrk="0" fontAlgn="base" hangingPunct="0">
-              <a:lnSpc>
-                <a:spcPct val="85000"/>
-              </a:lnSpc>
-              <a:spcBef>
-                <a:spcPct val="0"/>
-              </a:spcBef>
-              <a:spcAft>
-                <a:spcPct val="0"/>
-              </a:spcAft>
-              <a:defRPr sz="2800" b="1" i="1">
-                <a:solidFill>
-                  <a:srgbClr val="003663"/>
-                </a:solidFill>
-                <a:latin typeface="Arial" charset="0"/>
-              </a:defRPr>
-            </a:lvl5pPr>
-            <a:lvl6pPr marL="457200" algn="l" rtl="0" eaLnBrk="0" fontAlgn="base" hangingPunct="0">
-              <a:lnSpc>
-                <a:spcPct val="85000"/>
-              </a:lnSpc>
-              <a:spcBef>
-                <a:spcPct val="0"/>
-              </a:spcBef>
-              <a:spcAft>
-                <a:spcPct val="0"/>
-              </a:spcAft>
-              <a:defRPr sz="2800" b="1" i="1">
-                <a:solidFill>
-                  <a:srgbClr val="003663"/>
-                </a:solidFill>
-                <a:latin typeface="Arial" charset="0"/>
-              </a:defRPr>
-            </a:lvl6pPr>
-            <a:lvl7pPr marL="914400" algn="l" rtl="0" eaLnBrk="0" fontAlgn="base" hangingPunct="0">
-              <a:lnSpc>
-                <a:spcPct val="85000"/>
-              </a:lnSpc>
-              <a:spcBef>
-                <a:spcPct val="0"/>
-              </a:spcBef>
-              <a:spcAft>
-                <a:spcPct val="0"/>
-              </a:spcAft>
-              <a:defRPr sz="2800" b="1" i="1">
-                <a:solidFill>
-                  <a:srgbClr val="003663"/>
-                </a:solidFill>
-                <a:latin typeface="Arial" charset="0"/>
-              </a:defRPr>
-            </a:lvl7pPr>
-            <a:lvl8pPr marL="1371600" algn="l" rtl="0" eaLnBrk="0" fontAlgn="base" hangingPunct="0">
-              <a:lnSpc>
-                <a:spcPct val="85000"/>
-              </a:lnSpc>
-              <a:spcBef>
-                <a:spcPct val="0"/>
-              </a:spcBef>
-              <a:spcAft>
-                <a:spcPct val="0"/>
-              </a:spcAft>
-              <a:defRPr sz="2800" b="1" i="1">
-                <a:solidFill>
-                  <a:srgbClr val="003663"/>
-                </a:solidFill>
-                <a:latin typeface="Arial" charset="0"/>
-              </a:defRPr>
-            </a:lvl8pPr>
-            <a:lvl9pPr marL="1828800" algn="l" rtl="0" eaLnBrk="0" fontAlgn="base" hangingPunct="0">
-              <a:lnSpc>
-                <a:spcPct val="85000"/>
-              </a:lnSpc>
-              <a:spcBef>
-                <a:spcPct val="0"/>
-              </a:spcBef>
-              <a:spcAft>
-                <a:spcPct val="0"/>
-              </a:spcAft>
-              <a:defRPr sz="2800" b="1" i="1">
-                <a:solidFill>
-                  <a:srgbClr val="003663"/>
-                </a:solidFill>
-                <a:latin typeface="Arial" charset="0"/>
-              </a:defRPr>
-            </a:lvl9pPr>
-          </a:lstStyle>
-          <a:p>
-            <a:r>
-              <a:rPr lang="en-US" sz="1600" kern="0" dirty="0">
-                <a:solidFill>
-                  <a:srgbClr val="000090"/>
-                </a:solidFill>
-              </a:rPr>
-              <a:t>INL NHRES Workshop, March 2018</a:t>
-            </a:r>
-          </a:p>
-        </p:txBody>
-      </p:sp>
+      </p:pic>
     </p:spTree>
   </p:cSld>
   <p:clrMapOvr>
@@ -35973,7 +35770,7 @@
           <a:graphicData uri="http://schemas.openxmlformats.org/presentationml/2006/ole">
             <mc:AlternateContent xmlns:mc="http://schemas.openxmlformats.org/markup-compatibility/2006">
               <mc:Choice xmlns:v="urn:schemas-microsoft-com:vml" Requires="v">
-                <p:oleObj spid="_x0000_s4124" name="Document" r:id="rId4" imgW="5943600" imgH="596900" progId="Word.Document.12">
+                <p:oleObj spid="_x0000_s4130" name="Document" r:id="rId4" imgW="5943600" imgH="596900" progId="Word.Document.12">
                   <p:embed/>
                 </p:oleObj>
               </mc:Choice>
@@ -38491,67 +38288,6 @@
           </a:p>
         </p:txBody>
       </p:sp>
-      <p:sp>
-        <p:nvSpPr>
-          <p:cNvPr id="10" name="TextBox 9">
-            <a:extLst>
-              <a:ext uri="{FF2B5EF4-FFF2-40B4-BE49-F238E27FC236}">
-                <a16:creationId xmlns:a16="http://schemas.microsoft.com/office/drawing/2014/main" id="{E1A990D0-A3D5-164F-9524-AC88DDA1D132}"/>
-              </a:ext>
-            </a:extLst>
-          </p:cNvPr>
-          <p:cNvSpPr txBox="1"/>
-          <p:nvPr/>
-        </p:nvSpPr>
-        <p:spPr>
-          <a:xfrm>
-            <a:off x="2523347" y="5352902"/>
-            <a:ext cx="5577168" cy="830997"/>
-          </a:xfrm>
-          <a:prstGeom prst="rect">
-            <a:avLst/>
-          </a:prstGeom>
-          <a:solidFill>
-            <a:schemeClr val="accent5"/>
-          </a:solidFill>
-        </p:spPr>
-        <p:txBody>
-          <a:bodyPr wrap="none" rtlCol="0">
-            <a:spAutoFit/>
-          </a:bodyPr>
-          <a:lstStyle/>
-          <a:p>
-            <a:pPr algn="ctr"/>
-            <a:r>
-              <a:rPr lang="en-US" dirty="0" err="1">
-                <a:latin typeface="Lucida Console" panose="020B0609040504020204" pitchFamily="49" charset="0"/>
-              </a:rPr>
-              <a:t>git</a:t>
-            </a:r>
-            <a:r>
-              <a:rPr lang="en-US" dirty="0">
-                <a:latin typeface="Lucida Console" panose="020B0609040504020204" pitchFamily="49" charset="0"/>
-              </a:rPr>
-              <a:t> pull</a:t>
-            </a:r>
-          </a:p>
-          <a:p>
-            <a:pPr algn="ctr"/>
-            <a:r>
-              <a:rPr lang="en-US" dirty="0" err="1">
-                <a:latin typeface="Lucida Console" panose="020B0609040504020204" pitchFamily="49" charset="0"/>
-              </a:rPr>
-              <a:t>git</a:t>
-            </a:r>
-            <a:r>
-              <a:rPr lang="en-US" dirty="0">
-                <a:latin typeface="Lucida Console" panose="020B0609040504020204" pitchFamily="49" charset="0"/>
-              </a:rPr>
-              <a:t> checkout workshop_201803 </a:t>
-            </a:r>
-          </a:p>
-        </p:txBody>
-      </p:sp>
     </p:spTree>
     <p:extLst>
       <p:ext uri="{BB962C8B-B14F-4D97-AF65-F5344CB8AC3E}">
@@ -38574,6 +38310,9 @@
                     <p:cTn id="3" fill="hold">
                       <p:stCondLst>
                         <p:cond delay="indefinite"/>
+                        <p:cond evt="onBegin" delay="0">
+                          <p:tn val="2"/>
+                        </p:cond>
                       </p:stCondLst>
                       <p:childTnLst>
                         <p:par>
@@ -38583,7 +38322,7 @@
                             </p:stCondLst>
                             <p:childTnLst>
                               <p:par>
-                                <p:cTn id="5" presetID="5" presetClass="entr" presetSubtype="10" fill="hold" grpId="0" nodeType="clickEffect">
+                                <p:cTn id="5" presetID="5" presetClass="entr" presetSubtype="10" fill="hold" grpId="0" nodeType="withEffect">
                                   <p:stCondLst>
                                     <p:cond delay="0"/>
                                   </p:stCondLst>
@@ -38591,41 +38330,6 @@
                                     <p:set>
                                       <p:cBhvr>
                                         <p:cTn id="6" dur="1" fill="hold">
-                                          <p:stCondLst>
-                                            <p:cond delay="0"/>
-                                          </p:stCondLst>
-                                        </p:cTn>
-                                        <p:tgtEl>
-                                          <p:spTgt spid="10"/>
-                                        </p:tgtEl>
-                                        <p:attrNameLst>
-                                          <p:attrName>style.visibility</p:attrName>
-                                        </p:attrNameLst>
-                                      </p:cBhvr>
-                                      <p:to>
-                                        <p:strVal val="visible"/>
-                                      </p:to>
-                                    </p:set>
-                                    <p:animEffect transition="in" filter="checkerboard(across)">
-                                      <p:cBhvr>
-                                        <p:cTn id="7" dur="500"/>
-                                        <p:tgtEl>
-                                          <p:spTgt spid="10"/>
-                                        </p:tgtEl>
-                                      </p:cBhvr>
-                                    </p:animEffect>
-                                  </p:childTnLst>
-                                </p:cTn>
-                              </p:par>
-                              <p:par>
-                                <p:cTn id="8" presetID="5" presetClass="entr" presetSubtype="10" fill="hold" grpId="0" nodeType="withEffect">
-                                  <p:stCondLst>
-                                    <p:cond delay="0"/>
-                                  </p:stCondLst>
-                                  <p:childTnLst>
-                                    <p:set>
-                                      <p:cBhvr>
-                                        <p:cTn id="9" dur="1" fill="hold">
                                           <p:stCondLst>
                                             <p:cond delay="0"/>
                                           </p:stCondLst>
@@ -38643,7 +38347,7 @@
                                     </p:set>
                                     <p:animEffect transition="in" filter="checkerboard(across)">
                                       <p:cBhvr>
-                                        <p:cTn id="10" dur="500"/>
+                                        <p:cTn id="7" dur="500"/>
                                         <p:tgtEl>
                                           <p:spTgt spid="9"/>
                                         </p:tgtEl>
@@ -38681,7 +38385,6 @@
     </p:tnLst>
     <p:bldLst>
       <p:bldP spid="9" grpId="0" animBg="1"/>
-      <p:bldP spid="10" grpId="0" animBg="1"/>
     </p:bldLst>
   </p:timing>
 </p:sld>
@@ -38748,7 +38451,7 @@
           <a:p>
             <a:r>
               <a:rPr lang="en-US" dirty="0"/>
-              <a:t>Goal: Calculate meaningful impact of installed capacity choices</a:t>
+              <a:t>Goal: Calculate meaningful impact over many time histories</a:t>
             </a:r>
           </a:p>
           <a:p>
@@ -39664,7 +39367,7 @@
         <p:spPr>
           <a:xfrm>
             <a:off x="3909915" y="4621388"/>
-            <a:ext cx="3671198" cy="369332"/>
+            <a:ext cx="3661580" cy="369332"/>
           </a:xfrm>
           <a:prstGeom prst="rect">
             <a:avLst/>
@@ -39695,7 +39398,7 @@
                 </a:solidFill>
                 <a:latin typeface="Monaco" pitchFamily="2" charset="0"/>
               </a:rPr>
-              <a:t>RomTrainer</a:t>
+              <a:t>IOStep</a:t>
             </a:r>
             <a:r>
               <a:rPr lang="en-US" sz="1800" b="1" dirty="0">
@@ -39704,7 +39407,7 @@
                 </a:solidFill>
                 <a:latin typeface="Lucida Console" panose="020B0609040504020204" pitchFamily="49" charset="0"/>
               </a:rPr>
-              <a:t> name=“train”&gt;</a:t>
+              <a:t> name=“serialize”&gt;</a:t>
             </a:r>
           </a:p>
         </p:txBody>
@@ -41001,7 +40704,7 @@
         <p:spPr>
           <a:xfrm>
             <a:off x="3909915" y="3066369"/>
-            <a:ext cx="3906839" cy="369332"/>
+            <a:ext cx="3493264" cy="369332"/>
           </a:xfrm>
           <a:prstGeom prst="rect">
             <a:avLst/>
@@ -41032,7 +40735,7 @@
                 </a:solidFill>
                 <a:latin typeface="Monaco" pitchFamily="2" charset="0"/>
               </a:rPr>
-              <a:t>PostProcess</a:t>
+              <a:t>MultiRun</a:t>
             </a:r>
             <a:r>
               <a:rPr lang="en-US" sz="1800" b="1" dirty="0">
@@ -41061,7 +40764,7 @@
         <p:spPr>
           <a:xfrm>
             <a:off x="3909915" y="3808830"/>
-            <a:ext cx="3768980" cy="369332"/>
+            <a:ext cx="3217547" cy="369332"/>
           </a:xfrm>
           <a:prstGeom prst="rect">
             <a:avLst/>
@@ -41092,7 +40795,7 @@
                 </a:solidFill>
                 <a:latin typeface="Monaco" pitchFamily="2" charset="0"/>
               </a:rPr>
-              <a:t>RomTrainer</a:t>
+              <a:t>IOStep</a:t>
             </a:r>
             <a:r>
               <a:rPr lang="en-US" sz="1800" b="1" dirty="0">
@@ -43193,7 +42896,7 @@
           <a:p>
             <a:r>
               <a:rPr lang="en-US" dirty="0"/>
-              <a:t>Problems with deterministic dataset</a:t>
+              <a:t>Problems with deterministic “real” dataset</a:t>
             </a:r>
           </a:p>
           <a:p>

</xml_diff>